<commit_message>
final version of report
</commit_message>
<xml_diff>
--- a/Final Report/Rutgers DS Bootcamp - The Five Guys  - Project 1 - Report.pptx
+++ b/Final Report/Rutgers DS Bootcamp - The Five Guys  - Project 1 - Report.pptx
@@ -5,7 +5,7 @@
     <p:sldMasterId id="2147483660" r:id="rId1"/>
   </p:sldMasterIdLst>
   <p:notesMasterIdLst>
-    <p:notesMasterId r:id="rId35"/>
+    <p:notesMasterId r:id="rId33"/>
   </p:notesMasterIdLst>
   <p:sldIdLst>
     <p:sldId id="256" r:id="rId2"/>
@@ -36,11 +36,9 @@
     <p:sldId id="279" r:id="rId27"/>
     <p:sldId id="283" r:id="rId28"/>
     <p:sldId id="290" r:id="rId29"/>
-    <p:sldId id="291" r:id="rId30"/>
-    <p:sldId id="292" r:id="rId31"/>
-    <p:sldId id="293" r:id="rId32"/>
-    <p:sldId id="280" r:id="rId33"/>
-    <p:sldId id="267" r:id="rId34"/>
+    <p:sldId id="293" r:id="rId30"/>
+    <p:sldId id="280" r:id="rId31"/>
+    <p:sldId id="267" r:id="rId32"/>
   </p:sldIdLst>
   <p:sldSz cx="9144000" cy="6858000" type="screen4x3"/>
   <p:notesSz cx="6858000" cy="9144000"/>
@@ -6464,7 +6462,7 @@
           <a:p>
             <a:fld id="{CE058F4C-6B1A-4901-9A19-260396C79F74}" type="datetimeFigureOut">
               <a:rPr lang="en-US" smtClean="0"/>
-              <a:t>6/22/2020</a:t>
+              <a:t>6/23/2020</a:t>
             </a:fld>
             <a:endParaRPr lang="en-US"/>
           </a:p>
@@ -6862,7 +6860,7 @@
           <a:p>
             <a:fld id="{8A262FCB-144E-4C2C-9C33-C30271442828}" type="datetime1">
               <a:rPr lang="en-US" smtClean="0"/>
-              <a:t>6/22/2020</a:t>
+              <a:t>6/23/2020</a:t>
             </a:fld>
             <a:endParaRPr lang="en-US"/>
           </a:p>
@@ -7032,7 +7030,7 @@
           <a:p>
             <a:fld id="{9F74C140-DF75-4380-9C8E-9992C6E46E80}" type="datetime1">
               <a:rPr lang="en-US" smtClean="0"/>
-              <a:t>6/22/2020</a:t>
+              <a:t>6/23/2020</a:t>
             </a:fld>
             <a:endParaRPr lang="en-US"/>
           </a:p>
@@ -7212,7 +7210,7 @@
           <a:p>
             <a:fld id="{88AEB25D-18AF-49A6-AD83-E3B83664264C}" type="datetime1">
               <a:rPr lang="en-US" smtClean="0"/>
-              <a:t>6/22/2020</a:t>
+              <a:t>6/23/2020</a:t>
             </a:fld>
             <a:endParaRPr lang="en-US"/>
           </a:p>
@@ -7382,7 +7380,7 @@
           <a:p>
             <a:fld id="{4D175C0F-C00D-4E38-946D-38F662D7F390}" type="datetime1">
               <a:rPr lang="en-US" smtClean="0"/>
-              <a:t>6/22/2020</a:t>
+              <a:t>6/23/2020</a:t>
             </a:fld>
             <a:endParaRPr lang="en-US"/>
           </a:p>
@@ -7626,7 +7624,7 @@
           <a:p>
             <a:fld id="{E9CB9244-CD47-4B16-B9A6-FB990AC52DF2}" type="datetime1">
               <a:rPr lang="en-US" smtClean="0"/>
-              <a:t>6/22/2020</a:t>
+              <a:t>6/23/2020</a:t>
             </a:fld>
             <a:endParaRPr lang="en-US"/>
           </a:p>
@@ -7858,7 +7856,7 @@
           <a:p>
             <a:fld id="{1DDD4856-0109-481C-B401-2ECB925347D6}" type="datetime1">
               <a:rPr lang="en-US" smtClean="0"/>
-              <a:t>6/22/2020</a:t>
+              <a:t>6/23/2020</a:t>
             </a:fld>
             <a:endParaRPr lang="en-US"/>
           </a:p>
@@ -8225,7 +8223,7 @@
           <a:p>
             <a:fld id="{0806CE70-0FBB-4DF0-802B-91AC1C6D1A4F}" type="datetime1">
               <a:rPr lang="en-US" smtClean="0"/>
-              <a:t>6/22/2020</a:t>
+              <a:t>6/23/2020</a:t>
             </a:fld>
             <a:endParaRPr lang="en-US"/>
           </a:p>
@@ -8343,7 +8341,7 @@
           <a:p>
             <a:fld id="{5F2B8F73-210B-4A22-833A-5580414E4C46}" type="datetime1">
               <a:rPr lang="en-US" smtClean="0"/>
-              <a:t>6/22/2020</a:t>
+              <a:t>6/23/2020</a:t>
             </a:fld>
             <a:endParaRPr lang="en-US"/>
           </a:p>
@@ -8438,7 +8436,7 @@
           <a:p>
             <a:fld id="{62F35924-FA68-4CB0-9782-47F7D0BC7BDD}" type="datetime1">
               <a:rPr lang="en-US" smtClean="0"/>
-              <a:t>6/22/2020</a:t>
+              <a:t>6/23/2020</a:t>
             </a:fld>
             <a:endParaRPr lang="en-US"/>
           </a:p>
@@ -8715,7 +8713,7 @@
           <a:p>
             <a:fld id="{8955C806-5CDF-467F-B76D-B14EFF38065E}" type="datetime1">
               <a:rPr lang="en-US" smtClean="0"/>
-              <a:t>6/22/2020</a:t>
+              <a:t>6/23/2020</a:t>
             </a:fld>
             <a:endParaRPr lang="en-US"/>
           </a:p>
@@ -8972,7 +8970,7 @@
           <a:p>
             <a:fld id="{68C70507-B710-41E9-850F-3E50D7BCBEF7}" type="datetime1">
               <a:rPr lang="en-US" smtClean="0"/>
-              <a:t>6/22/2020</a:t>
+              <a:t>6/23/2020</a:t>
             </a:fld>
             <a:endParaRPr lang="en-US"/>
           </a:p>
@@ -9185,7 +9183,7 @@
           <a:p>
             <a:fld id="{9107C2AB-5ABD-457B-B3E5-8FC105D7C963}" type="datetime1">
               <a:rPr lang="en-US" smtClean="0"/>
-              <a:t>6/22/2020</a:t>
+              <a:t>6/23/2020</a:t>
             </a:fld>
             <a:endParaRPr lang="en-US"/>
           </a:p>
@@ -16037,7 +16035,7 @@
                 <a:ea typeface="Microsoft Sans Serif" panose="020B0604020202020204" pitchFamily="34" charset="0"/>
                 <a:cs typeface="Microsoft Sans Serif" panose="020B0604020202020204" pitchFamily="34" charset="0"/>
               </a:rPr>
-              <a:t>Team Analysis - Grizzlies</a:t>
+              <a:t>Team Analysis – p-Value</a:t>
             </a:r>
             <a:endParaRPr lang="en-US" sz="3200" dirty="0"/>
           </a:p>
@@ -16197,68 +16195,12 @@
           </a:p>
         </p:txBody>
       </p:sp>
-      <p:sp>
-        <p:nvSpPr>
-          <p:cNvPr id="3" name="TextBox 2">
-            <a:extLst>
-              <a:ext uri="{FF2B5EF4-FFF2-40B4-BE49-F238E27FC236}">
-                <a16:creationId xmlns:a16="http://schemas.microsoft.com/office/drawing/2014/main" id="{02C658B5-A6EC-4802-97AA-6D3AE7F71821}"/>
-              </a:ext>
-            </a:extLst>
-          </p:cNvPr>
-          <p:cNvSpPr txBox="1"/>
-          <p:nvPr/>
-        </p:nvSpPr>
-        <p:spPr>
-          <a:xfrm>
-            <a:off x="469623" y="1265565"/>
-            <a:ext cx="7992717" cy="738664"/>
-          </a:xfrm>
-          <a:prstGeom prst="rect">
-            <a:avLst/>
-          </a:prstGeom>
-          <a:noFill/>
-        </p:spPr>
-        <p:txBody>
-          <a:bodyPr wrap="square" rtlCol="0">
-            <a:spAutoFit/>
-          </a:bodyPr>
-          <a:lstStyle/>
-          <a:p>
-            <a:pPr algn="ctr"/>
-            <a:r>
-              <a:rPr lang="en-US" sz="2100" dirty="0">
-                <a:latin typeface="Microsoft Sans Serif" panose="020B0604020202020204" pitchFamily="34" charset="0"/>
-                <a:ea typeface="Microsoft Sans Serif" panose="020B0604020202020204" pitchFamily="34" charset="0"/>
-                <a:cs typeface="Microsoft Sans Serif" panose="020B0604020202020204" pitchFamily="34" charset="0"/>
-              </a:rPr>
-              <a:t>While the previous graphs show there may be some correlation, the r</a:t>
-            </a:r>
-            <a:r>
-              <a:rPr lang="en-US" sz="2100" baseline="30000" dirty="0">
-                <a:latin typeface="Microsoft Sans Serif" panose="020B0604020202020204" pitchFamily="34" charset="0"/>
-                <a:ea typeface="Microsoft Sans Serif" panose="020B0604020202020204" pitchFamily="34" charset="0"/>
-                <a:cs typeface="Microsoft Sans Serif" panose="020B0604020202020204" pitchFamily="34" charset="0"/>
-              </a:rPr>
-              <a:t>2</a:t>
-            </a:r>
-            <a:r>
-              <a:rPr lang="en-US" sz="2100" dirty="0">
-                <a:latin typeface="Microsoft Sans Serif" panose="020B0604020202020204" pitchFamily="34" charset="0"/>
-                <a:ea typeface="Microsoft Sans Serif" panose="020B0604020202020204" pitchFamily="34" charset="0"/>
-                <a:cs typeface="Microsoft Sans Serif" panose="020B0604020202020204" pitchFamily="34" charset="0"/>
-              </a:rPr>
-              <a:t> value from individual teams suggests otherwise.</a:t>
-            </a:r>
-          </a:p>
-        </p:txBody>
-      </p:sp>
       <p:pic>
         <p:nvPicPr>
-          <p:cNvPr id="6" name="Picture 5">
-            <a:extLst>
-              <a:ext uri="{FF2B5EF4-FFF2-40B4-BE49-F238E27FC236}">
-                <a16:creationId xmlns:a16="http://schemas.microsoft.com/office/drawing/2014/main" id="{E99122C2-3AEB-4E9F-8FE7-01F6DED781E5}"/>
+          <p:cNvPr id="4" name="Picture 3">
+            <a:extLst>
+              <a:ext uri="{FF2B5EF4-FFF2-40B4-BE49-F238E27FC236}">
+                <a16:creationId xmlns:a16="http://schemas.microsoft.com/office/drawing/2014/main" id="{B0078271-D2FF-4AB5-9363-24D8AC13E7D7}"/>
               </a:ext>
             </a:extLst>
           </p:cNvPr>
@@ -16275,38 +16217,8 @@
         </p:blipFill>
         <p:spPr>
           <a:xfrm>
-            <a:off x="522632" y="2506123"/>
-            <a:ext cx="4227669" cy="2940987"/>
-          </a:xfrm>
-          <a:prstGeom prst="rect">
-            <a:avLst/>
-          </a:prstGeom>
-        </p:spPr>
-      </p:pic>
-      <p:pic>
-        <p:nvPicPr>
-          <p:cNvPr id="7" name="Picture 6">
-            <a:extLst>
-              <a:ext uri="{FF2B5EF4-FFF2-40B4-BE49-F238E27FC236}">
-                <a16:creationId xmlns:a16="http://schemas.microsoft.com/office/drawing/2014/main" id="{2262503F-6C8C-4EA6-8ED0-2DBA5051818E}"/>
-              </a:ext>
-            </a:extLst>
-          </p:cNvPr>
-          <p:cNvPicPr>
-            <a:picLocks noChangeAspect="1"/>
-          </p:cNvPicPr>
-          <p:nvPr/>
-        </p:nvPicPr>
-        <p:blipFill>
-          <a:blip r:embed="rId4"/>
-          <a:stretch>
-            <a:fillRect/>
-          </a:stretch>
-        </p:blipFill>
-        <p:spPr>
-          <a:xfrm>
-            <a:off x="4572000" y="2506123"/>
-            <a:ext cx="4166103" cy="2845143"/>
+            <a:off x="522632" y="1116627"/>
+            <a:ext cx="8117785" cy="4635624"/>
           </a:xfrm>
           <a:prstGeom prst="rect">
             <a:avLst/>
@@ -16316,7 +16228,7 @@
     </p:spTree>
     <p:extLst>
       <p:ext uri="{BB962C8B-B14F-4D97-AF65-F5344CB8AC3E}">
-        <p14:creationId xmlns:p14="http://schemas.microsoft.com/office/powerpoint/2010/main" val="3241698913"/>
+        <p14:creationId xmlns:p14="http://schemas.microsoft.com/office/powerpoint/2010/main" val="57422327"/>
       </p:ext>
     </p:extLst>
   </p:cSld>
@@ -16630,52 +16542,12 @@
           <a:chExt cx="0" cy="0"/>
         </a:xfrm>
       </p:grpSpPr>
-      <p:sp>
-        <p:nvSpPr>
-          <p:cNvPr id="2" name="Title 1">
-            <a:extLst>
-              <a:ext uri="{FF2B5EF4-FFF2-40B4-BE49-F238E27FC236}">
-                <a16:creationId xmlns:a16="http://schemas.microsoft.com/office/drawing/2014/main" id="{A8E5541F-7BFA-479C-B8B4-DDE116914320}"/>
-              </a:ext>
-            </a:extLst>
-          </p:cNvPr>
-          <p:cNvSpPr>
-            <a:spLocks noGrp="1"/>
-          </p:cNvSpPr>
-          <p:nvPr>
-            <p:ph type="title"/>
-          </p:nvPr>
-        </p:nvSpPr>
-        <p:spPr>
-          <a:xfrm>
-            <a:off x="522632" y="58022"/>
-            <a:ext cx="7886700" cy="705648"/>
-          </a:xfrm>
-        </p:spPr>
-        <p:txBody>
-          <a:bodyPr>
-            <a:normAutofit/>
-          </a:bodyPr>
-          <a:lstStyle/>
-          <a:p>
-            <a:r>
-              <a:rPr lang="en-US" sz="3200" dirty="0">
-                <a:latin typeface="Microsoft Sans Serif" panose="020B0604020202020204" pitchFamily="34" charset="0"/>
-                <a:ea typeface="Microsoft Sans Serif" panose="020B0604020202020204" pitchFamily="34" charset="0"/>
-                <a:cs typeface="Microsoft Sans Serif" panose="020B0604020202020204" pitchFamily="34" charset="0"/>
-              </a:rPr>
-              <a:t>Team Analysis - Grizzlies</a:t>
-            </a:r>
-            <a:endParaRPr lang="en-US" sz="3200" dirty="0"/>
-          </a:p>
-        </p:txBody>
-      </p:sp>
       <p:pic>
         <p:nvPicPr>
-          <p:cNvPr id="5" name="Picture 4">
-            <a:extLst>
-              <a:ext uri="{FF2B5EF4-FFF2-40B4-BE49-F238E27FC236}">
-                <a16:creationId xmlns:a16="http://schemas.microsoft.com/office/drawing/2014/main" id="{F112826D-8205-4543-9CA7-8C18E18B2A81}"/>
+          <p:cNvPr id="4" name="Picture 3">
+            <a:extLst>
+              <a:ext uri="{FF2B5EF4-FFF2-40B4-BE49-F238E27FC236}">
+                <a16:creationId xmlns:a16="http://schemas.microsoft.com/office/drawing/2014/main" id="{449380A0-F828-40F6-ABA0-CB684060C995}"/>
               </a:ext>
             </a:extLst>
           </p:cNvPr>
@@ -16692,8 +16564,8 @@
         </p:blipFill>
         <p:spPr>
           <a:xfrm>
-            <a:off x="0" y="6276894"/>
-            <a:ext cx="1991003" cy="581106"/>
+            <a:off x="0" y="266843"/>
+            <a:ext cx="9143999" cy="6324314"/>
           </a:xfrm>
           <a:prstGeom prst="rect">
             <a:avLst/>
@@ -16702,28 +16574,110 @@
       </p:pic>
       <p:sp>
         <p:nvSpPr>
-          <p:cNvPr id="8" name="Rectangle 7">
-            <a:extLst>
-              <a:ext uri="{FF2B5EF4-FFF2-40B4-BE49-F238E27FC236}">
-                <a16:creationId xmlns:a16="http://schemas.microsoft.com/office/drawing/2014/main" id="{7819BA35-EE0F-4ABB-BEBA-21534EB9317F}"/>
-              </a:ext>
-            </a:extLst>
-          </p:cNvPr>
-          <p:cNvSpPr/>
+          <p:cNvPr id="6" name="TextBox 5">
+            <a:extLst>
+              <a:ext uri="{FF2B5EF4-FFF2-40B4-BE49-F238E27FC236}">
+                <a16:creationId xmlns:a16="http://schemas.microsoft.com/office/drawing/2014/main" id="{450BAF91-4632-4A48-A0BC-20AB5D0D29E5}"/>
+              </a:ext>
+            </a:extLst>
+          </p:cNvPr>
+          <p:cNvSpPr txBox="1"/>
           <p:nvPr/>
         </p:nvSpPr>
         <p:spPr>
           <a:xfrm>
-            <a:off x="522632" y="6276894"/>
-            <a:ext cx="7992717" cy="45719"/>
+            <a:off x="543339" y="4258222"/>
+            <a:ext cx="5380383" cy="1754326"/>
           </a:xfrm>
           <a:prstGeom prst="rect">
             <a:avLst/>
           </a:prstGeom>
           <a:solidFill>
-            <a:srgbClr val="E51836"/>
+            <a:schemeClr val="bg1"/>
           </a:solidFill>
-          <a:ln>
+        </p:spPr>
+        <p:txBody>
+          <a:bodyPr wrap="square" rtlCol="0" anchor="ctr">
+            <a:spAutoFit/>
+          </a:bodyPr>
+          <a:lstStyle/>
+          <a:p>
+            <a:endParaRPr lang="en-US" sz="3600" dirty="0">
+              <a:latin typeface="Microsoft Sans Serif" panose="020B0604020202020204" pitchFamily="34" charset="0"/>
+              <a:ea typeface="Microsoft Sans Serif" panose="020B0604020202020204" pitchFamily="34" charset="0"/>
+              <a:cs typeface="Microsoft Sans Serif" panose="020B0604020202020204" pitchFamily="34" charset="0"/>
+            </a:endParaRPr>
+          </a:p>
+          <a:p>
+            <a:r>
+              <a:rPr lang="en-US" sz="3600" dirty="0">
+                <a:latin typeface="Microsoft Sans Serif" panose="020B0604020202020204" pitchFamily="34" charset="0"/>
+                <a:ea typeface="Microsoft Sans Serif" panose="020B0604020202020204" pitchFamily="34" charset="0"/>
+                <a:cs typeface="Microsoft Sans Serif" panose="020B0604020202020204" pitchFamily="34" charset="0"/>
+              </a:rPr>
+              <a:t> 5. Conclusion</a:t>
+            </a:r>
+          </a:p>
+          <a:p>
+            <a:endParaRPr lang="en-US" sz="3600" dirty="0">
+              <a:latin typeface="Microsoft Sans Serif" panose="020B0604020202020204" pitchFamily="34" charset="0"/>
+              <a:ea typeface="Microsoft Sans Serif" panose="020B0604020202020204" pitchFamily="34" charset="0"/>
+              <a:cs typeface="Microsoft Sans Serif" panose="020B0604020202020204" pitchFamily="34" charset="0"/>
+            </a:endParaRPr>
+          </a:p>
+        </p:txBody>
+      </p:sp>
+      <p:sp>
+        <p:nvSpPr>
+          <p:cNvPr id="2" name="Slide Number Placeholder 1">
+            <a:extLst>
+              <a:ext uri="{FF2B5EF4-FFF2-40B4-BE49-F238E27FC236}">
+                <a16:creationId xmlns:a16="http://schemas.microsoft.com/office/drawing/2014/main" id="{0C20A05A-1E61-419B-8225-50C27E807A0F}"/>
+              </a:ext>
+            </a:extLst>
+          </p:cNvPr>
+          <p:cNvSpPr>
+            <a:spLocks noGrp="1"/>
+          </p:cNvSpPr>
+          <p:nvPr>
+            <p:ph type="sldNum" sz="quarter" idx="12"/>
+          </p:nvPr>
+        </p:nvSpPr>
+        <p:spPr/>
+        <p:txBody>
+          <a:bodyPr/>
+          <a:lstStyle/>
+          <a:p>
+            <a:fld id="{2BD03CB1-4DB3-405C-876B-B27AD0EBE084}" type="slidenum">
+              <a:rPr lang="en-US" smtClean="0"/>
+              <a:t>30</a:t>
+            </a:fld>
+            <a:endParaRPr lang="en-US"/>
+          </a:p>
+        </p:txBody>
+      </p:sp>
+      <p:sp>
+        <p:nvSpPr>
+          <p:cNvPr id="3" name="Rectangle 2">
+            <a:extLst>
+              <a:ext uri="{FF2B5EF4-FFF2-40B4-BE49-F238E27FC236}">
+                <a16:creationId xmlns:a16="http://schemas.microsoft.com/office/drawing/2014/main" id="{B58459CE-3466-455A-8FD5-9D14FA580553}"/>
+              </a:ext>
+            </a:extLst>
+          </p:cNvPr>
+          <p:cNvSpPr/>
+          <p:nvPr/>
+        </p:nvSpPr>
+        <p:spPr>
+          <a:xfrm>
+            <a:off x="649357" y="4850296"/>
+            <a:ext cx="543339" cy="556591"/>
+          </a:xfrm>
+          <a:prstGeom prst="rect">
+            <a:avLst/>
+          </a:prstGeom>
+          <a:noFill/>
+          <a:ln w="57150">
             <a:solidFill>
               <a:srgbClr val="E51836"/>
             </a:solidFill>
@@ -16754,196 +16708,62 @@
           </a:p>
         </p:txBody>
       </p:sp>
-      <p:cxnSp>
-        <p:nvCxnSpPr>
-          <p:cNvPr id="10" name="Straight Connector 9">
-            <a:extLst>
-              <a:ext uri="{FF2B5EF4-FFF2-40B4-BE49-F238E27FC236}">
-                <a16:creationId xmlns:a16="http://schemas.microsoft.com/office/drawing/2014/main" id="{2A2D717B-FED3-4573-B2FE-57087D39430D}"/>
-              </a:ext>
-            </a:extLst>
-          </p:cNvPr>
-          <p:cNvCxnSpPr/>
+      <p:sp>
+        <p:nvSpPr>
+          <p:cNvPr id="7" name="Rectangle 6">
+            <a:extLst>
+              <a:ext uri="{FF2B5EF4-FFF2-40B4-BE49-F238E27FC236}">
+                <a16:creationId xmlns:a16="http://schemas.microsoft.com/office/drawing/2014/main" id="{CE672193-1A1B-4AF5-A2D5-06BD5A09B613}"/>
+              </a:ext>
+            </a:extLst>
+          </p:cNvPr>
+          <p:cNvSpPr/>
           <p:nvPr/>
-        </p:nvCxnSpPr>
-        <p:spPr>
-          <a:xfrm>
-            <a:off x="522632" y="763670"/>
-            <a:ext cx="7992717" cy="0"/>
-          </a:xfrm>
-          <a:prstGeom prst="line">
+        </p:nvSpPr>
+        <p:spPr>
+          <a:xfrm>
+            <a:off x="649356" y="4572000"/>
+            <a:ext cx="4863548" cy="1166191"/>
+          </a:xfrm>
+          <a:prstGeom prst="rect">
             <a:avLst/>
           </a:prstGeom>
-          <a:ln>
+          <a:noFill/>
+          <a:ln w="57150">
             <a:solidFill>
               <a:srgbClr val="E51836"/>
             </a:solidFill>
           </a:ln>
         </p:spPr>
         <p:style>
-          <a:lnRef idx="1">
-            <a:schemeClr val="accent1"/>
+          <a:lnRef idx="2">
+            <a:schemeClr val="accent1">
+              <a:shade val="50000"/>
+            </a:schemeClr>
           </a:lnRef>
-          <a:fillRef idx="0">
+          <a:fillRef idx="1">
             <a:schemeClr val="accent1"/>
           </a:fillRef>
           <a:effectRef idx="0">
             <a:schemeClr val="accent1"/>
           </a:effectRef>
           <a:fontRef idx="minor">
-            <a:schemeClr val="tx1"/>
+            <a:schemeClr val="lt1"/>
           </a:fontRef>
         </p:style>
-      </p:cxnSp>
-      <p:sp>
-        <p:nvSpPr>
-          <p:cNvPr id="11" name="Slide Number Placeholder 10">
-            <a:extLst>
-              <a:ext uri="{FF2B5EF4-FFF2-40B4-BE49-F238E27FC236}">
-                <a16:creationId xmlns:a16="http://schemas.microsoft.com/office/drawing/2014/main" id="{3638B894-F5CB-41EC-A4AE-32E1D6A3E77D}"/>
-              </a:ext>
-            </a:extLst>
-          </p:cNvPr>
-          <p:cNvSpPr>
-            <a:spLocks noGrp="1"/>
-          </p:cNvSpPr>
-          <p:nvPr>
-            <p:ph type="sldNum" sz="quarter" idx="12"/>
-          </p:nvPr>
-        </p:nvSpPr>
-        <p:spPr/>
         <p:txBody>
-          <a:bodyPr/>
+          <a:bodyPr rtlCol="0" anchor="ctr"/>
           <a:lstStyle/>
           <a:p>
-            <a:fld id="{2BD03CB1-4DB3-405C-876B-B27AD0EBE084}" type="slidenum">
-              <a:rPr lang="en-US" smtClean="0"/>
-              <a:t>30</a:t>
-            </a:fld>
+            <a:pPr algn="ctr"/>
             <a:endParaRPr lang="en-US"/>
           </a:p>
         </p:txBody>
       </p:sp>
-      <p:sp>
-        <p:nvSpPr>
-          <p:cNvPr id="3" name="TextBox 2">
-            <a:extLst>
-              <a:ext uri="{FF2B5EF4-FFF2-40B4-BE49-F238E27FC236}">
-                <a16:creationId xmlns:a16="http://schemas.microsoft.com/office/drawing/2014/main" id="{02C658B5-A6EC-4802-97AA-6D3AE7F71821}"/>
-              </a:ext>
-            </a:extLst>
-          </p:cNvPr>
-          <p:cNvSpPr txBox="1"/>
-          <p:nvPr/>
-        </p:nvSpPr>
-        <p:spPr>
-          <a:xfrm>
-            <a:off x="469623" y="1265565"/>
-            <a:ext cx="7992717" cy="738664"/>
-          </a:xfrm>
-          <a:prstGeom prst="rect">
-            <a:avLst/>
-          </a:prstGeom>
-          <a:noFill/>
-        </p:spPr>
-        <p:txBody>
-          <a:bodyPr wrap="square" rtlCol="0">
-            <a:spAutoFit/>
-          </a:bodyPr>
-          <a:lstStyle/>
-          <a:p>
-            <a:pPr algn="ctr"/>
-            <a:r>
-              <a:rPr lang="en-US" sz="2100" dirty="0">
-                <a:latin typeface="Microsoft Sans Serif" panose="020B0604020202020204" pitchFamily="34" charset="0"/>
-                <a:ea typeface="Microsoft Sans Serif" panose="020B0604020202020204" pitchFamily="34" charset="0"/>
-                <a:cs typeface="Microsoft Sans Serif" panose="020B0604020202020204" pitchFamily="34" charset="0"/>
-              </a:rPr>
-              <a:t>While the previous graphs show there may be some correlation, the r</a:t>
-            </a:r>
-            <a:r>
-              <a:rPr lang="en-US" sz="2100" baseline="30000" dirty="0">
-                <a:latin typeface="Microsoft Sans Serif" panose="020B0604020202020204" pitchFamily="34" charset="0"/>
-                <a:ea typeface="Microsoft Sans Serif" panose="020B0604020202020204" pitchFamily="34" charset="0"/>
-                <a:cs typeface="Microsoft Sans Serif" panose="020B0604020202020204" pitchFamily="34" charset="0"/>
-              </a:rPr>
-              <a:t>2</a:t>
-            </a:r>
-            <a:r>
-              <a:rPr lang="en-US" sz="2100" dirty="0">
-                <a:latin typeface="Microsoft Sans Serif" panose="020B0604020202020204" pitchFamily="34" charset="0"/>
-                <a:ea typeface="Microsoft Sans Serif" panose="020B0604020202020204" pitchFamily="34" charset="0"/>
-                <a:cs typeface="Microsoft Sans Serif" panose="020B0604020202020204" pitchFamily="34" charset="0"/>
-              </a:rPr>
-              <a:t> value from individual teams suggests otherwise.</a:t>
-            </a:r>
-          </a:p>
-        </p:txBody>
-      </p:sp>
-      <p:pic>
-        <p:nvPicPr>
-          <p:cNvPr id="6" name="Picture 5">
-            <a:extLst>
-              <a:ext uri="{FF2B5EF4-FFF2-40B4-BE49-F238E27FC236}">
-                <a16:creationId xmlns:a16="http://schemas.microsoft.com/office/drawing/2014/main" id="{E99122C2-3AEB-4E9F-8FE7-01F6DED781E5}"/>
-              </a:ext>
-            </a:extLst>
-          </p:cNvPr>
-          <p:cNvPicPr>
-            <a:picLocks noChangeAspect="1"/>
-          </p:cNvPicPr>
-          <p:nvPr/>
-        </p:nvPicPr>
-        <p:blipFill>
-          <a:blip r:embed="rId3"/>
-          <a:stretch>
-            <a:fillRect/>
-          </a:stretch>
-        </p:blipFill>
-        <p:spPr>
-          <a:xfrm>
-            <a:off x="522632" y="2506123"/>
-            <a:ext cx="4227669" cy="2940987"/>
-          </a:xfrm>
-          <a:prstGeom prst="rect">
-            <a:avLst/>
-          </a:prstGeom>
-        </p:spPr>
-      </p:pic>
-      <p:pic>
-        <p:nvPicPr>
-          <p:cNvPr id="7" name="Picture 6">
-            <a:extLst>
-              <a:ext uri="{FF2B5EF4-FFF2-40B4-BE49-F238E27FC236}">
-                <a16:creationId xmlns:a16="http://schemas.microsoft.com/office/drawing/2014/main" id="{2262503F-6C8C-4EA6-8ED0-2DBA5051818E}"/>
-              </a:ext>
-            </a:extLst>
-          </p:cNvPr>
-          <p:cNvPicPr>
-            <a:picLocks noChangeAspect="1"/>
-          </p:cNvPicPr>
-          <p:nvPr/>
-        </p:nvPicPr>
-        <p:blipFill>
-          <a:blip r:embed="rId4"/>
-          <a:stretch>
-            <a:fillRect/>
-          </a:stretch>
-        </p:blipFill>
-        <p:spPr>
-          <a:xfrm>
-            <a:off x="4572000" y="2506123"/>
-            <a:ext cx="4166103" cy="2845143"/>
-          </a:xfrm>
-          <a:prstGeom prst="rect">
-            <a:avLst/>
-          </a:prstGeom>
-        </p:spPr>
-      </p:pic>
     </p:spTree>
     <p:extLst>
       <p:ext uri="{BB962C8B-B14F-4D97-AF65-F5344CB8AC3E}">
-        <p14:creationId xmlns:p14="http://schemas.microsoft.com/office/powerpoint/2010/main" val="293784613"/>
+        <p14:creationId xmlns:p14="http://schemas.microsoft.com/office/powerpoint/2010/main" val="3225601204"/>
       </p:ext>
     </p:extLst>
   </p:cSld>
@@ -17004,7 +16824,7 @@
                 <a:ea typeface="Microsoft Sans Serif" panose="020B0604020202020204" pitchFamily="34" charset="0"/>
                 <a:cs typeface="Microsoft Sans Serif" panose="020B0604020202020204" pitchFamily="34" charset="0"/>
               </a:rPr>
-              <a:t>Team Analysis – p-Value</a:t>
+              <a:t>Conclusion</a:t>
             </a:r>
             <a:endParaRPr lang="en-US" sz="3200" dirty="0"/>
           </a:p>
@@ -17164,12 +16984,71 @@
           </a:p>
         </p:txBody>
       </p:sp>
+      <p:sp>
+        <p:nvSpPr>
+          <p:cNvPr id="3" name="TextBox 2">
+            <a:extLst>
+              <a:ext uri="{FF2B5EF4-FFF2-40B4-BE49-F238E27FC236}">
+                <a16:creationId xmlns:a16="http://schemas.microsoft.com/office/drawing/2014/main" id="{02C658B5-A6EC-4802-97AA-6D3AE7F71821}"/>
+              </a:ext>
+            </a:extLst>
+          </p:cNvPr>
+          <p:cNvSpPr txBox="1"/>
+          <p:nvPr/>
+        </p:nvSpPr>
+        <p:spPr>
+          <a:xfrm>
+            <a:off x="469623" y="1265565"/>
+            <a:ext cx="7992717" cy="1384995"/>
+          </a:xfrm>
+          <a:prstGeom prst="rect">
+            <a:avLst/>
+          </a:prstGeom>
+          <a:noFill/>
+        </p:spPr>
+        <p:txBody>
+          <a:bodyPr wrap="square" rtlCol="0">
+            <a:spAutoFit/>
+          </a:bodyPr>
+          <a:lstStyle/>
+          <a:p>
+            <a:pPr algn="ctr"/>
+            <a:r>
+              <a:rPr lang="en-US" sz="2100" dirty="0">
+                <a:latin typeface="Microsoft Sans Serif" panose="020B0604020202020204" pitchFamily="34" charset="0"/>
+                <a:ea typeface="Microsoft Sans Serif" panose="020B0604020202020204" pitchFamily="34" charset="0"/>
+                <a:cs typeface="Microsoft Sans Serif" panose="020B0604020202020204" pitchFamily="34" charset="0"/>
+              </a:rPr>
+              <a:t>While we found some interesting correlations between attendance and performance, we could not confirm causation.</a:t>
+            </a:r>
+          </a:p>
+          <a:p>
+            <a:pPr algn="ctr"/>
+            <a:endParaRPr lang="en-US" sz="2100" dirty="0">
+              <a:latin typeface="Microsoft Sans Serif" panose="020B0604020202020204" pitchFamily="34" charset="0"/>
+              <a:ea typeface="Microsoft Sans Serif" panose="020B0604020202020204" pitchFamily="34" charset="0"/>
+              <a:cs typeface="Microsoft Sans Serif" panose="020B0604020202020204" pitchFamily="34" charset="0"/>
+            </a:endParaRPr>
+          </a:p>
+          <a:p>
+            <a:pPr algn="ctr"/>
+            <a:r>
+              <a:rPr lang="en-US" sz="2100" dirty="0">
+                <a:latin typeface="Microsoft Sans Serif" panose="020B0604020202020204" pitchFamily="34" charset="0"/>
+                <a:ea typeface="Microsoft Sans Serif" panose="020B0604020202020204" pitchFamily="34" charset="0"/>
+                <a:cs typeface="Microsoft Sans Serif" panose="020B0604020202020204" pitchFamily="34" charset="0"/>
+              </a:rPr>
+              <a:t>We’ll be watching along with everyone else!</a:t>
+            </a:r>
+          </a:p>
+        </p:txBody>
+      </p:sp>
       <p:pic>
         <p:nvPicPr>
           <p:cNvPr id="4" name="Picture 3">
             <a:extLst>
               <a:ext uri="{FF2B5EF4-FFF2-40B4-BE49-F238E27FC236}">
-                <a16:creationId xmlns:a16="http://schemas.microsoft.com/office/drawing/2014/main" id="{B0078271-D2FF-4AB5-9363-24D8AC13E7D7}"/>
+                <a16:creationId xmlns:a16="http://schemas.microsoft.com/office/drawing/2014/main" id="{CCAA11B7-180A-4681-944B-7B863A399C4A}"/>
               </a:ext>
             </a:extLst>
           </p:cNvPr>
@@ -17186,542 +17065,14 @@
         </p:blipFill>
         <p:spPr>
           <a:xfrm>
-            <a:off x="522632" y="1116627"/>
-            <a:ext cx="8117785" cy="4635624"/>
+            <a:off x="2817450" y="2918828"/>
+            <a:ext cx="3297062" cy="2942352"/>
           </a:xfrm>
           <a:prstGeom prst="rect">
             <a:avLst/>
           </a:prstGeom>
         </p:spPr>
       </p:pic>
-    </p:spTree>
-    <p:extLst>
-      <p:ext uri="{BB962C8B-B14F-4D97-AF65-F5344CB8AC3E}">
-        <p14:creationId xmlns:p14="http://schemas.microsoft.com/office/powerpoint/2010/main" val="57422327"/>
-      </p:ext>
-    </p:extLst>
-  </p:cSld>
-  <p:clrMapOvr>
-    <a:masterClrMapping/>
-  </p:clrMapOvr>
-</p:sld>
-</file>
-
-<file path=ppt/slides/slide32.xml><?xml version="1.0" encoding="utf-8"?>
-<p:sld xmlns:a="http://schemas.openxmlformats.org/drawingml/2006/main" xmlns:r="http://schemas.openxmlformats.org/officeDocument/2006/relationships" xmlns:p="http://schemas.openxmlformats.org/presentationml/2006/main">
-  <p:cSld>
-    <p:spTree>
-      <p:nvGrpSpPr>
-        <p:cNvPr id="1" name=""/>
-        <p:cNvGrpSpPr/>
-        <p:nvPr/>
-      </p:nvGrpSpPr>
-      <p:grpSpPr>
-        <a:xfrm>
-          <a:off x="0" y="0"/>
-          <a:ext cx="0" cy="0"/>
-          <a:chOff x="0" y="0"/>
-          <a:chExt cx="0" cy="0"/>
-        </a:xfrm>
-      </p:grpSpPr>
-      <p:pic>
-        <p:nvPicPr>
-          <p:cNvPr id="4" name="Picture 3">
-            <a:extLst>
-              <a:ext uri="{FF2B5EF4-FFF2-40B4-BE49-F238E27FC236}">
-                <a16:creationId xmlns:a16="http://schemas.microsoft.com/office/drawing/2014/main" id="{449380A0-F828-40F6-ABA0-CB684060C995}"/>
-              </a:ext>
-            </a:extLst>
-          </p:cNvPr>
-          <p:cNvPicPr>
-            <a:picLocks noChangeAspect="1"/>
-          </p:cNvPicPr>
-          <p:nvPr/>
-        </p:nvPicPr>
-        <p:blipFill>
-          <a:blip r:embed="rId2"/>
-          <a:stretch>
-            <a:fillRect/>
-          </a:stretch>
-        </p:blipFill>
-        <p:spPr>
-          <a:xfrm>
-            <a:off x="0" y="266843"/>
-            <a:ext cx="9143999" cy="6324314"/>
-          </a:xfrm>
-          <a:prstGeom prst="rect">
-            <a:avLst/>
-          </a:prstGeom>
-        </p:spPr>
-      </p:pic>
-      <p:sp>
-        <p:nvSpPr>
-          <p:cNvPr id="6" name="TextBox 5">
-            <a:extLst>
-              <a:ext uri="{FF2B5EF4-FFF2-40B4-BE49-F238E27FC236}">
-                <a16:creationId xmlns:a16="http://schemas.microsoft.com/office/drawing/2014/main" id="{450BAF91-4632-4A48-A0BC-20AB5D0D29E5}"/>
-              </a:ext>
-            </a:extLst>
-          </p:cNvPr>
-          <p:cNvSpPr txBox="1"/>
-          <p:nvPr/>
-        </p:nvSpPr>
-        <p:spPr>
-          <a:xfrm>
-            <a:off x="543339" y="4258222"/>
-            <a:ext cx="5380383" cy="1754326"/>
-          </a:xfrm>
-          <a:prstGeom prst="rect">
-            <a:avLst/>
-          </a:prstGeom>
-          <a:solidFill>
-            <a:schemeClr val="bg1"/>
-          </a:solidFill>
-        </p:spPr>
-        <p:txBody>
-          <a:bodyPr wrap="square" rtlCol="0" anchor="ctr">
-            <a:spAutoFit/>
-          </a:bodyPr>
-          <a:lstStyle/>
-          <a:p>
-            <a:endParaRPr lang="en-US" sz="3600" dirty="0">
-              <a:latin typeface="Microsoft Sans Serif" panose="020B0604020202020204" pitchFamily="34" charset="0"/>
-              <a:ea typeface="Microsoft Sans Serif" panose="020B0604020202020204" pitchFamily="34" charset="0"/>
-              <a:cs typeface="Microsoft Sans Serif" panose="020B0604020202020204" pitchFamily="34" charset="0"/>
-            </a:endParaRPr>
-          </a:p>
-          <a:p>
-            <a:r>
-              <a:rPr lang="en-US" sz="3600" dirty="0">
-                <a:latin typeface="Microsoft Sans Serif" panose="020B0604020202020204" pitchFamily="34" charset="0"/>
-                <a:ea typeface="Microsoft Sans Serif" panose="020B0604020202020204" pitchFamily="34" charset="0"/>
-                <a:cs typeface="Microsoft Sans Serif" panose="020B0604020202020204" pitchFamily="34" charset="0"/>
-              </a:rPr>
-              <a:t> 5. Conclusion</a:t>
-            </a:r>
-          </a:p>
-          <a:p>
-            <a:endParaRPr lang="en-US" sz="3600" dirty="0">
-              <a:latin typeface="Microsoft Sans Serif" panose="020B0604020202020204" pitchFamily="34" charset="0"/>
-              <a:ea typeface="Microsoft Sans Serif" panose="020B0604020202020204" pitchFamily="34" charset="0"/>
-              <a:cs typeface="Microsoft Sans Serif" panose="020B0604020202020204" pitchFamily="34" charset="0"/>
-            </a:endParaRPr>
-          </a:p>
-        </p:txBody>
-      </p:sp>
-      <p:sp>
-        <p:nvSpPr>
-          <p:cNvPr id="2" name="Slide Number Placeholder 1">
-            <a:extLst>
-              <a:ext uri="{FF2B5EF4-FFF2-40B4-BE49-F238E27FC236}">
-                <a16:creationId xmlns:a16="http://schemas.microsoft.com/office/drawing/2014/main" id="{0C20A05A-1E61-419B-8225-50C27E807A0F}"/>
-              </a:ext>
-            </a:extLst>
-          </p:cNvPr>
-          <p:cNvSpPr>
-            <a:spLocks noGrp="1"/>
-          </p:cNvSpPr>
-          <p:nvPr>
-            <p:ph type="sldNum" sz="quarter" idx="12"/>
-          </p:nvPr>
-        </p:nvSpPr>
-        <p:spPr/>
-        <p:txBody>
-          <a:bodyPr/>
-          <a:lstStyle/>
-          <a:p>
-            <a:fld id="{2BD03CB1-4DB3-405C-876B-B27AD0EBE084}" type="slidenum">
-              <a:rPr lang="en-US" smtClean="0"/>
-              <a:t>32</a:t>
-            </a:fld>
-            <a:endParaRPr lang="en-US"/>
-          </a:p>
-        </p:txBody>
-      </p:sp>
-      <p:sp>
-        <p:nvSpPr>
-          <p:cNvPr id="3" name="Rectangle 2">
-            <a:extLst>
-              <a:ext uri="{FF2B5EF4-FFF2-40B4-BE49-F238E27FC236}">
-                <a16:creationId xmlns:a16="http://schemas.microsoft.com/office/drawing/2014/main" id="{B58459CE-3466-455A-8FD5-9D14FA580553}"/>
-              </a:ext>
-            </a:extLst>
-          </p:cNvPr>
-          <p:cNvSpPr/>
-          <p:nvPr/>
-        </p:nvSpPr>
-        <p:spPr>
-          <a:xfrm>
-            <a:off x="649357" y="4850296"/>
-            <a:ext cx="543339" cy="556591"/>
-          </a:xfrm>
-          <a:prstGeom prst="rect">
-            <a:avLst/>
-          </a:prstGeom>
-          <a:noFill/>
-          <a:ln w="57150">
-            <a:solidFill>
-              <a:srgbClr val="E51836"/>
-            </a:solidFill>
-          </a:ln>
-        </p:spPr>
-        <p:style>
-          <a:lnRef idx="2">
-            <a:schemeClr val="accent1">
-              <a:shade val="50000"/>
-            </a:schemeClr>
-          </a:lnRef>
-          <a:fillRef idx="1">
-            <a:schemeClr val="accent1"/>
-          </a:fillRef>
-          <a:effectRef idx="0">
-            <a:schemeClr val="accent1"/>
-          </a:effectRef>
-          <a:fontRef idx="minor">
-            <a:schemeClr val="lt1"/>
-          </a:fontRef>
-        </p:style>
-        <p:txBody>
-          <a:bodyPr rtlCol="0" anchor="ctr"/>
-          <a:lstStyle/>
-          <a:p>
-            <a:pPr algn="ctr"/>
-            <a:endParaRPr lang="en-US"/>
-          </a:p>
-        </p:txBody>
-      </p:sp>
-      <p:sp>
-        <p:nvSpPr>
-          <p:cNvPr id="7" name="Rectangle 6">
-            <a:extLst>
-              <a:ext uri="{FF2B5EF4-FFF2-40B4-BE49-F238E27FC236}">
-                <a16:creationId xmlns:a16="http://schemas.microsoft.com/office/drawing/2014/main" id="{CE672193-1A1B-4AF5-A2D5-06BD5A09B613}"/>
-              </a:ext>
-            </a:extLst>
-          </p:cNvPr>
-          <p:cNvSpPr/>
-          <p:nvPr/>
-        </p:nvSpPr>
-        <p:spPr>
-          <a:xfrm>
-            <a:off x="649356" y="4572000"/>
-            <a:ext cx="4863548" cy="1166191"/>
-          </a:xfrm>
-          <a:prstGeom prst="rect">
-            <a:avLst/>
-          </a:prstGeom>
-          <a:noFill/>
-          <a:ln w="57150">
-            <a:solidFill>
-              <a:srgbClr val="E51836"/>
-            </a:solidFill>
-          </a:ln>
-        </p:spPr>
-        <p:style>
-          <a:lnRef idx="2">
-            <a:schemeClr val="accent1">
-              <a:shade val="50000"/>
-            </a:schemeClr>
-          </a:lnRef>
-          <a:fillRef idx="1">
-            <a:schemeClr val="accent1"/>
-          </a:fillRef>
-          <a:effectRef idx="0">
-            <a:schemeClr val="accent1"/>
-          </a:effectRef>
-          <a:fontRef idx="minor">
-            <a:schemeClr val="lt1"/>
-          </a:fontRef>
-        </p:style>
-        <p:txBody>
-          <a:bodyPr rtlCol="0" anchor="ctr"/>
-          <a:lstStyle/>
-          <a:p>
-            <a:pPr algn="ctr"/>
-            <a:endParaRPr lang="en-US"/>
-          </a:p>
-        </p:txBody>
-      </p:sp>
-    </p:spTree>
-    <p:extLst>
-      <p:ext uri="{BB962C8B-B14F-4D97-AF65-F5344CB8AC3E}">
-        <p14:creationId xmlns:p14="http://schemas.microsoft.com/office/powerpoint/2010/main" val="3225601204"/>
-      </p:ext>
-    </p:extLst>
-  </p:cSld>
-  <p:clrMapOvr>
-    <a:masterClrMapping/>
-  </p:clrMapOvr>
-</p:sld>
-</file>
-
-<file path=ppt/slides/slide33.xml><?xml version="1.0" encoding="utf-8"?>
-<p:sld xmlns:a="http://schemas.openxmlformats.org/drawingml/2006/main" xmlns:r="http://schemas.openxmlformats.org/officeDocument/2006/relationships" xmlns:p="http://schemas.openxmlformats.org/presentationml/2006/main">
-  <p:cSld>
-    <p:spTree>
-      <p:nvGrpSpPr>
-        <p:cNvPr id="1" name=""/>
-        <p:cNvGrpSpPr/>
-        <p:nvPr/>
-      </p:nvGrpSpPr>
-      <p:grpSpPr>
-        <a:xfrm>
-          <a:off x="0" y="0"/>
-          <a:ext cx="0" cy="0"/>
-          <a:chOff x="0" y="0"/>
-          <a:chExt cx="0" cy="0"/>
-        </a:xfrm>
-      </p:grpSpPr>
-      <p:sp>
-        <p:nvSpPr>
-          <p:cNvPr id="2" name="Title 1">
-            <a:extLst>
-              <a:ext uri="{FF2B5EF4-FFF2-40B4-BE49-F238E27FC236}">
-                <a16:creationId xmlns:a16="http://schemas.microsoft.com/office/drawing/2014/main" id="{A8E5541F-7BFA-479C-B8B4-DDE116914320}"/>
-              </a:ext>
-            </a:extLst>
-          </p:cNvPr>
-          <p:cNvSpPr>
-            <a:spLocks noGrp="1"/>
-          </p:cNvSpPr>
-          <p:nvPr>
-            <p:ph type="title"/>
-          </p:nvPr>
-        </p:nvSpPr>
-        <p:spPr>
-          <a:xfrm>
-            <a:off x="522632" y="58022"/>
-            <a:ext cx="7886700" cy="705648"/>
-          </a:xfrm>
-        </p:spPr>
-        <p:txBody>
-          <a:bodyPr>
-            <a:normAutofit/>
-          </a:bodyPr>
-          <a:lstStyle/>
-          <a:p>
-            <a:r>
-              <a:rPr lang="en-US" sz="3200" dirty="0">
-                <a:latin typeface="Microsoft Sans Serif" panose="020B0604020202020204" pitchFamily="34" charset="0"/>
-                <a:ea typeface="Microsoft Sans Serif" panose="020B0604020202020204" pitchFamily="34" charset="0"/>
-                <a:cs typeface="Microsoft Sans Serif" panose="020B0604020202020204" pitchFamily="34" charset="0"/>
-              </a:rPr>
-              <a:t>Conclusion</a:t>
-            </a:r>
-            <a:endParaRPr lang="en-US" sz="3200" dirty="0"/>
-          </a:p>
-        </p:txBody>
-      </p:sp>
-      <p:pic>
-        <p:nvPicPr>
-          <p:cNvPr id="5" name="Picture 4">
-            <a:extLst>
-              <a:ext uri="{FF2B5EF4-FFF2-40B4-BE49-F238E27FC236}">
-                <a16:creationId xmlns:a16="http://schemas.microsoft.com/office/drawing/2014/main" id="{F112826D-8205-4543-9CA7-8C18E18B2A81}"/>
-              </a:ext>
-            </a:extLst>
-          </p:cNvPr>
-          <p:cNvPicPr>
-            <a:picLocks noChangeAspect="1"/>
-          </p:cNvPicPr>
-          <p:nvPr/>
-        </p:nvPicPr>
-        <p:blipFill>
-          <a:blip r:embed="rId2"/>
-          <a:stretch>
-            <a:fillRect/>
-          </a:stretch>
-        </p:blipFill>
-        <p:spPr>
-          <a:xfrm>
-            <a:off x="0" y="6276894"/>
-            <a:ext cx="1991003" cy="581106"/>
-          </a:xfrm>
-          <a:prstGeom prst="rect">
-            <a:avLst/>
-          </a:prstGeom>
-        </p:spPr>
-      </p:pic>
-      <p:sp>
-        <p:nvSpPr>
-          <p:cNvPr id="8" name="Rectangle 7">
-            <a:extLst>
-              <a:ext uri="{FF2B5EF4-FFF2-40B4-BE49-F238E27FC236}">
-                <a16:creationId xmlns:a16="http://schemas.microsoft.com/office/drawing/2014/main" id="{7819BA35-EE0F-4ABB-BEBA-21534EB9317F}"/>
-              </a:ext>
-            </a:extLst>
-          </p:cNvPr>
-          <p:cNvSpPr/>
-          <p:nvPr/>
-        </p:nvSpPr>
-        <p:spPr>
-          <a:xfrm>
-            <a:off x="522632" y="6276894"/>
-            <a:ext cx="7992717" cy="45719"/>
-          </a:xfrm>
-          <a:prstGeom prst="rect">
-            <a:avLst/>
-          </a:prstGeom>
-          <a:solidFill>
-            <a:srgbClr val="E51836"/>
-          </a:solidFill>
-          <a:ln>
-            <a:solidFill>
-              <a:srgbClr val="E51836"/>
-            </a:solidFill>
-          </a:ln>
-        </p:spPr>
-        <p:style>
-          <a:lnRef idx="2">
-            <a:schemeClr val="accent1">
-              <a:shade val="50000"/>
-            </a:schemeClr>
-          </a:lnRef>
-          <a:fillRef idx="1">
-            <a:schemeClr val="accent1"/>
-          </a:fillRef>
-          <a:effectRef idx="0">
-            <a:schemeClr val="accent1"/>
-          </a:effectRef>
-          <a:fontRef idx="minor">
-            <a:schemeClr val="lt1"/>
-          </a:fontRef>
-        </p:style>
-        <p:txBody>
-          <a:bodyPr rtlCol="0" anchor="ctr"/>
-          <a:lstStyle/>
-          <a:p>
-            <a:pPr algn="ctr"/>
-            <a:endParaRPr lang="en-US"/>
-          </a:p>
-        </p:txBody>
-      </p:sp>
-      <p:cxnSp>
-        <p:nvCxnSpPr>
-          <p:cNvPr id="10" name="Straight Connector 9">
-            <a:extLst>
-              <a:ext uri="{FF2B5EF4-FFF2-40B4-BE49-F238E27FC236}">
-                <a16:creationId xmlns:a16="http://schemas.microsoft.com/office/drawing/2014/main" id="{2A2D717B-FED3-4573-B2FE-57087D39430D}"/>
-              </a:ext>
-            </a:extLst>
-          </p:cNvPr>
-          <p:cNvCxnSpPr/>
-          <p:nvPr/>
-        </p:nvCxnSpPr>
-        <p:spPr>
-          <a:xfrm>
-            <a:off x="522632" y="763670"/>
-            <a:ext cx="7992717" cy="0"/>
-          </a:xfrm>
-          <a:prstGeom prst="line">
-            <a:avLst/>
-          </a:prstGeom>
-          <a:ln>
-            <a:solidFill>
-              <a:srgbClr val="E51836"/>
-            </a:solidFill>
-          </a:ln>
-        </p:spPr>
-        <p:style>
-          <a:lnRef idx="1">
-            <a:schemeClr val="accent1"/>
-          </a:lnRef>
-          <a:fillRef idx="0">
-            <a:schemeClr val="accent1"/>
-          </a:fillRef>
-          <a:effectRef idx="0">
-            <a:schemeClr val="accent1"/>
-          </a:effectRef>
-          <a:fontRef idx="minor">
-            <a:schemeClr val="tx1"/>
-          </a:fontRef>
-        </p:style>
-      </p:cxnSp>
-      <p:sp>
-        <p:nvSpPr>
-          <p:cNvPr id="11" name="Slide Number Placeholder 10">
-            <a:extLst>
-              <a:ext uri="{FF2B5EF4-FFF2-40B4-BE49-F238E27FC236}">
-                <a16:creationId xmlns:a16="http://schemas.microsoft.com/office/drawing/2014/main" id="{3638B894-F5CB-41EC-A4AE-32E1D6A3E77D}"/>
-              </a:ext>
-            </a:extLst>
-          </p:cNvPr>
-          <p:cNvSpPr>
-            <a:spLocks noGrp="1"/>
-          </p:cNvSpPr>
-          <p:nvPr>
-            <p:ph type="sldNum" sz="quarter" idx="12"/>
-          </p:nvPr>
-        </p:nvSpPr>
-        <p:spPr/>
-        <p:txBody>
-          <a:bodyPr/>
-          <a:lstStyle/>
-          <a:p>
-            <a:fld id="{2BD03CB1-4DB3-405C-876B-B27AD0EBE084}" type="slidenum">
-              <a:rPr lang="en-US" smtClean="0"/>
-              <a:t>33</a:t>
-            </a:fld>
-            <a:endParaRPr lang="en-US"/>
-          </a:p>
-        </p:txBody>
-      </p:sp>
-      <p:sp>
-        <p:nvSpPr>
-          <p:cNvPr id="3" name="TextBox 2">
-            <a:extLst>
-              <a:ext uri="{FF2B5EF4-FFF2-40B4-BE49-F238E27FC236}">
-                <a16:creationId xmlns:a16="http://schemas.microsoft.com/office/drawing/2014/main" id="{02C658B5-A6EC-4802-97AA-6D3AE7F71821}"/>
-              </a:ext>
-            </a:extLst>
-          </p:cNvPr>
-          <p:cNvSpPr txBox="1"/>
-          <p:nvPr/>
-        </p:nvSpPr>
-        <p:spPr>
-          <a:xfrm>
-            <a:off x="469623" y="1265565"/>
-            <a:ext cx="7992717" cy="1384995"/>
-          </a:xfrm>
-          <a:prstGeom prst="rect">
-            <a:avLst/>
-          </a:prstGeom>
-          <a:noFill/>
-        </p:spPr>
-        <p:txBody>
-          <a:bodyPr wrap="square" rtlCol="0">
-            <a:spAutoFit/>
-          </a:bodyPr>
-          <a:lstStyle/>
-          <a:p>
-            <a:r>
-              <a:rPr lang="en-US" sz="2100" dirty="0">
-                <a:latin typeface="Microsoft Sans Serif" panose="020B0604020202020204" pitchFamily="34" charset="0"/>
-                <a:ea typeface="Microsoft Sans Serif" panose="020B0604020202020204" pitchFamily="34" charset="0"/>
-                <a:cs typeface="Microsoft Sans Serif" panose="020B0604020202020204" pitchFamily="34" charset="0"/>
-              </a:rPr>
-              <a:t>While we found some interesting correlations between attendance and performance, we could not confirm causation.</a:t>
-            </a:r>
-          </a:p>
-          <a:p>
-            <a:endParaRPr lang="en-US" sz="2100" dirty="0">
-              <a:latin typeface="Microsoft Sans Serif" panose="020B0604020202020204" pitchFamily="34" charset="0"/>
-              <a:ea typeface="Microsoft Sans Serif" panose="020B0604020202020204" pitchFamily="34" charset="0"/>
-              <a:cs typeface="Microsoft Sans Serif" panose="020B0604020202020204" pitchFamily="34" charset="0"/>
-            </a:endParaRPr>
-          </a:p>
-          <a:p>
-            <a:r>
-              <a:rPr lang="en-US" sz="2100" dirty="0">
-                <a:latin typeface="Microsoft Sans Serif" panose="020B0604020202020204" pitchFamily="34" charset="0"/>
-                <a:ea typeface="Microsoft Sans Serif" panose="020B0604020202020204" pitchFamily="34" charset="0"/>
-                <a:cs typeface="Microsoft Sans Serif" panose="020B0604020202020204" pitchFamily="34" charset="0"/>
-              </a:rPr>
-              <a:t>We’ll be watching along with everyone else!</a:t>
-            </a:r>
-          </a:p>
-        </p:txBody>
-      </p:sp>
     </p:spTree>
     <p:extLst>
       <p:ext uri="{BB962C8B-B14F-4D97-AF65-F5344CB8AC3E}">

</xml_diff>

<commit_message>
corrected error in file
</commit_message>
<xml_diff>
--- a/Final Report/Rutgers DS Bootcamp - The Five Guys  - Project 1 - Report.pptx
+++ b/Final Report/Rutgers DS Bootcamp - The Five Guys  - Project 1 - Report.pptx
@@ -2592,7 +2592,7 @@
               <a:ea typeface="Microsoft Sans Serif" panose="020B0604020202020204" pitchFamily="34" charset="0"/>
               <a:cs typeface="Microsoft Sans Serif" panose="020B0604020202020204" pitchFamily="34" charset="0"/>
             </a:rPr>
-            <a:t>Data Engineer</a:t>
+            <a:t>Analytics</a:t>
           </a:r>
         </a:p>
       </dgm:t>
@@ -2609,51 +2609,6 @@
       </dgm:t>
     </dgm:pt>
     <dgm:pt modelId="{26C3B15B-BE9F-4BB7-94F3-B5E8F3C58EEC}" type="sibTrans" cxnId="{116CA104-BCFD-47B6-8972-BCF513082CDA}">
-      <dgm:prSet/>
-      <dgm:spPr/>
-      <dgm:t>
-        <a:bodyPr/>
-        <a:lstStyle/>
-        <a:p>
-          <a:endParaRPr lang="en-US"/>
-        </a:p>
-      </dgm:t>
-    </dgm:pt>
-    <dgm:pt modelId="{9272A05F-BAED-4E97-AF45-07F0B0FDBF9D}">
-      <dgm:prSet custT="1"/>
-      <dgm:spPr>
-        <a:solidFill>
-          <a:srgbClr val="E51836"/>
-        </a:solidFill>
-      </dgm:spPr>
-      <dgm:t>
-        <a:bodyPr/>
-        <a:lstStyle/>
-        <a:p>
-          <a:pPr algn="ctr"/>
-          <a:r>
-            <a:rPr lang="en-US" sz="1600" dirty="0">
-              <a:latin typeface="Microsoft Sans Serif" panose="020B0604020202020204" pitchFamily="34" charset="0"/>
-              <a:ea typeface="Microsoft Sans Serif" panose="020B0604020202020204" pitchFamily="34" charset="0"/>
-              <a:cs typeface="Microsoft Sans Serif" panose="020B0604020202020204" pitchFamily="34" charset="0"/>
-            </a:rPr>
-            <a:t>Analytics</a:t>
-          </a:r>
-        </a:p>
-      </dgm:t>
-    </dgm:pt>
-    <dgm:pt modelId="{44F86146-2D9A-4EAE-BCE7-BC7C3EDDE9BB}" type="parTrans" cxnId="{9A1E9410-3266-450D-ABDF-A6FE4B6FC645}">
-      <dgm:prSet/>
-      <dgm:spPr/>
-      <dgm:t>
-        <a:bodyPr/>
-        <a:lstStyle/>
-        <a:p>
-          <a:endParaRPr lang="en-US"/>
-        </a:p>
-      </dgm:t>
-    </dgm:pt>
-    <dgm:pt modelId="{CA97E709-309D-47A5-AC1F-F8E207BFD10C}" type="sibTrans" cxnId="{9A1E9410-3266-450D-ABDF-A6FE4B6FC645}">
       <dgm:prSet/>
       <dgm:spPr/>
       <dgm:t>
@@ -2844,7 +2799,6 @@
     <dgm:cxn modelId="{330FCA03-021C-4F5E-84E5-1A0523EA073B}" type="presOf" srcId="{D3B56637-6FFE-4734-9800-7A942A45703C}" destId="{9B3F112B-DBB2-466F-A9E3-DD433547D895}" srcOrd="0" destOrd="0" presId="urn:microsoft.com/office/officeart/2005/8/layout/hList6"/>
     <dgm:cxn modelId="{116CA104-BCFD-47B6-8972-BCF513082CDA}" srcId="{CD88B88A-F6D4-496C-891A-33B0DB8D1980}" destId="{A6714F0D-6D5F-4EB5-957F-F38F81FF10CA}" srcOrd="0" destOrd="0" parTransId="{4E1B275E-4E00-4412-9207-21FDE0DB2D14}" sibTransId="{26C3B15B-BE9F-4BB7-94F3-B5E8F3C58EEC}"/>
     <dgm:cxn modelId="{5474B40C-ACE4-478F-8370-7CFF68AEEE28}" srcId="{D3B56637-6FFE-4734-9800-7A942A45703C}" destId="{46F75198-F2E7-47CA-9545-BBDC1679BE4D}" srcOrd="2" destOrd="0" parTransId="{81BAAA64-3C1A-445F-B149-6EBEF8234D68}" sibTransId="{697C2AC6-4305-4009-9863-55368925625C}"/>
-    <dgm:cxn modelId="{9A1E9410-3266-450D-ABDF-A6FE4B6FC645}" srcId="{CD88B88A-F6D4-496C-891A-33B0DB8D1980}" destId="{9272A05F-BAED-4E97-AF45-07F0B0FDBF9D}" srcOrd="1" destOrd="0" parTransId="{44F86146-2D9A-4EAE-BCE7-BC7C3EDDE9BB}" sibTransId="{CA97E709-309D-47A5-AC1F-F8E207BFD10C}"/>
     <dgm:cxn modelId="{6BFAD112-7010-41A5-8A4E-8467B1F2CD24}" type="presOf" srcId="{CD88B88A-F6D4-496C-891A-33B0DB8D1980}" destId="{1A663A11-36E9-4A25-8109-6B76BCDA23A3}" srcOrd="0" destOrd="0" presId="urn:microsoft.com/office/officeart/2005/8/layout/hList6"/>
     <dgm:cxn modelId="{8B704626-9FC2-42D3-A47F-A593B45E6AF2}" srcId="{F45C95AF-5494-427D-A9D8-C6F639224F91}" destId="{CBF8DA3E-845D-4D28-AEFF-FF3F70D77D4F}" srcOrd="0" destOrd="0" parTransId="{84AD8FC3-7C03-44B3-83ED-AD9F60B31CCA}" sibTransId="{26BC71EB-3CBA-4090-866F-5A81EF721D8C}"/>
     <dgm:cxn modelId="{6D86B93F-B09D-425D-AC3A-41BB42700B56}" srcId="{BA21973E-44AC-4B32-A052-C646DECB4126}" destId="{29FC8FFF-CA09-4A1D-9BCD-25AEF53BCDB0}" srcOrd="1" destOrd="0" parTransId="{1D755699-04F3-41CD-80E0-C2DD0704923C}" sibTransId="{B5D8D090-DC86-485A-AB75-55A708160104}"/>
@@ -2862,7 +2816,6 @@
     <dgm:cxn modelId="{387E29B3-380F-4CE9-89C2-A5C9E8C1CEB1}" srcId="{46F75198-F2E7-47CA-9545-BBDC1679BE4D}" destId="{28675A94-9C0D-436E-B8DD-EE956D2D09A9}" srcOrd="0" destOrd="0" parTransId="{022AD952-108F-463D-84BE-E4670C7C49F0}" sibTransId="{3B839633-494F-4D39-9AD4-959C1F2FA269}"/>
     <dgm:cxn modelId="{958ADAC4-5B0A-4A67-8731-187ACCEC8F90}" type="presOf" srcId="{28675A94-9C0D-436E-B8DD-EE956D2D09A9}" destId="{BC8F177E-C5B6-465C-8760-31443F5C675A}" srcOrd="0" destOrd="1" presId="urn:microsoft.com/office/officeart/2005/8/layout/hList6"/>
     <dgm:cxn modelId="{DF79B3CA-F287-4C06-8587-A82F8D6CC218}" type="presOf" srcId="{29FC8FFF-CA09-4A1D-9BCD-25AEF53BCDB0}" destId="{4BD7E8D0-F5E4-437F-912F-0EEF2F755AA9}" srcOrd="0" destOrd="2" presId="urn:microsoft.com/office/officeart/2005/8/layout/hList6"/>
-    <dgm:cxn modelId="{0F36C0CF-9ACE-4894-863D-EF86C308A10E}" type="presOf" srcId="{9272A05F-BAED-4E97-AF45-07F0B0FDBF9D}" destId="{1A663A11-36E9-4A25-8109-6B76BCDA23A3}" srcOrd="0" destOrd="2" presId="urn:microsoft.com/office/officeart/2005/8/layout/hList6"/>
     <dgm:cxn modelId="{76F94ED7-6D9F-4CE2-B9B4-FC11464431A6}" srcId="{D3B56637-6FFE-4734-9800-7A942A45703C}" destId="{F45C95AF-5494-427D-A9D8-C6F639224F91}" srcOrd="1" destOrd="0" parTransId="{C02A4772-184C-429B-AB08-BB0851D4D407}" sibTransId="{40D65230-12D8-4C97-847B-15CA0B3B0A6F}"/>
     <dgm:cxn modelId="{9BE182DA-D94C-44A8-BE11-371A03F64279}" srcId="{D3B56637-6FFE-4734-9800-7A942A45703C}" destId="{BA21973E-44AC-4B32-A052-C646DECB4126}" srcOrd="4" destOrd="0" parTransId="{640960F2-3774-4B88-8BDE-982EE8BA8481}" sibTransId="{358B68C0-A336-4069-B81C-AF8872E40842}"/>
     <dgm:cxn modelId="{EC9309F0-0321-4CB3-BBBC-937A5E448028}" type="presOf" srcId="{7B6CFDE3-DAFC-44CF-B2B1-C3E8C8FD6B0A}" destId="{4BD7E8D0-F5E4-437F-912F-0EEF2F755AA9}" srcOrd="0" destOrd="1" presId="urn:microsoft.com/office/officeart/2005/8/layout/hList6"/>
@@ -3443,28 +3396,6 @@
               <a:cs typeface="Microsoft Sans Serif" panose="020B0604020202020204" pitchFamily="34" charset="0"/>
             </a:rPr>
             <a:t>Leckner</a:t>
-          </a:r>
-        </a:p>
-        <a:p>
-          <a:pPr marL="171450" lvl="1" indent="-171450" algn="ctr" defTabSz="711200">
-            <a:lnSpc>
-              <a:spcPct val="90000"/>
-            </a:lnSpc>
-            <a:spcBef>
-              <a:spcPct val="0"/>
-            </a:spcBef>
-            <a:spcAft>
-              <a:spcPct val="15000"/>
-            </a:spcAft>
-            <a:buChar char="•"/>
-          </a:pPr>
-          <a:r>
-            <a:rPr lang="en-US" sz="1600" kern="1200" dirty="0">
-              <a:latin typeface="Microsoft Sans Serif" panose="020B0604020202020204" pitchFamily="34" charset="0"/>
-              <a:ea typeface="Microsoft Sans Serif" panose="020B0604020202020204" pitchFamily="34" charset="0"/>
-              <a:cs typeface="Microsoft Sans Serif" panose="020B0604020202020204" pitchFamily="34" charset="0"/>
-            </a:rPr>
-            <a:t>Data Engineer</a:t>
           </a:r>
         </a:p>
         <a:p>
@@ -9763,80 +9694,10 @@
       </p:grpSpPr>
       <p:sp>
         <p:nvSpPr>
-          <p:cNvPr id="2" name="Title 1">
-            <a:extLst>
-              <a:ext uri="{FF2B5EF4-FFF2-40B4-BE49-F238E27FC236}">
-                <a16:creationId xmlns:a16="http://schemas.microsoft.com/office/drawing/2014/main" id="{A8E5541F-7BFA-479C-B8B4-DDE116914320}"/>
-              </a:ext>
-            </a:extLst>
-          </p:cNvPr>
-          <p:cNvSpPr>
-            <a:spLocks noGrp="1"/>
-          </p:cNvSpPr>
-          <p:nvPr>
-            <p:ph type="title"/>
-          </p:nvPr>
-        </p:nvSpPr>
-        <p:spPr>
-          <a:xfrm>
-            <a:off x="522632" y="58022"/>
-            <a:ext cx="7886700" cy="705648"/>
-          </a:xfrm>
-        </p:spPr>
-        <p:txBody>
-          <a:bodyPr>
-            <a:normAutofit/>
-          </a:bodyPr>
-          <a:lstStyle/>
-          <a:p>
-            <a:r>
-              <a:rPr lang="en-US" sz="3200" dirty="0">
-                <a:latin typeface="Microsoft Sans Serif" panose="020B0604020202020204" pitchFamily="34" charset="0"/>
-                <a:ea typeface="Microsoft Sans Serif" panose="020B0604020202020204" pitchFamily="34" charset="0"/>
-                <a:cs typeface="Microsoft Sans Serif" panose="020B0604020202020204" pitchFamily="34" charset="0"/>
-              </a:rPr>
-              <a:t>Data Assembly </a:t>
-            </a:r>
-            <a:endParaRPr lang="en-US" sz="3200" dirty="0"/>
-          </a:p>
-        </p:txBody>
-      </p:sp>
-      <p:pic>
-        <p:nvPicPr>
-          <p:cNvPr id="5" name="Picture 4">
-            <a:extLst>
-              <a:ext uri="{FF2B5EF4-FFF2-40B4-BE49-F238E27FC236}">
-                <a16:creationId xmlns:a16="http://schemas.microsoft.com/office/drawing/2014/main" id="{F112826D-8205-4543-9CA7-8C18E18B2A81}"/>
-              </a:ext>
-            </a:extLst>
-          </p:cNvPr>
-          <p:cNvPicPr>
-            <a:picLocks noChangeAspect="1"/>
-          </p:cNvPicPr>
-          <p:nvPr/>
-        </p:nvPicPr>
-        <p:blipFill>
-          <a:blip r:embed="rId2"/>
-          <a:stretch>
-            <a:fillRect/>
-          </a:stretch>
-        </p:blipFill>
-        <p:spPr>
-          <a:xfrm>
-            <a:off x="0" y="6276894"/>
-            <a:ext cx="1991003" cy="581106"/>
-          </a:xfrm>
-          <a:prstGeom prst="rect">
-            <a:avLst/>
-          </a:prstGeom>
-        </p:spPr>
-      </p:pic>
-      <p:sp>
-        <p:nvSpPr>
-          <p:cNvPr id="8" name="Rectangle 7">
-            <a:extLst>
-              <a:ext uri="{FF2B5EF4-FFF2-40B4-BE49-F238E27FC236}">
-                <a16:creationId xmlns:a16="http://schemas.microsoft.com/office/drawing/2014/main" id="{7819BA35-EE0F-4ABB-BEBA-21534EB9317F}"/>
+          <p:cNvPr id="12" name="Rectangle 11">
+            <a:extLst>
+              <a:ext uri="{FF2B5EF4-FFF2-40B4-BE49-F238E27FC236}">
+                <a16:creationId xmlns:a16="http://schemas.microsoft.com/office/drawing/2014/main" id="{4E762182-91BD-42B3-823C-9E4E1EE07984}"/>
               </a:ext>
             </a:extLst>
           </p:cNvPr>
@@ -9845,20 +9706,17 @@
         </p:nvSpPr>
         <p:spPr>
           <a:xfrm>
-            <a:off x="522632" y="6276894"/>
-            <a:ext cx="7992717" cy="45719"/>
+            <a:off x="408923" y="2503063"/>
+            <a:ext cx="8212445" cy="3101225"/>
           </a:xfrm>
           <a:prstGeom prst="rect">
             <a:avLst/>
           </a:prstGeom>
           <a:solidFill>
-            <a:srgbClr val="E51836"/>
+            <a:srgbClr val="E51836">
+              <a:alpha val="92000"/>
+            </a:srgbClr>
           </a:solidFill>
-          <a:ln>
-            <a:solidFill>
-              <a:srgbClr val="E51836"/>
-            </a:solidFill>
-          </a:ln>
         </p:spPr>
         <p:style>
           <a:lnRef idx="2">
@@ -9885,6 +9743,130 @@
           </a:p>
         </p:txBody>
       </p:sp>
+      <p:sp>
+        <p:nvSpPr>
+          <p:cNvPr id="2" name="Title 1">
+            <a:extLst>
+              <a:ext uri="{FF2B5EF4-FFF2-40B4-BE49-F238E27FC236}">
+                <a16:creationId xmlns:a16="http://schemas.microsoft.com/office/drawing/2014/main" id="{A8E5541F-7BFA-479C-B8B4-DDE116914320}"/>
+              </a:ext>
+            </a:extLst>
+          </p:cNvPr>
+          <p:cNvSpPr>
+            <a:spLocks noGrp="1"/>
+          </p:cNvSpPr>
+          <p:nvPr>
+            <p:ph type="title"/>
+          </p:nvPr>
+        </p:nvSpPr>
+        <p:spPr>
+          <a:xfrm>
+            <a:off x="522632" y="58022"/>
+            <a:ext cx="7886700" cy="705648"/>
+          </a:xfrm>
+        </p:spPr>
+        <p:txBody>
+          <a:bodyPr>
+            <a:normAutofit/>
+          </a:bodyPr>
+          <a:lstStyle/>
+          <a:p>
+            <a:r>
+              <a:rPr lang="en-US" sz="3200" dirty="0">
+                <a:latin typeface="Microsoft Sans Serif" panose="020B0604020202020204" pitchFamily="34" charset="0"/>
+                <a:ea typeface="Microsoft Sans Serif" panose="020B0604020202020204" pitchFamily="34" charset="0"/>
+                <a:cs typeface="Microsoft Sans Serif" panose="020B0604020202020204" pitchFamily="34" charset="0"/>
+              </a:rPr>
+              <a:t>Data Assembly </a:t>
+            </a:r>
+            <a:endParaRPr lang="en-US" sz="3200" dirty="0"/>
+          </a:p>
+        </p:txBody>
+      </p:sp>
+      <p:pic>
+        <p:nvPicPr>
+          <p:cNvPr id="5" name="Picture 4">
+            <a:extLst>
+              <a:ext uri="{FF2B5EF4-FFF2-40B4-BE49-F238E27FC236}">
+                <a16:creationId xmlns:a16="http://schemas.microsoft.com/office/drawing/2014/main" id="{F112826D-8205-4543-9CA7-8C18E18B2A81}"/>
+              </a:ext>
+            </a:extLst>
+          </p:cNvPr>
+          <p:cNvPicPr>
+            <a:picLocks noChangeAspect="1"/>
+          </p:cNvPicPr>
+          <p:nvPr/>
+        </p:nvPicPr>
+        <p:blipFill>
+          <a:blip r:embed="rId2"/>
+          <a:stretch>
+            <a:fillRect/>
+          </a:stretch>
+        </p:blipFill>
+        <p:spPr>
+          <a:xfrm>
+            <a:off x="0" y="6276894"/>
+            <a:ext cx="1991003" cy="581106"/>
+          </a:xfrm>
+          <a:prstGeom prst="rect">
+            <a:avLst/>
+          </a:prstGeom>
+        </p:spPr>
+      </p:pic>
+      <p:sp>
+        <p:nvSpPr>
+          <p:cNvPr id="8" name="Rectangle 7">
+            <a:extLst>
+              <a:ext uri="{FF2B5EF4-FFF2-40B4-BE49-F238E27FC236}">
+                <a16:creationId xmlns:a16="http://schemas.microsoft.com/office/drawing/2014/main" id="{7819BA35-EE0F-4ABB-BEBA-21534EB9317F}"/>
+              </a:ext>
+            </a:extLst>
+          </p:cNvPr>
+          <p:cNvSpPr/>
+          <p:nvPr/>
+        </p:nvSpPr>
+        <p:spPr>
+          <a:xfrm>
+            <a:off x="522632" y="6276894"/>
+            <a:ext cx="7992717" cy="45719"/>
+          </a:xfrm>
+          <a:prstGeom prst="rect">
+            <a:avLst/>
+          </a:prstGeom>
+          <a:solidFill>
+            <a:srgbClr val="E51836"/>
+          </a:solidFill>
+          <a:ln>
+            <a:solidFill>
+              <a:srgbClr val="E51836"/>
+            </a:solidFill>
+          </a:ln>
+        </p:spPr>
+        <p:style>
+          <a:lnRef idx="2">
+            <a:schemeClr val="accent1">
+              <a:shade val="50000"/>
+            </a:schemeClr>
+          </a:lnRef>
+          <a:fillRef idx="1">
+            <a:schemeClr val="accent1"/>
+          </a:fillRef>
+          <a:effectRef idx="0">
+            <a:schemeClr val="accent1"/>
+          </a:effectRef>
+          <a:fontRef idx="minor">
+            <a:schemeClr val="lt1"/>
+          </a:fontRef>
+        </p:style>
+        <p:txBody>
+          <a:bodyPr rtlCol="0" anchor="ctr"/>
+          <a:lstStyle/>
+          <a:p>
+            <a:pPr algn="ctr"/>
+            <a:endParaRPr lang="en-US"/>
+          </a:p>
+        </p:txBody>
+      </p:sp>
       <p:cxnSp>
         <p:nvCxnSpPr>
           <p:cNvPr id="10" name="Straight Connector 9">
@@ -10008,10 +9990,10 @@
         </p:nvGrpSpPr>
         <p:grpSpPr>
           <a:xfrm>
-            <a:off x="522631" y="2605756"/>
-            <a:ext cx="7992717" cy="2885413"/>
-            <a:chOff x="1351485" y="2804185"/>
-            <a:chExt cx="6639852" cy="1908511"/>
+            <a:off x="522631" y="2623710"/>
+            <a:ext cx="7992717" cy="2867460"/>
+            <a:chOff x="1351485" y="2816060"/>
+            <a:chExt cx="6639852" cy="1896636"/>
           </a:xfrm>
         </p:grpSpPr>
         <p:pic>
@@ -10036,7 +10018,7 @@
           </p:blipFill>
           <p:spPr>
             <a:xfrm>
-              <a:off x="1351485" y="2804185"/>
+              <a:off x="1500713" y="2816060"/>
               <a:ext cx="6335009" cy="676369"/>
             </a:xfrm>
             <a:prstGeom prst="rect">
@@ -10107,80 +10089,10 @@
       </p:grpSpPr>
       <p:sp>
         <p:nvSpPr>
-          <p:cNvPr id="2" name="Title 1">
-            <a:extLst>
-              <a:ext uri="{FF2B5EF4-FFF2-40B4-BE49-F238E27FC236}">
-                <a16:creationId xmlns:a16="http://schemas.microsoft.com/office/drawing/2014/main" id="{A8E5541F-7BFA-479C-B8B4-DDE116914320}"/>
-              </a:ext>
-            </a:extLst>
-          </p:cNvPr>
-          <p:cNvSpPr>
-            <a:spLocks noGrp="1"/>
-          </p:cNvSpPr>
-          <p:nvPr>
-            <p:ph type="title"/>
-          </p:nvPr>
-        </p:nvSpPr>
-        <p:spPr>
-          <a:xfrm>
-            <a:off x="522632" y="58022"/>
-            <a:ext cx="7886700" cy="705648"/>
-          </a:xfrm>
-        </p:spPr>
-        <p:txBody>
-          <a:bodyPr>
-            <a:normAutofit/>
-          </a:bodyPr>
-          <a:lstStyle/>
-          <a:p>
-            <a:r>
-              <a:rPr lang="en-US" sz="3200" dirty="0">
-                <a:latin typeface="Microsoft Sans Serif" panose="020B0604020202020204" pitchFamily="34" charset="0"/>
-                <a:ea typeface="Microsoft Sans Serif" panose="020B0604020202020204" pitchFamily="34" charset="0"/>
-                <a:cs typeface="Microsoft Sans Serif" panose="020B0604020202020204" pitchFamily="34" charset="0"/>
-              </a:rPr>
-              <a:t>Data Assembly </a:t>
-            </a:r>
-            <a:endParaRPr lang="en-US" sz="3200" dirty="0"/>
-          </a:p>
-        </p:txBody>
-      </p:sp>
-      <p:pic>
-        <p:nvPicPr>
-          <p:cNvPr id="5" name="Picture 4">
-            <a:extLst>
-              <a:ext uri="{FF2B5EF4-FFF2-40B4-BE49-F238E27FC236}">
-                <a16:creationId xmlns:a16="http://schemas.microsoft.com/office/drawing/2014/main" id="{F112826D-8205-4543-9CA7-8C18E18B2A81}"/>
-              </a:ext>
-            </a:extLst>
-          </p:cNvPr>
-          <p:cNvPicPr>
-            <a:picLocks noChangeAspect="1"/>
-          </p:cNvPicPr>
-          <p:nvPr/>
-        </p:nvPicPr>
-        <p:blipFill>
-          <a:blip r:embed="rId2"/>
-          <a:stretch>
-            <a:fillRect/>
-          </a:stretch>
-        </p:blipFill>
-        <p:spPr>
-          <a:xfrm>
-            <a:off x="0" y="6276894"/>
-            <a:ext cx="1991003" cy="581106"/>
-          </a:xfrm>
-          <a:prstGeom prst="rect">
-            <a:avLst/>
-          </a:prstGeom>
-        </p:spPr>
-      </p:pic>
-      <p:sp>
-        <p:nvSpPr>
-          <p:cNvPr id="8" name="Rectangle 7">
-            <a:extLst>
-              <a:ext uri="{FF2B5EF4-FFF2-40B4-BE49-F238E27FC236}">
-                <a16:creationId xmlns:a16="http://schemas.microsoft.com/office/drawing/2014/main" id="{7819BA35-EE0F-4ABB-BEBA-21534EB9317F}"/>
+          <p:cNvPr id="12" name="Rectangle 11">
+            <a:extLst>
+              <a:ext uri="{FF2B5EF4-FFF2-40B4-BE49-F238E27FC236}">
+                <a16:creationId xmlns:a16="http://schemas.microsoft.com/office/drawing/2014/main" id="{0A876C1D-A6AF-4845-B1F4-D8B9B1963EDC}"/>
               </a:ext>
             </a:extLst>
           </p:cNvPr>
@@ -10189,20 +10101,17 @@
         </p:nvSpPr>
         <p:spPr>
           <a:xfrm>
-            <a:off x="522632" y="6276894"/>
-            <a:ext cx="7992717" cy="45719"/>
+            <a:off x="4465982" y="1067094"/>
+            <a:ext cx="3943350" cy="4617023"/>
           </a:xfrm>
           <a:prstGeom prst="rect">
             <a:avLst/>
           </a:prstGeom>
           <a:solidFill>
-            <a:srgbClr val="E51836"/>
+            <a:srgbClr val="E51836">
+              <a:alpha val="92000"/>
+            </a:srgbClr>
           </a:solidFill>
-          <a:ln>
-            <a:solidFill>
-              <a:srgbClr val="E51836"/>
-            </a:solidFill>
-          </a:ln>
         </p:spPr>
         <p:style>
           <a:lnRef idx="2">
@@ -10229,6 +10138,181 @@
           </a:p>
         </p:txBody>
       </p:sp>
+      <p:sp>
+        <p:nvSpPr>
+          <p:cNvPr id="6" name="Rectangle 5">
+            <a:extLst>
+              <a:ext uri="{FF2B5EF4-FFF2-40B4-BE49-F238E27FC236}">
+                <a16:creationId xmlns:a16="http://schemas.microsoft.com/office/drawing/2014/main" id="{22549ACC-C78E-4D46-BC7B-5EE8EC2D3A3B}"/>
+              </a:ext>
+            </a:extLst>
+          </p:cNvPr>
+          <p:cNvSpPr/>
+          <p:nvPr/>
+        </p:nvSpPr>
+        <p:spPr>
+          <a:xfrm>
+            <a:off x="424070" y="2544417"/>
+            <a:ext cx="3631095" cy="1586916"/>
+          </a:xfrm>
+          <a:prstGeom prst="rect">
+            <a:avLst/>
+          </a:prstGeom>
+          <a:solidFill>
+            <a:srgbClr val="E51836">
+              <a:alpha val="92000"/>
+            </a:srgbClr>
+          </a:solidFill>
+        </p:spPr>
+        <p:style>
+          <a:lnRef idx="2">
+            <a:schemeClr val="accent1">
+              <a:shade val="50000"/>
+            </a:schemeClr>
+          </a:lnRef>
+          <a:fillRef idx="1">
+            <a:schemeClr val="accent1"/>
+          </a:fillRef>
+          <a:effectRef idx="0">
+            <a:schemeClr val="accent1"/>
+          </a:effectRef>
+          <a:fontRef idx="minor">
+            <a:schemeClr val="lt1"/>
+          </a:fontRef>
+        </p:style>
+        <p:txBody>
+          <a:bodyPr rtlCol="0" anchor="ctr"/>
+          <a:lstStyle/>
+          <a:p>
+            <a:pPr algn="ctr"/>
+            <a:endParaRPr lang="en-US"/>
+          </a:p>
+        </p:txBody>
+      </p:sp>
+      <p:sp>
+        <p:nvSpPr>
+          <p:cNvPr id="2" name="Title 1">
+            <a:extLst>
+              <a:ext uri="{FF2B5EF4-FFF2-40B4-BE49-F238E27FC236}">
+                <a16:creationId xmlns:a16="http://schemas.microsoft.com/office/drawing/2014/main" id="{A8E5541F-7BFA-479C-B8B4-DDE116914320}"/>
+              </a:ext>
+            </a:extLst>
+          </p:cNvPr>
+          <p:cNvSpPr>
+            <a:spLocks noGrp="1"/>
+          </p:cNvSpPr>
+          <p:nvPr>
+            <p:ph type="title"/>
+          </p:nvPr>
+        </p:nvSpPr>
+        <p:spPr>
+          <a:xfrm>
+            <a:off x="522632" y="58022"/>
+            <a:ext cx="7886700" cy="705648"/>
+          </a:xfrm>
+        </p:spPr>
+        <p:txBody>
+          <a:bodyPr>
+            <a:normAutofit/>
+          </a:bodyPr>
+          <a:lstStyle/>
+          <a:p>
+            <a:r>
+              <a:rPr lang="en-US" sz="3200" dirty="0">
+                <a:latin typeface="Microsoft Sans Serif" panose="020B0604020202020204" pitchFamily="34" charset="0"/>
+                <a:ea typeface="Microsoft Sans Serif" panose="020B0604020202020204" pitchFamily="34" charset="0"/>
+                <a:cs typeface="Microsoft Sans Serif" panose="020B0604020202020204" pitchFamily="34" charset="0"/>
+              </a:rPr>
+              <a:t>Data Assembly </a:t>
+            </a:r>
+            <a:endParaRPr lang="en-US" sz="3200" dirty="0"/>
+          </a:p>
+        </p:txBody>
+      </p:sp>
+      <p:pic>
+        <p:nvPicPr>
+          <p:cNvPr id="5" name="Picture 4">
+            <a:extLst>
+              <a:ext uri="{FF2B5EF4-FFF2-40B4-BE49-F238E27FC236}">
+                <a16:creationId xmlns:a16="http://schemas.microsoft.com/office/drawing/2014/main" id="{F112826D-8205-4543-9CA7-8C18E18B2A81}"/>
+              </a:ext>
+            </a:extLst>
+          </p:cNvPr>
+          <p:cNvPicPr>
+            <a:picLocks noChangeAspect="1"/>
+          </p:cNvPicPr>
+          <p:nvPr/>
+        </p:nvPicPr>
+        <p:blipFill>
+          <a:blip r:embed="rId2"/>
+          <a:stretch>
+            <a:fillRect/>
+          </a:stretch>
+        </p:blipFill>
+        <p:spPr>
+          <a:xfrm>
+            <a:off x="0" y="6276894"/>
+            <a:ext cx="1991003" cy="581106"/>
+          </a:xfrm>
+          <a:prstGeom prst="rect">
+            <a:avLst/>
+          </a:prstGeom>
+        </p:spPr>
+      </p:pic>
+      <p:sp>
+        <p:nvSpPr>
+          <p:cNvPr id="8" name="Rectangle 7">
+            <a:extLst>
+              <a:ext uri="{FF2B5EF4-FFF2-40B4-BE49-F238E27FC236}">
+                <a16:creationId xmlns:a16="http://schemas.microsoft.com/office/drawing/2014/main" id="{7819BA35-EE0F-4ABB-BEBA-21534EB9317F}"/>
+              </a:ext>
+            </a:extLst>
+          </p:cNvPr>
+          <p:cNvSpPr/>
+          <p:nvPr/>
+        </p:nvSpPr>
+        <p:spPr>
+          <a:xfrm>
+            <a:off x="522632" y="6276894"/>
+            <a:ext cx="7992717" cy="45719"/>
+          </a:xfrm>
+          <a:prstGeom prst="rect">
+            <a:avLst/>
+          </a:prstGeom>
+          <a:solidFill>
+            <a:srgbClr val="E51836"/>
+          </a:solidFill>
+          <a:ln>
+            <a:solidFill>
+              <a:srgbClr val="E51836"/>
+            </a:solidFill>
+          </a:ln>
+        </p:spPr>
+        <p:style>
+          <a:lnRef idx="2">
+            <a:schemeClr val="accent1">
+              <a:shade val="50000"/>
+            </a:schemeClr>
+          </a:lnRef>
+          <a:fillRef idx="1">
+            <a:schemeClr val="accent1"/>
+          </a:fillRef>
+          <a:effectRef idx="0">
+            <a:schemeClr val="accent1"/>
+          </a:effectRef>
+          <a:fontRef idx="minor">
+            <a:schemeClr val="lt1"/>
+          </a:fontRef>
+        </p:style>
+        <p:txBody>
+          <a:bodyPr rtlCol="0" anchor="ctr"/>
+          <a:lstStyle/>
+          <a:p>
+            <a:pPr algn="ctr"/>
+            <a:endParaRPr lang="en-US"/>
+          </a:p>
+        </p:txBody>
+      </p:sp>
       <p:cxnSp>
         <p:nvCxnSpPr>
           <p:cNvPr id="10" name="Straight Connector 9">
@@ -10329,6 +10413,9 @@
           <a:p>
             <a:r>
               <a:rPr lang="en-US" sz="2100" dirty="0">
+                <a:solidFill>
+                  <a:schemeClr val="bg1"/>
+                </a:solidFill>
                 <a:latin typeface="Microsoft Sans Serif" panose="020B0604020202020204" pitchFamily="34" charset="0"/>
                 <a:ea typeface="Microsoft Sans Serif" panose="020B0604020202020204" pitchFamily="34" charset="0"/>
                 <a:cs typeface="Microsoft Sans Serif" panose="020B0604020202020204" pitchFamily="34" charset="0"/>
@@ -10360,7 +10447,7 @@
         </p:blipFill>
         <p:spPr>
           <a:xfrm>
-            <a:off x="4465982" y="1128161"/>
+            <a:off x="4513338" y="1128779"/>
             <a:ext cx="3848637" cy="4525006"/>
           </a:xfrm>
           <a:prstGeom prst="rect">
@@ -10400,80 +10487,10 @@
       </p:grpSpPr>
       <p:sp>
         <p:nvSpPr>
-          <p:cNvPr id="2" name="Title 1">
-            <a:extLst>
-              <a:ext uri="{FF2B5EF4-FFF2-40B4-BE49-F238E27FC236}">
-                <a16:creationId xmlns:a16="http://schemas.microsoft.com/office/drawing/2014/main" id="{A8E5541F-7BFA-479C-B8B4-DDE116914320}"/>
-              </a:ext>
-            </a:extLst>
-          </p:cNvPr>
-          <p:cNvSpPr>
-            <a:spLocks noGrp="1"/>
-          </p:cNvSpPr>
-          <p:nvPr>
-            <p:ph type="title"/>
-          </p:nvPr>
-        </p:nvSpPr>
-        <p:spPr>
-          <a:xfrm>
-            <a:off x="522632" y="58022"/>
-            <a:ext cx="7886700" cy="705648"/>
-          </a:xfrm>
-        </p:spPr>
-        <p:txBody>
-          <a:bodyPr>
-            <a:normAutofit/>
-          </a:bodyPr>
-          <a:lstStyle/>
-          <a:p>
-            <a:r>
-              <a:rPr lang="en-US" sz="3200" dirty="0">
-                <a:latin typeface="Microsoft Sans Serif" panose="020B0604020202020204" pitchFamily="34" charset="0"/>
-                <a:ea typeface="Microsoft Sans Serif" panose="020B0604020202020204" pitchFamily="34" charset="0"/>
-                <a:cs typeface="Microsoft Sans Serif" panose="020B0604020202020204" pitchFamily="34" charset="0"/>
-              </a:rPr>
-              <a:t>Data Assembly </a:t>
-            </a:r>
-            <a:endParaRPr lang="en-US" sz="3200" dirty="0"/>
-          </a:p>
-        </p:txBody>
-      </p:sp>
-      <p:pic>
-        <p:nvPicPr>
-          <p:cNvPr id="5" name="Picture 4">
-            <a:extLst>
-              <a:ext uri="{FF2B5EF4-FFF2-40B4-BE49-F238E27FC236}">
-                <a16:creationId xmlns:a16="http://schemas.microsoft.com/office/drawing/2014/main" id="{F112826D-8205-4543-9CA7-8C18E18B2A81}"/>
-              </a:ext>
-            </a:extLst>
-          </p:cNvPr>
-          <p:cNvPicPr>
-            <a:picLocks noChangeAspect="1"/>
-          </p:cNvPicPr>
-          <p:nvPr/>
-        </p:nvPicPr>
-        <p:blipFill>
-          <a:blip r:embed="rId2"/>
-          <a:stretch>
-            <a:fillRect/>
-          </a:stretch>
-        </p:blipFill>
-        <p:spPr>
-          <a:xfrm>
-            <a:off x="0" y="6276894"/>
-            <a:ext cx="1991003" cy="581106"/>
-          </a:xfrm>
-          <a:prstGeom prst="rect">
-            <a:avLst/>
-          </a:prstGeom>
-        </p:spPr>
-      </p:pic>
-      <p:sp>
-        <p:nvSpPr>
-          <p:cNvPr id="8" name="Rectangle 7">
-            <a:extLst>
-              <a:ext uri="{FF2B5EF4-FFF2-40B4-BE49-F238E27FC236}">
-                <a16:creationId xmlns:a16="http://schemas.microsoft.com/office/drawing/2014/main" id="{7819BA35-EE0F-4ABB-BEBA-21534EB9317F}"/>
+          <p:cNvPr id="9" name="Rectangle 8">
+            <a:extLst>
+              <a:ext uri="{FF2B5EF4-FFF2-40B4-BE49-F238E27FC236}">
+                <a16:creationId xmlns:a16="http://schemas.microsoft.com/office/drawing/2014/main" id="{33D0D8CD-6461-42F9-8429-F58212699844}"/>
               </a:ext>
             </a:extLst>
           </p:cNvPr>
@@ -10482,20 +10499,17 @@
         </p:nvSpPr>
         <p:spPr>
           <a:xfrm>
-            <a:off x="522632" y="6276894"/>
-            <a:ext cx="7992717" cy="45719"/>
+            <a:off x="1178181" y="1469318"/>
+            <a:ext cx="6775648" cy="4625012"/>
           </a:xfrm>
           <a:prstGeom prst="rect">
             <a:avLst/>
           </a:prstGeom>
           <a:solidFill>
-            <a:srgbClr val="E51836"/>
+            <a:srgbClr val="E51836">
+              <a:alpha val="92000"/>
+            </a:srgbClr>
           </a:solidFill>
-          <a:ln>
-            <a:solidFill>
-              <a:srgbClr val="E51836"/>
-            </a:solidFill>
-          </a:ln>
         </p:spPr>
         <p:style>
           <a:lnRef idx="2">
@@ -10522,6 +10536,130 @@
           </a:p>
         </p:txBody>
       </p:sp>
+      <p:sp>
+        <p:nvSpPr>
+          <p:cNvPr id="2" name="Title 1">
+            <a:extLst>
+              <a:ext uri="{FF2B5EF4-FFF2-40B4-BE49-F238E27FC236}">
+                <a16:creationId xmlns:a16="http://schemas.microsoft.com/office/drawing/2014/main" id="{A8E5541F-7BFA-479C-B8B4-DDE116914320}"/>
+              </a:ext>
+            </a:extLst>
+          </p:cNvPr>
+          <p:cNvSpPr>
+            <a:spLocks noGrp="1"/>
+          </p:cNvSpPr>
+          <p:nvPr>
+            <p:ph type="title"/>
+          </p:nvPr>
+        </p:nvSpPr>
+        <p:spPr>
+          <a:xfrm>
+            <a:off x="522632" y="58022"/>
+            <a:ext cx="7886700" cy="705648"/>
+          </a:xfrm>
+        </p:spPr>
+        <p:txBody>
+          <a:bodyPr>
+            <a:normAutofit/>
+          </a:bodyPr>
+          <a:lstStyle/>
+          <a:p>
+            <a:r>
+              <a:rPr lang="en-US" sz="3200" dirty="0">
+                <a:latin typeface="Microsoft Sans Serif" panose="020B0604020202020204" pitchFamily="34" charset="0"/>
+                <a:ea typeface="Microsoft Sans Serif" panose="020B0604020202020204" pitchFamily="34" charset="0"/>
+                <a:cs typeface="Microsoft Sans Serif" panose="020B0604020202020204" pitchFamily="34" charset="0"/>
+              </a:rPr>
+              <a:t>Data Assembly </a:t>
+            </a:r>
+            <a:endParaRPr lang="en-US" sz="3200" dirty="0"/>
+          </a:p>
+        </p:txBody>
+      </p:sp>
+      <p:pic>
+        <p:nvPicPr>
+          <p:cNvPr id="5" name="Picture 4">
+            <a:extLst>
+              <a:ext uri="{FF2B5EF4-FFF2-40B4-BE49-F238E27FC236}">
+                <a16:creationId xmlns:a16="http://schemas.microsoft.com/office/drawing/2014/main" id="{F112826D-8205-4543-9CA7-8C18E18B2A81}"/>
+              </a:ext>
+            </a:extLst>
+          </p:cNvPr>
+          <p:cNvPicPr>
+            <a:picLocks noChangeAspect="1"/>
+          </p:cNvPicPr>
+          <p:nvPr/>
+        </p:nvPicPr>
+        <p:blipFill>
+          <a:blip r:embed="rId2"/>
+          <a:stretch>
+            <a:fillRect/>
+          </a:stretch>
+        </p:blipFill>
+        <p:spPr>
+          <a:xfrm>
+            <a:off x="0" y="6276894"/>
+            <a:ext cx="1991003" cy="581106"/>
+          </a:xfrm>
+          <a:prstGeom prst="rect">
+            <a:avLst/>
+          </a:prstGeom>
+        </p:spPr>
+      </p:pic>
+      <p:sp>
+        <p:nvSpPr>
+          <p:cNvPr id="8" name="Rectangle 7">
+            <a:extLst>
+              <a:ext uri="{FF2B5EF4-FFF2-40B4-BE49-F238E27FC236}">
+                <a16:creationId xmlns:a16="http://schemas.microsoft.com/office/drawing/2014/main" id="{7819BA35-EE0F-4ABB-BEBA-21534EB9317F}"/>
+              </a:ext>
+            </a:extLst>
+          </p:cNvPr>
+          <p:cNvSpPr/>
+          <p:nvPr/>
+        </p:nvSpPr>
+        <p:spPr>
+          <a:xfrm>
+            <a:off x="522632" y="6276894"/>
+            <a:ext cx="7992717" cy="45719"/>
+          </a:xfrm>
+          <a:prstGeom prst="rect">
+            <a:avLst/>
+          </a:prstGeom>
+          <a:solidFill>
+            <a:srgbClr val="E51836"/>
+          </a:solidFill>
+          <a:ln>
+            <a:solidFill>
+              <a:srgbClr val="E51836"/>
+            </a:solidFill>
+          </a:ln>
+        </p:spPr>
+        <p:style>
+          <a:lnRef idx="2">
+            <a:schemeClr val="accent1">
+              <a:shade val="50000"/>
+            </a:schemeClr>
+          </a:lnRef>
+          <a:fillRef idx="1">
+            <a:schemeClr val="accent1"/>
+          </a:fillRef>
+          <a:effectRef idx="0">
+            <a:schemeClr val="accent1"/>
+          </a:effectRef>
+          <a:fontRef idx="minor">
+            <a:schemeClr val="lt1"/>
+          </a:fontRef>
+        </p:style>
+        <p:txBody>
+          <a:bodyPr rtlCol="0" anchor="ctr"/>
+          <a:lstStyle/>
+          <a:p>
+            <a:pPr algn="ctr"/>
+            <a:endParaRPr lang="en-US"/>
+          </a:p>
+        </p:txBody>
+      </p:sp>
       <p:cxnSp>
         <p:nvCxnSpPr>
           <p:cNvPr id="10" name="Straight Connector 9">
@@ -10653,7 +10791,7 @@
         </p:blipFill>
         <p:spPr>
           <a:xfrm>
-            <a:off x="1305433" y="1643010"/>
+            <a:off x="1299438" y="1579023"/>
             <a:ext cx="6533134" cy="4405601"/>
           </a:xfrm>
           <a:prstGeom prst="rect">
@@ -10693,80 +10831,10 @@
       </p:grpSpPr>
       <p:sp>
         <p:nvSpPr>
-          <p:cNvPr id="2" name="Title 1">
-            <a:extLst>
-              <a:ext uri="{FF2B5EF4-FFF2-40B4-BE49-F238E27FC236}">
-                <a16:creationId xmlns:a16="http://schemas.microsoft.com/office/drawing/2014/main" id="{A8E5541F-7BFA-479C-B8B4-DDE116914320}"/>
-              </a:ext>
-            </a:extLst>
-          </p:cNvPr>
-          <p:cNvSpPr>
-            <a:spLocks noGrp="1"/>
-          </p:cNvSpPr>
-          <p:nvPr>
-            <p:ph type="title"/>
-          </p:nvPr>
-        </p:nvSpPr>
-        <p:spPr>
-          <a:xfrm>
-            <a:off x="522632" y="58022"/>
-            <a:ext cx="7886700" cy="705648"/>
-          </a:xfrm>
-        </p:spPr>
-        <p:txBody>
-          <a:bodyPr>
-            <a:normAutofit/>
-          </a:bodyPr>
-          <a:lstStyle/>
-          <a:p>
-            <a:r>
-              <a:rPr lang="en-US" sz="3200" dirty="0">
-                <a:latin typeface="Microsoft Sans Serif" panose="020B0604020202020204" pitchFamily="34" charset="0"/>
-                <a:ea typeface="Microsoft Sans Serif" panose="020B0604020202020204" pitchFamily="34" charset="0"/>
-                <a:cs typeface="Microsoft Sans Serif" panose="020B0604020202020204" pitchFamily="34" charset="0"/>
-              </a:rPr>
-              <a:t>Data Assembly </a:t>
-            </a:r>
-            <a:endParaRPr lang="en-US" sz="3200" dirty="0"/>
-          </a:p>
-        </p:txBody>
-      </p:sp>
-      <p:pic>
-        <p:nvPicPr>
-          <p:cNvPr id="5" name="Picture 4">
-            <a:extLst>
-              <a:ext uri="{FF2B5EF4-FFF2-40B4-BE49-F238E27FC236}">
-                <a16:creationId xmlns:a16="http://schemas.microsoft.com/office/drawing/2014/main" id="{F112826D-8205-4543-9CA7-8C18E18B2A81}"/>
-              </a:ext>
-            </a:extLst>
-          </p:cNvPr>
-          <p:cNvPicPr>
-            <a:picLocks noChangeAspect="1"/>
-          </p:cNvPicPr>
-          <p:nvPr/>
-        </p:nvPicPr>
-        <p:blipFill>
-          <a:blip r:embed="rId2"/>
-          <a:stretch>
-            <a:fillRect/>
-          </a:stretch>
-        </p:blipFill>
-        <p:spPr>
-          <a:xfrm>
-            <a:off x="0" y="6276894"/>
-            <a:ext cx="1991003" cy="581106"/>
-          </a:xfrm>
-          <a:prstGeom prst="rect">
-            <a:avLst/>
-          </a:prstGeom>
-        </p:spPr>
-      </p:pic>
-      <p:sp>
-        <p:nvSpPr>
-          <p:cNvPr id="8" name="Rectangle 7">
-            <a:extLst>
-              <a:ext uri="{FF2B5EF4-FFF2-40B4-BE49-F238E27FC236}">
-                <a16:creationId xmlns:a16="http://schemas.microsoft.com/office/drawing/2014/main" id="{7819BA35-EE0F-4ABB-BEBA-21534EB9317F}"/>
+          <p:cNvPr id="12" name="Rectangle 11">
+            <a:extLst>
+              <a:ext uri="{FF2B5EF4-FFF2-40B4-BE49-F238E27FC236}">
+                <a16:creationId xmlns:a16="http://schemas.microsoft.com/office/drawing/2014/main" id="{09F4BC5E-B113-4BA5-AE76-9AB965860764}"/>
               </a:ext>
             </a:extLst>
           </p:cNvPr>
@@ -10775,20 +10843,17 @@
         </p:nvSpPr>
         <p:spPr>
           <a:xfrm>
-            <a:off x="522632" y="6276894"/>
-            <a:ext cx="7992717" cy="45719"/>
+            <a:off x="3309950" y="1685523"/>
+            <a:ext cx="5731382" cy="3409723"/>
           </a:xfrm>
           <a:prstGeom prst="rect">
             <a:avLst/>
           </a:prstGeom>
           <a:solidFill>
-            <a:srgbClr val="E51836"/>
+            <a:srgbClr val="E51836">
+              <a:alpha val="92000"/>
+            </a:srgbClr>
           </a:solidFill>
-          <a:ln>
-            <a:solidFill>
-              <a:srgbClr val="E51836"/>
-            </a:solidFill>
-          </a:ln>
         </p:spPr>
         <p:style>
           <a:lnRef idx="2">
@@ -10815,6 +10880,181 @@
           </a:p>
         </p:txBody>
       </p:sp>
+      <p:sp>
+        <p:nvSpPr>
+          <p:cNvPr id="9" name="Rectangle 8">
+            <a:extLst>
+              <a:ext uri="{FF2B5EF4-FFF2-40B4-BE49-F238E27FC236}">
+                <a16:creationId xmlns:a16="http://schemas.microsoft.com/office/drawing/2014/main" id="{7E4C5A29-9D82-4589-B1B0-426CF5053B03}"/>
+              </a:ext>
+            </a:extLst>
+          </p:cNvPr>
+          <p:cNvSpPr/>
+          <p:nvPr/>
+        </p:nvSpPr>
+        <p:spPr>
+          <a:xfrm>
+            <a:off x="69438" y="2653838"/>
+            <a:ext cx="3124336" cy="1095557"/>
+          </a:xfrm>
+          <a:prstGeom prst="rect">
+            <a:avLst/>
+          </a:prstGeom>
+          <a:solidFill>
+            <a:srgbClr val="E51836">
+              <a:alpha val="92000"/>
+            </a:srgbClr>
+          </a:solidFill>
+        </p:spPr>
+        <p:style>
+          <a:lnRef idx="2">
+            <a:schemeClr val="accent1">
+              <a:shade val="50000"/>
+            </a:schemeClr>
+          </a:lnRef>
+          <a:fillRef idx="1">
+            <a:schemeClr val="accent1"/>
+          </a:fillRef>
+          <a:effectRef idx="0">
+            <a:schemeClr val="accent1"/>
+          </a:effectRef>
+          <a:fontRef idx="minor">
+            <a:schemeClr val="lt1"/>
+          </a:fontRef>
+        </p:style>
+        <p:txBody>
+          <a:bodyPr rtlCol="0" anchor="ctr"/>
+          <a:lstStyle/>
+          <a:p>
+            <a:pPr algn="ctr"/>
+            <a:endParaRPr lang="en-US"/>
+          </a:p>
+        </p:txBody>
+      </p:sp>
+      <p:sp>
+        <p:nvSpPr>
+          <p:cNvPr id="2" name="Title 1">
+            <a:extLst>
+              <a:ext uri="{FF2B5EF4-FFF2-40B4-BE49-F238E27FC236}">
+                <a16:creationId xmlns:a16="http://schemas.microsoft.com/office/drawing/2014/main" id="{A8E5541F-7BFA-479C-B8B4-DDE116914320}"/>
+              </a:ext>
+            </a:extLst>
+          </p:cNvPr>
+          <p:cNvSpPr>
+            <a:spLocks noGrp="1"/>
+          </p:cNvSpPr>
+          <p:nvPr>
+            <p:ph type="title"/>
+          </p:nvPr>
+        </p:nvSpPr>
+        <p:spPr>
+          <a:xfrm>
+            <a:off x="522632" y="58022"/>
+            <a:ext cx="7886700" cy="705648"/>
+          </a:xfrm>
+        </p:spPr>
+        <p:txBody>
+          <a:bodyPr>
+            <a:normAutofit/>
+          </a:bodyPr>
+          <a:lstStyle/>
+          <a:p>
+            <a:r>
+              <a:rPr lang="en-US" sz="3200" dirty="0">
+                <a:latin typeface="Microsoft Sans Serif" panose="020B0604020202020204" pitchFamily="34" charset="0"/>
+                <a:ea typeface="Microsoft Sans Serif" panose="020B0604020202020204" pitchFamily="34" charset="0"/>
+                <a:cs typeface="Microsoft Sans Serif" panose="020B0604020202020204" pitchFamily="34" charset="0"/>
+              </a:rPr>
+              <a:t>Data Assembly </a:t>
+            </a:r>
+            <a:endParaRPr lang="en-US" sz="3200" dirty="0"/>
+          </a:p>
+        </p:txBody>
+      </p:sp>
+      <p:pic>
+        <p:nvPicPr>
+          <p:cNvPr id="5" name="Picture 4">
+            <a:extLst>
+              <a:ext uri="{FF2B5EF4-FFF2-40B4-BE49-F238E27FC236}">
+                <a16:creationId xmlns:a16="http://schemas.microsoft.com/office/drawing/2014/main" id="{F112826D-8205-4543-9CA7-8C18E18B2A81}"/>
+              </a:ext>
+            </a:extLst>
+          </p:cNvPr>
+          <p:cNvPicPr>
+            <a:picLocks noChangeAspect="1"/>
+          </p:cNvPicPr>
+          <p:nvPr/>
+        </p:nvPicPr>
+        <p:blipFill>
+          <a:blip r:embed="rId2"/>
+          <a:stretch>
+            <a:fillRect/>
+          </a:stretch>
+        </p:blipFill>
+        <p:spPr>
+          <a:xfrm>
+            <a:off x="0" y="6276894"/>
+            <a:ext cx="1991003" cy="581106"/>
+          </a:xfrm>
+          <a:prstGeom prst="rect">
+            <a:avLst/>
+          </a:prstGeom>
+        </p:spPr>
+      </p:pic>
+      <p:sp>
+        <p:nvSpPr>
+          <p:cNvPr id="8" name="Rectangle 7">
+            <a:extLst>
+              <a:ext uri="{FF2B5EF4-FFF2-40B4-BE49-F238E27FC236}">
+                <a16:creationId xmlns:a16="http://schemas.microsoft.com/office/drawing/2014/main" id="{7819BA35-EE0F-4ABB-BEBA-21534EB9317F}"/>
+              </a:ext>
+            </a:extLst>
+          </p:cNvPr>
+          <p:cNvSpPr/>
+          <p:nvPr/>
+        </p:nvSpPr>
+        <p:spPr>
+          <a:xfrm>
+            <a:off x="522632" y="6276894"/>
+            <a:ext cx="7992717" cy="45719"/>
+          </a:xfrm>
+          <a:prstGeom prst="rect">
+            <a:avLst/>
+          </a:prstGeom>
+          <a:solidFill>
+            <a:srgbClr val="E51836"/>
+          </a:solidFill>
+          <a:ln>
+            <a:solidFill>
+              <a:srgbClr val="E51836"/>
+            </a:solidFill>
+          </a:ln>
+        </p:spPr>
+        <p:style>
+          <a:lnRef idx="2">
+            <a:schemeClr val="accent1">
+              <a:shade val="50000"/>
+            </a:schemeClr>
+          </a:lnRef>
+          <a:fillRef idx="1">
+            <a:schemeClr val="accent1"/>
+          </a:fillRef>
+          <a:effectRef idx="0">
+            <a:schemeClr val="accent1"/>
+          </a:effectRef>
+          <a:fontRef idx="minor">
+            <a:schemeClr val="lt1"/>
+          </a:fontRef>
+        </p:style>
+        <p:txBody>
+          <a:bodyPr rtlCol="0" anchor="ctr"/>
+          <a:lstStyle/>
+          <a:p>
+            <a:pPr algn="ctr"/>
+            <a:endParaRPr lang="en-US"/>
+          </a:p>
+        </p:txBody>
+      </p:sp>
       <p:cxnSp>
         <p:nvCxnSpPr>
           <p:cNvPr id="10" name="Straight Connector 9">
@@ -10899,7 +11139,7 @@
         </p:nvSpPr>
         <p:spPr>
           <a:xfrm>
-            <a:off x="69438" y="2687576"/>
+            <a:off x="102668" y="2687566"/>
             <a:ext cx="3228707" cy="1061829"/>
           </a:xfrm>
           <a:prstGeom prst="rect">
@@ -10915,27 +11155,14 @@
           <a:p>
             <a:r>
               <a:rPr lang="en-US" sz="2100" dirty="0">
+                <a:solidFill>
+                  <a:schemeClr val="bg1"/>
+                </a:solidFill>
                 <a:latin typeface="Microsoft Sans Serif" panose="020B0604020202020204" pitchFamily="34" charset="0"/>
                 <a:ea typeface="Microsoft Sans Serif" panose="020B0604020202020204" pitchFamily="34" charset="0"/>
                 <a:cs typeface="Microsoft Sans Serif" panose="020B0604020202020204" pitchFamily="34" charset="0"/>
               </a:rPr>
-              <a:t>Lastly, we build our </a:t>
-            </a:r>
-            <a:r>
-              <a:rPr lang="en-US" sz="2100" dirty="0" err="1">
-                <a:latin typeface="Microsoft Sans Serif" panose="020B0604020202020204" pitchFamily="34" charset="0"/>
-                <a:ea typeface="Microsoft Sans Serif" panose="020B0604020202020204" pitchFamily="34" charset="0"/>
-                <a:cs typeface="Microsoft Sans Serif" panose="020B0604020202020204" pitchFamily="34" charset="0"/>
-              </a:rPr>
-              <a:t>dataframe</a:t>
-            </a:r>
-            <a:r>
-              <a:rPr lang="en-US" sz="2100" dirty="0">
-                <a:latin typeface="Microsoft Sans Serif" panose="020B0604020202020204" pitchFamily="34" charset="0"/>
-                <a:ea typeface="Microsoft Sans Serif" panose="020B0604020202020204" pitchFamily="34" charset="0"/>
-                <a:cs typeface="Microsoft Sans Serif" panose="020B0604020202020204" pitchFamily="34" charset="0"/>
-              </a:rPr>
-              <a:t> and export to csv for the analysis team.</a:t>
+              <a:t>Lastly, we build our dataframe and export to csv for the analysis team.</a:t>
             </a:r>
           </a:p>
         </p:txBody>
@@ -10962,7 +11189,7 @@
         </p:blipFill>
         <p:spPr>
           <a:xfrm>
-            <a:off x="3331375" y="1796471"/>
+            <a:off x="3437464" y="1757855"/>
             <a:ext cx="5497779" cy="3265057"/>
           </a:xfrm>
           <a:prstGeom prst="rect">
@@ -11456,7 +11683,7 @@
         </p:nvSpPr>
         <p:spPr>
           <a:xfrm>
-            <a:off x="416615" y="825480"/>
+            <a:off x="982336" y="857386"/>
             <a:ext cx="7992717" cy="646331"/>
           </a:xfrm>
           <a:prstGeom prst="rect">
@@ -11900,80 +12127,10 @@
       </p:grpSpPr>
       <p:sp>
         <p:nvSpPr>
-          <p:cNvPr id="2" name="Title 1">
-            <a:extLst>
-              <a:ext uri="{FF2B5EF4-FFF2-40B4-BE49-F238E27FC236}">
-                <a16:creationId xmlns:a16="http://schemas.microsoft.com/office/drawing/2014/main" id="{A8E5541F-7BFA-479C-B8B4-DDE116914320}"/>
-              </a:ext>
-            </a:extLst>
-          </p:cNvPr>
-          <p:cNvSpPr>
-            <a:spLocks noGrp="1"/>
-          </p:cNvSpPr>
-          <p:nvPr>
-            <p:ph type="title"/>
-          </p:nvPr>
-        </p:nvSpPr>
-        <p:spPr>
-          <a:xfrm>
-            <a:off x="522632" y="58022"/>
-            <a:ext cx="7886700" cy="705648"/>
-          </a:xfrm>
-        </p:spPr>
-        <p:txBody>
-          <a:bodyPr>
-            <a:normAutofit/>
-          </a:bodyPr>
-          <a:lstStyle/>
-          <a:p>
-            <a:r>
-              <a:rPr lang="en-US" sz="3200" dirty="0">
-                <a:latin typeface="Microsoft Sans Serif" panose="020B0604020202020204" pitchFamily="34" charset="0"/>
-                <a:ea typeface="Microsoft Sans Serif" panose="020B0604020202020204" pitchFamily="34" charset="0"/>
-                <a:cs typeface="Microsoft Sans Serif" panose="020B0604020202020204" pitchFamily="34" charset="0"/>
-              </a:rPr>
-              <a:t>Home vs Away – League Field Goal %</a:t>
-            </a:r>
-            <a:endParaRPr lang="en-US" sz="3200" dirty="0"/>
-          </a:p>
-        </p:txBody>
-      </p:sp>
-      <p:pic>
-        <p:nvPicPr>
-          <p:cNvPr id="5" name="Picture 4">
-            <a:extLst>
-              <a:ext uri="{FF2B5EF4-FFF2-40B4-BE49-F238E27FC236}">
-                <a16:creationId xmlns:a16="http://schemas.microsoft.com/office/drawing/2014/main" id="{F112826D-8205-4543-9CA7-8C18E18B2A81}"/>
-              </a:ext>
-            </a:extLst>
-          </p:cNvPr>
-          <p:cNvPicPr>
-            <a:picLocks noChangeAspect="1"/>
-          </p:cNvPicPr>
-          <p:nvPr/>
-        </p:nvPicPr>
-        <p:blipFill>
-          <a:blip r:embed="rId2"/>
-          <a:stretch>
-            <a:fillRect/>
-          </a:stretch>
-        </p:blipFill>
-        <p:spPr>
-          <a:xfrm>
-            <a:off x="0" y="6276894"/>
-            <a:ext cx="1991003" cy="581106"/>
-          </a:xfrm>
-          <a:prstGeom prst="rect">
-            <a:avLst/>
-          </a:prstGeom>
-        </p:spPr>
-      </p:pic>
-      <p:sp>
-        <p:nvSpPr>
-          <p:cNvPr id="8" name="Rectangle 7">
-            <a:extLst>
-              <a:ext uri="{FF2B5EF4-FFF2-40B4-BE49-F238E27FC236}">
-                <a16:creationId xmlns:a16="http://schemas.microsoft.com/office/drawing/2014/main" id="{7819BA35-EE0F-4ABB-BEBA-21534EB9317F}"/>
+          <p:cNvPr id="13" name="Rectangle 12">
+            <a:extLst>
+              <a:ext uri="{FF2B5EF4-FFF2-40B4-BE49-F238E27FC236}">
+                <a16:creationId xmlns:a16="http://schemas.microsoft.com/office/drawing/2014/main" id="{A39252A1-2C60-4362-9F53-C688800CD5C3}"/>
               </a:ext>
             </a:extLst>
           </p:cNvPr>
@@ -11982,20 +12139,17 @@
         </p:nvSpPr>
         <p:spPr>
           <a:xfrm>
-            <a:off x="522632" y="6276894"/>
-            <a:ext cx="7992717" cy="45719"/>
+            <a:off x="522630" y="923681"/>
+            <a:ext cx="5065369" cy="1857635"/>
           </a:xfrm>
           <a:prstGeom prst="rect">
             <a:avLst/>
           </a:prstGeom>
           <a:solidFill>
-            <a:srgbClr val="E51836"/>
+            <a:srgbClr val="E51836">
+              <a:alpha val="92000"/>
+            </a:srgbClr>
           </a:solidFill>
-          <a:ln>
-            <a:solidFill>
-              <a:srgbClr val="E51836"/>
-            </a:solidFill>
-          </a:ln>
         </p:spPr>
         <p:style>
           <a:lnRef idx="2">
@@ -12022,6 +12176,181 @@
           </a:p>
         </p:txBody>
       </p:sp>
+      <p:sp>
+        <p:nvSpPr>
+          <p:cNvPr id="12" name="Rectangle 11">
+            <a:extLst>
+              <a:ext uri="{FF2B5EF4-FFF2-40B4-BE49-F238E27FC236}">
+                <a16:creationId xmlns:a16="http://schemas.microsoft.com/office/drawing/2014/main" id="{7D13A410-7B01-486D-9F21-7A4E556FDCA0}"/>
+              </a:ext>
+            </a:extLst>
+          </p:cNvPr>
+          <p:cNvSpPr/>
+          <p:nvPr/>
+        </p:nvSpPr>
+        <p:spPr>
+          <a:xfrm>
+            <a:off x="6013983" y="1208304"/>
+            <a:ext cx="2838470" cy="1560568"/>
+          </a:xfrm>
+          <a:prstGeom prst="rect">
+            <a:avLst/>
+          </a:prstGeom>
+          <a:solidFill>
+            <a:srgbClr val="E51836">
+              <a:alpha val="92000"/>
+            </a:srgbClr>
+          </a:solidFill>
+        </p:spPr>
+        <p:style>
+          <a:lnRef idx="2">
+            <a:schemeClr val="accent1">
+              <a:shade val="50000"/>
+            </a:schemeClr>
+          </a:lnRef>
+          <a:fillRef idx="1">
+            <a:schemeClr val="accent1"/>
+          </a:fillRef>
+          <a:effectRef idx="0">
+            <a:schemeClr val="accent1"/>
+          </a:effectRef>
+          <a:fontRef idx="minor">
+            <a:schemeClr val="lt1"/>
+          </a:fontRef>
+        </p:style>
+        <p:txBody>
+          <a:bodyPr rtlCol="0" anchor="ctr"/>
+          <a:lstStyle/>
+          <a:p>
+            <a:pPr algn="ctr"/>
+            <a:endParaRPr lang="en-US"/>
+          </a:p>
+        </p:txBody>
+      </p:sp>
+      <p:sp>
+        <p:nvSpPr>
+          <p:cNvPr id="2" name="Title 1">
+            <a:extLst>
+              <a:ext uri="{FF2B5EF4-FFF2-40B4-BE49-F238E27FC236}">
+                <a16:creationId xmlns:a16="http://schemas.microsoft.com/office/drawing/2014/main" id="{A8E5541F-7BFA-479C-B8B4-DDE116914320}"/>
+              </a:ext>
+            </a:extLst>
+          </p:cNvPr>
+          <p:cNvSpPr>
+            <a:spLocks noGrp="1"/>
+          </p:cNvSpPr>
+          <p:nvPr>
+            <p:ph type="title"/>
+          </p:nvPr>
+        </p:nvSpPr>
+        <p:spPr>
+          <a:xfrm>
+            <a:off x="522632" y="58022"/>
+            <a:ext cx="7886700" cy="705648"/>
+          </a:xfrm>
+        </p:spPr>
+        <p:txBody>
+          <a:bodyPr>
+            <a:normAutofit/>
+          </a:bodyPr>
+          <a:lstStyle/>
+          <a:p>
+            <a:r>
+              <a:rPr lang="en-US" sz="3200" dirty="0">
+                <a:latin typeface="Microsoft Sans Serif" panose="020B0604020202020204" pitchFamily="34" charset="0"/>
+                <a:ea typeface="Microsoft Sans Serif" panose="020B0604020202020204" pitchFamily="34" charset="0"/>
+                <a:cs typeface="Microsoft Sans Serif" panose="020B0604020202020204" pitchFamily="34" charset="0"/>
+              </a:rPr>
+              <a:t>Home vs Away – League Field Goal %</a:t>
+            </a:r>
+            <a:endParaRPr lang="en-US" sz="3200" dirty="0"/>
+          </a:p>
+        </p:txBody>
+      </p:sp>
+      <p:pic>
+        <p:nvPicPr>
+          <p:cNvPr id="5" name="Picture 4">
+            <a:extLst>
+              <a:ext uri="{FF2B5EF4-FFF2-40B4-BE49-F238E27FC236}">
+                <a16:creationId xmlns:a16="http://schemas.microsoft.com/office/drawing/2014/main" id="{F112826D-8205-4543-9CA7-8C18E18B2A81}"/>
+              </a:ext>
+            </a:extLst>
+          </p:cNvPr>
+          <p:cNvPicPr>
+            <a:picLocks noChangeAspect="1"/>
+          </p:cNvPicPr>
+          <p:nvPr/>
+        </p:nvPicPr>
+        <p:blipFill>
+          <a:blip r:embed="rId2"/>
+          <a:stretch>
+            <a:fillRect/>
+          </a:stretch>
+        </p:blipFill>
+        <p:spPr>
+          <a:xfrm>
+            <a:off x="0" y="6276894"/>
+            <a:ext cx="1991003" cy="581106"/>
+          </a:xfrm>
+          <a:prstGeom prst="rect">
+            <a:avLst/>
+          </a:prstGeom>
+        </p:spPr>
+      </p:pic>
+      <p:sp>
+        <p:nvSpPr>
+          <p:cNvPr id="8" name="Rectangle 7">
+            <a:extLst>
+              <a:ext uri="{FF2B5EF4-FFF2-40B4-BE49-F238E27FC236}">
+                <a16:creationId xmlns:a16="http://schemas.microsoft.com/office/drawing/2014/main" id="{7819BA35-EE0F-4ABB-BEBA-21534EB9317F}"/>
+              </a:ext>
+            </a:extLst>
+          </p:cNvPr>
+          <p:cNvSpPr/>
+          <p:nvPr/>
+        </p:nvSpPr>
+        <p:spPr>
+          <a:xfrm>
+            <a:off x="522632" y="6276894"/>
+            <a:ext cx="7992717" cy="45719"/>
+          </a:xfrm>
+          <a:prstGeom prst="rect">
+            <a:avLst/>
+          </a:prstGeom>
+          <a:solidFill>
+            <a:srgbClr val="E51836"/>
+          </a:solidFill>
+          <a:ln>
+            <a:solidFill>
+              <a:srgbClr val="E51836"/>
+            </a:solidFill>
+          </a:ln>
+        </p:spPr>
+        <p:style>
+          <a:lnRef idx="2">
+            <a:schemeClr val="accent1">
+              <a:shade val="50000"/>
+            </a:schemeClr>
+          </a:lnRef>
+          <a:fillRef idx="1">
+            <a:schemeClr val="accent1"/>
+          </a:fillRef>
+          <a:effectRef idx="0">
+            <a:schemeClr val="accent1"/>
+          </a:effectRef>
+          <a:fontRef idx="minor">
+            <a:schemeClr val="lt1"/>
+          </a:fontRef>
+        </p:style>
+        <p:txBody>
+          <a:bodyPr rtlCol="0" anchor="ctr"/>
+          <a:lstStyle/>
+          <a:p>
+            <a:pPr algn="ctr"/>
+            <a:endParaRPr lang="en-US"/>
+          </a:p>
+        </p:txBody>
+      </p:sp>
       <p:cxnSp>
         <p:nvCxnSpPr>
           <p:cNvPr id="10" name="Straight Connector 9">
@@ -12122,6 +12451,9 @@
           <a:p>
             <a:r>
               <a:rPr lang="en-US" dirty="0">
+                <a:solidFill>
+                  <a:schemeClr val="bg1"/>
+                </a:solidFill>
                 <a:latin typeface="Microsoft Sans Serif" panose="020B0604020202020204" pitchFamily="34" charset="0"/>
                 <a:ea typeface="Microsoft Sans Serif" panose="020B0604020202020204" pitchFamily="34" charset="0"/>
                 <a:cs typeface="Microsoft Sans Serif" panose="020B0604020202020204" pitchFamily="34" charset="0"/>
@@ -12153,7 +12485,7 @@
         </p:blipFill>
         <p:spPr>
           <a:xfrm>
-            <a:off x="522632" y="1014337"/>
+            <a:off x="578468" y="940551"/>
             <a:ext cx="4953691" cy="1857634"/>
           </a:xfrm>
           <a:prstGeom prst="rect">
@@ -12223,80 +12555,10 @@
       </p:grpSpPr>
       <p:sp>
         <p:nvSpPr>
-          <p:cNvPr id="2" name="Title 1">
-            <a:extLst>
-              <a:ext uri="{FF2B5EF4-FFF2-40B4-BE49-F238E27FC236}">
-                <a16:creationId xmlns:a16="http://schemas.microsoft.com/office/drawing/2014/main" id="{A8E5541F-7BFA-479C-B8B4-DDE116914320}"/>
-              </a:ext>
-            </a:extLst>
-          </p:cNvPr>
-          <p:cNvSpPr>
-            <a:spLocks noGrp="1"/>
-          </p:cNvSpPr>
-          <p:nvPr>
-            <p:ph type="title"/>
-          </p:nvPr>
-        </p:nvSpPr>
-        <p:spPr>
-          <a:xfrm>
-            <a:off x="522632" y="58022"/>
-            <a:ext cx="7886700" cy="705648"/>
-          </a:xfrm>
-        </p:spPr>
-        <p:txBody>
-          <a:bodyPr>
-            <a:normAutofit/>
-          </a:bodyPr>
-          <a:lstStyle/>
-          <a:p>
-            <a:r>
-              <a:rPr lang="en-US" sz="3200" dirty="0">
-                <a:latin typeface="Microsoft Sans Serif" panose="020B0604020202020204" pitchFamily="34" charset="0"/>
-                <a:ea typeface="Microsoft Sans Serif" panose="020B0604020202020204" pitchFamily="34" charset="0"/>
-                <a:cs typeface="Microsoft Sans Serif" panose="020B0604020202020204" pitchFamily="34" charset="0"/>
-              </a:rPr>
-              <a:t>Home vs Away – League 3 Point %</a:t>
-            </a:r>
-            <a:endParaRPr lang="en-US" sz="3200" dirty="0"/>
-          </a:p>
-        </p:txBody>
-      </p:sp>
-      <p:pic>
-        <p:nvPicPr>
-          <p:cNvPr id="5" name="Picture 4">
-            <a:extLst>
-              <a:ext uri="{FF2B5EF4-FFF2-40B4-BE49-F238E27FC236}">
-                <a16:creationId xmlns:a16="http://schemas.microsoft.com/office/drawing/2014/main" id="{F112826D-8205-4543-9CA7-8C18E18B2A81}"/>
-              </a:ext>
-            </a:extLst>
-          </p:cNvPr>
-          <p:cNvPicPr>
-            <a:picLocks noChangeAspect="1"/>
-          </p:cNvPicPr>
-          <p:nvPr/>
-        </p:nvPicPr>
-        <p:blipFill>
-          <a:blip r:embed="rId2"/>
-          <a:stretch>
-            <a:fillRect/>
-          </a:stretch>
-        </p:blipFill>
-        <p:spPr>
-          <a:xfrm>
-            <a:off x="0" y="6276894"/>
-            <a:ext cx="1991003" cy="581106"/>
-          </a:xfrm>
-          <a:prstGeom prst="rect">
-            <a:avLst/>
-          </a:prstGeom>
-        </p:spPr>
-      </p:pic>
-      <p:sp>
-        <p:nvSpPr>
-          <p:cNvPr id="8" name="Rectangle 7">
-            <a:extLst>
-              <a:ext uri="{FF2B5EF4-FFF2-40B4-BE49-F238E27FC236}">
-                <a16:creationId xmlns:a16="http://schemas.microsoft.com/office/drawing/2014/main" id="{7819BA35-EE0F-4ABB-BEBA-21534EB9317F}"/>
+          <p:cNvPr id="12" name="Rectangle 11">
+            <a:extLst>
+              <a:ext uri="{FF2B5EF4-FFF2-40B4-BE49-F238E27FC236}">
+                <a16:creationId xmlns:a16="http://schemas.microsoft.com/office/drawing/2014/main" id="{63E61333-95F7-4C72-9F6D-5DF998BE926E}"/>
               </a:ext>
             </a:extLst>
           </p:cNvPr>
@@ -12305,20 +12567,17 @@
         </p:nvSpPr>
         <p:spPr>
           <a:xfrm>
-            <a:off x="522632" y="6276894"/>
-            <a:ext cx="7992717" cy="45719"/>
+            <a:off x="6593784" y="2836437"/>
+            <a:ext cx="2205659" cy="1788061"/>
           </a:xfrm>
           <a:prstGeom prst="rect">
             <a:avLst/>
           </a:prstGeom>
           <a:solidFill>
-            <a:srgbClr val="E51836"/>
+            <a:srgbClr val="E51836">
+              <a:alpha val="92000"/>
+            </a:srgbClr>
           </a:solidFill>
-          <a:ln>
-            <a:solidFill>
-              <a:srgbClr val="E51836"/>
-            </a:solidFill>
-          </a:ln>
         </p:spPr>
         <p:style>
           <a:lnRef idx="2">
@@ -12345,6 +12604,130 @@
           </a:p>
         </p:txBody>
       </p:sp>
+      <p:sp>
+        <p:nvSpPr>
+          <p:cNvPr id="2" name="Title 1">
+            <a:extLst>
+              <a:ext uri="{FF2B5EF4-FFF2-40B4-BE49-F238E27FC236}">
+                <a16:creationId xmlns:a16="http://schemas.microsoft.com/office/drawing/2014/main" id="{A8E5541F-7BFA-479C-B8B4-DDE116914320}"/>
+              </a:ext>
+            </a:extLst>
+          </p:cNvPr>
+          <p:cNvSpPr>
+            <a:spLocks noGrp="1"/>
+          </p:cNvSpPr>
+          <p:nvPr>
+            <p:ph type="title"/>
+          </p:nvPr>
+        </p:nvSpPr>
+        <p:spPr>
+          <a:xfrm>
+            <a:off x="522632" y="58022"/>
+            <a:ext cx="7886700" cy="705648"/>
+          </a:xfrm>
+        </p:spPr>
+        <p:txBody>
+          <a:bodyPr>
+            <a:normAutofit/>
+          </a:bodyPr>
+          <a:lstStyle/>
+          <a:p>
+            <a:r>
+              <a:rPr lang="en-US" sz="3200" dirty="0">
+                <a:latin typeface="Microsoft Sans Serif" panose="020B0604020202020204" pitchFamily="34" charset="0"/>
+                <a:ea typeface="Microsoft Sans Serif" panose="020B0604020202020204" pitchFamily="34" charset="0"/>
+                <a:cs typeface="Microsoft Sans Serif" panose="020B0604020202020204" pitchFamily="34" charset="0"/>
+              </a:rPr>
+              <a:t>Home vs Away – League 3 Point %</a:t>
+            </a:r>
+            <a:endParaRPr lang="en-US" sz="3200" dirty="0"/>
+          </a:p>
+        </p:txBody>
+      </p:sp>
+      <p:pic>
+        <p:nvPicPr>
+          <p:cNvPr id="5" name="Picture 4">
+            <a:extLst>
+              <a:ext uri="{FF2B5EF4-FFF2-40B4-BE49-F238E27FC236}">
+                <a16:creationId xmlns:a16="http://schemas.microsoft.com/office/drawing/2014/main" id="{F112826D-8205-4543-9CA7-8C18E18B2A81}"/>
+              </a:ext>
+            </a:extLst>
+          </p:cNvPr>
+          <p:cNvPicPr>
+            <a:picLocks noChangeAspect="1"/>
+          </p:cNvPicPr>
+          <p:nvPr/>
+        </p:nvPicPr>
+        <p:blipFill>
+          <a:blip r:embed="rId2"/>
+          <a:stretch>
+            <a:fillRect/>
+          </a:stretch>
+        </p:blipFill>
+        <p:spPr>
+          <a:xfrm>
+            <a:off x="0" y="6276894"/>
+            <a:ext cx="1991003" cy="581106"/>
+          </a:xfrm>
+          <a:prstGeom prst="rect">
+            <a:avLst/>
+          </a:prstGeom>
+        </p:spPr>
+      </p:pic>
+      <p:sp>
+        <p:nvSpPr>
+          <p:cNvPr id="8" name="Rectangle 7">
+            <a:extLst>
+              <a:ext uri="{FF2B5EF4-FFF2-40B4-BE49-F238E27FC236}">
+                <a16:creationId xmlns:a16="http://schemas.microsoft.com/office/drawing/2014/main" id="{7819BA35-EE0F-4ABB-BEBA-21534EB9317F}"/>
+              </a:ext>
+            </a:extLst>
+          </p:cNvPr>
+          <p:cNvSpPr/>
+          <p:nvPr/>
+        </p:nvSpPr>
+        <p:spPr>
+          <a:xfrm>
+            <a:off x="522632" y="6276894"/>
+            <a:ext cx="7992717" cy="45719"/>
+          </a:xfrm>
+          <a:prstGeom prst="rect">
+            <a:avLst/>
+          </a:prstGeom>
+          <a:solidFill>
+            <a:srgbClr val="E51836"/>
+          </a:solidFill>
+          <a:ln>
+            <a:solidFill>
+              <a:srgbClr val="E51836"/>
+            </a:solidFill>
+          </a:ln>
+        </p:spPr>
+        <p:style>
+          <a:lnRef idx="2">
+            <a:schemeClr val="accent1">
+              <a:shade val="50000"/>
+            </a:schemeClr>
+          </a:lnRef>
+          <a:fillRef idx="1">
+            <a:schemeClr val="accent1"/>
+          </a:fillRef>
+          <a:effectRef idx="0">
+            <a:schemeClr val="accent1"/>
+          </a:effectRef>
+          <a:fontRef idx="minor">
+            <a:schemeClr val="lt1"/>
+          </a:fontRef>
+        </p:style>
+        <p:txBody>
+          <a:bodyPr rtlCol="0" anchor="ctr"/>
+          <a:lstStyle/>
+          <a:p>
+            <a:pPr algn="ctr"/>
+            <a:endParaRPr lang="en-US"/>
+          </a:p>
+        </p:txBody>
+      </p:sp>
       <p:cxnSp>
         <p:nvCxnSpPr>
           <p:cNvPr id="10" name="Straight Connector 9">
@@ -12498,7 +12881,7 @@
         </p:nvSpPr>
         <p:spPr>
           <a:xfrm>
-            <a:off x="6586376" y="2870176"/>
+            <a:off x="6618276" y="2911946"/>
             <a:ext cx="2372941" cy="1754326"/>
           </a:xfrm>
           <a:prstGeom prst="rect">
@@ -12514,13 +12897,20 @@
           <a:p>
             <a:r>
               <a:rPr lang="en-US" dirty="0">
+                <a:solidFill>
+                  <a:schemeClr val="bg1"/>
+                </a:solidFill>
                 <a:latin typeface="Microsoft Sans Serif" panose="020B0604020202020204" pitchFamily="34" charset="0"/>
                 <a:ea typeface="Microsoft Sans Serif" panose="020B0604020202020204" pitchFamily="34" charset="0"/>
                 <a:cs typeface="Microsoft Sans Serif" panose="020B0604020202020204" pitchFamily="34" charset="0"/>
               </a:rPr>
               <a:t>This is likely due to the noise of the crowd impacting the home team’s ability to communicate on defense.</a:t>
             </a:r>
-            <a:endParaRPr lang="en-US" dirty="0"/>
+            <a:endParaRPr lang="en-US" dirty="0">
+              <a:solidFill>
+                <a:schemeClr val="bg1"/>
+              </a:solidFill>
+            </a:endParaRPr>
           </a:p>
         </p:txBody>
       </p:sp>
@@ -12556,80 +12946,10 @@
       </p:grpSpPr>
       <p:sp>
         <p:nvSpPr>
-          <p:cNvPr id="2" name="Title 1">
-            <a:extLst>
-              <a:ext uri="{FF2B5EF4-FFF2-40B4-BE49-F238E27FC236}">
-                <a16:creationId xmlns:a16="http://schemas.microsoft.com/office/drawing/2014/main" id="{A8E5541F-7BFA-479C-B8B4-DDE116914320}"/>
-              </a:ext>
-            </a:extLst>
-          </p:cNvPr>
-          <p:cNvSpPr>
-            <a:spLocks noGrp="1"/>
-          </p:cNvSpPr>
-          <p:nvPr>
-            <p:ph type="title"/>
-          </p:nvPr>
-        </p:nvSpPr>
-        <p:spPr>
-          <a:xfrm>
-            <a:off x="522632" y="58022"/>
-            <a:ext cx="7886700" cy="705648"/>
-          </a:xfrm>
-        </p:spPr>
-        <p:txBody>
-          <a:bodyPr>
-            <a:normAutofit/>
-          </a:bodyPr>
-          <a:lstStyle/>
-          <a:p>
-            <a:r>
-              <a:rPr lang="en-US" sz="3200" dirty="0">
-                <a:latin typeface="Microsoft Sans Serif" panose="020B0604020202020204" pitchFamily="34" charset="0"/>
-                <a:ea typeface="Microsoft Sans Serif" panose="020B0604020202020204" pitchFamily="34" charset="0"/>
-                <a:cs typeface="Microsoft Sans Serif" panose="020B0604020202020204" pitchFamily="34" charset="0"/>
-              </a:rPr>
-              <a:t>Home vs Away – League Free Throw %</a:t>
-            </a:r>
-            <a:endParaRPr lang="en-US" sz="3200" dirty="0"/>
-          </a:p>
-        </p:txBody>
-      </p:sp>
-      <p:pic>
-        <p:nvPicPr>
-          <p:cNvPr id="5" name="Picture 4">
-            <a:extLst>
-              <a:ext uri="{FF2B5EF4-FFF2-40B4-BE49-F238E27FC236}">
-                <a16:creationId xmlns:a16="http://schemas.microsoft.com/office/drawing/2014/main" id="{F112826D-8205-4543-9CA7-8C18E18B2A81}"/>
-              </a:ext>
-            </a:extLst>
-          </p:cNvPr>
-          <p:cNvPicPr>
-            <a:picLocks noChangeAspect="1"/>
-          </p:cNvPicPr>
-          <p:nvPr/>
-        </p:nvPicPr>
-        <p:blipFill>
-          <a:blip r:embed="rId2"/>
-          <a:stretch>
-            <a:fillRect/>
-          </a:stretch>
-        </p:blipFill>
-        <p:spPr>
-          <a:xfrm>
-            <a:off x="0" y="6276894"/>
-            <a:ext cx="1991003" cy="581106"/>
-          </a:xfrm>
-          <a:prstGeom prst="rect">
-            <a:avLst/>
-          </a:prstGeom>
-        </p:spPr>
-      </p:pic>
-      <p:sp>
-        <p:nvSpPr>
-          <p:cNvPr id="8" name="Rectangle 7">
-            <a:extLst>
-              <a:ext uri="{FF2B5EF4-FFF2-40B4-BE49-F238E27FC236}">
-                <a16:creationId xmlns:a16="http://schemas.microsoft.com/office/drawing/2014/main" id="{7819BA35-EE0F-4ABB-BEBA-21534EB9317F}"/>
+          <p:cNvPr id="12" name="Rectangle 11">
+            <a:extLst>
+              <a:ext uri="{FF2B5EF4-FFF2-40B4-BE49-F238E27FC236}">
+                <a16:creationId xmlns:a16="http://schemas.microsoft.com/office/drawing/2014/main" id="{E57D3AC0-DCEC-4CF6-8E7F-8447D12681A9}"/>
               </a:ext>
             </a:extLst>
           </p:cNvPr>
@@ -12638,20 +12958,17 @@
         </p:nvSpPr>
         <p:spPr>
           <a:xfrm>
-            <a:off x="522632" y="6276894"/>
-            <a:ext cx="7992717" cy="45719"/>
+            <a:off x="6586376" y="2870175"/>
+            <a:ext cx="2372941" cy="1477328"/>
           </a:xfrm>
           <a:prstGeom prst="rect">
             <a:avLst/>
           </a:prstGeom>
           <a:solidFill>
-            <a:srgbClr val="E51836"/>
+            <a:srgbClr val="E51836">
+              <a:alpha val="92000"/>
+            </a:srgbClr>
           </a:solidFill>
-          <a:ln>
-            <a:solidFill>
-              <a:srgbClr val="E51836"/>
-            </a:solidFill>
-          </a:ln>
         </p:spPr>
         <p:style>
           <a:lnRef idx="2">
@@ -12678,6 +12995,130 @@
           </a:p>
         </p:txBody>
       </p:sp>
+      <p:sp>
+        <p:nvSpPr>
+          <p:cNvPr id="2" name="Title 1">
+            <a:extLst>
+              <a:ext uri="{FF2B5EF4-FFF2-40B4-BE49-F238E27FC236}">
+                <a16:creationId xmlns:a16="http://schemas.microsoft.com/office/drawing/2014/main" id="{A8E5541F-7BFA-479C-B8B4-DDE116914320}"/>
+              </a:ext>
+            </a:extLst>
+          </p:cNvPr>
+          <p:cNvSpPr>
+            <a:spLocks noGrp="1"/>
+          </p:cNvSpPr>
+          <p:nvPr>
+            <p:ph type="title"/>
+          </p:nvPr>
+        </p:nvSpPr>
+        <p:spPr>
+          <a:xfrm>
+            <a:off x="522632" y="58022"/>
+            <a:ext cx="7886700" cy="705648"/>
+          </a:xfrm>
+        </p:spPr>
+        <p:txBody>
+          <a:bodyPr>
+            <a:normAutofit/>
+          </a:bodyPr>
+          <a:lstStyle/>
+          <a:p>
+            <a:r>
+              <a:rPr lang="en-US" sz="3200" dirty="0">
+                <a:latin typeface="Microsoft Sans Serif" panose="020B0604020202020204" pitchFamily="34" charset="0"/>
+                <a:ea typeface="Microsoft Sans Serif" panose="020B0604020202020204" pitchFamily="34" charset="0"/>
+                <a:cs typeface="Microsoft Sans Serif" panose="020B0604020202020204" pitchFamily="34" charset="0"/>
+              </a:rPr>
+              <a:t>Home vs Away – League Free Throw %</a:t>
+            </a:r>
+            <a:endParaRPr lang="en-US" sz="3200" dirty="0"/>
+          </a:p>
+        </p:txBody>
+      </p:sp>
+      <p:pic>
+        <p:nvPicPr>
+          <p:cNvPr id="5" name="Picture 4">
+            <a:extLst>
+              <a:ext uri="{FF2B5EF4-FFF2-40B4-BE49-F238E27FC236}">
+                <a16:creationId xmlns:a16="http://schemas.microsoft.com/office/drawing/2014/main" id="{F112826D-8205-4543-9CA7-8C18E18B2A81}"/>
+              </a:ext>
+            </a:extLst>
+          </p:cNvPr>
+          <p:cNvPicPr>
+            <a:picLocks noChangeAspect="1"/>
+          </p:cNvPicPr>
+          <p:nvPr/>
+        </p:nvPicPr>
+        <p:blipFill>
+          <a:blip r:embed="rId2"/>
+          <a:stretch>
+            <a:fillRect/>
+          </a:stretch>
+        </p:blipFill>
+        <p:spPr>
+          <a:xfrm>
+            <a:off x="0" y="6276894"/>
+            <a:ext cx="1991003" cy="581106"/>
+          </a:xfrm>
+          <a:prstGeom prst="rect">
+            <a:avLst/>
+          </a:prstGeom>
+        </p:spPr>
+      </p:pic>
+      <p:sp>
+        <p:nvSpPr>
+          <p:cNvPr id="8" name="Rectangle 7">
+            <a:extLst>
+              <a:ext uri="{FF2B5EF4-FFF2-40B4-BE49-F238E27FC236}">
+                <a16:creationId xmlns:a16="http://schemas.microsoft.com/office/drawing/2014/main" id="{7819BA35-EE0F-4ABB-BEBA-21534EB9317F}"/>
+              </a:ext>
+            </a:extLst>
+          </p:cNvPr>
+          <p:cNvSpPr/>
+          <p:nvPr/>
+        </p:nvSpPr>
+        <p:spPr>
+          <a:xfrm>
+            <a:off x="522632" y="6276894"/>
+            <a:ext cx="7992717" cy="45719"/>
+          </a:xfrm>
+          <a:prstGeom prst="rect">
+            <a:avLst/>
+          </a:prstGeom>
+          <a:solidFill>
+            <a:srgbClr val="E51836"/>
+          </a:solidFill>
+          <a:ln>
+            <a:solidFill>
+              <a:srgbClr val="E51836"/>
+            </a:solidFill>
+          </a:ln>
+        </p:spPr>
+        <p:style>
+          <a:lnRef idx="2">
+            <a:schemeClr val="accent1">
+              <a:shade val="50000"/>
+            </a:schemeClr>
+          </a:lnRef>
+          <a:fillRef idx="1">
+            <a:schemeClr val="accent1"/>
+          </a:fillRef>
+          <a:effectRef idx="0">
+            <a:schemeClr val="accent1"/>
+          </a:effectRef>
+          <a:fontRef idx="minor">
+            <a:schemeClr val="lt1"/>
+          </a:fontRef>
+        </p:style>
+        <p:txBody>
+          <a:bodyPr rtlCol="0" anchor="ctr"/>
+          <a:lstStyle/>
+          <a:p>
+            <a:pPr algn="ctr"/>
+            <a:endParaRPr lang="en-US"/>
+          </a:p>
+        </p:txBody>
+      </p:sp>
       <p:cxnSp>
         <p:nvCxnSpPr>
           <p:cNvPr id="10" name="Straight Connector 9">
@@ -12817,7 +13258,7 @@
         </p:nvSpPr>
         <p:spPr>
           <a:xfrm>
-            <a:off x="6586376" y="2870176"/>
+            <a:off x="6586376" y="2903913"/>
             <a:ext cx="2372941" cy="1477328"/>
           </a:xfrm>
           <a:prstGeom prst="rect">
@@ -12833,13 +13274,20 @@
           <a:p>
             <a:r>
               <a:rPr lang="en-US" dirty="0">
+                <a:solidFill>
+                  <a:schemeClr val="bg1"/>
+                </a:solidFill>
                 <a:latin typeface="Microsoft Sans Serif" panose="020B0604020202020204" pitchFamily="34" charset="0"/>
                 <a:ea typeface="Microsoft Sans Serif" panose="020B0604020202020204" pitchFamily="34" charset="0"/>
                 <a:cs typeface="Microsoft Sans Serif" panose="020B0604020202020204" pitchFamily="34" charset="0"/>
               </a:rPr>
               <a:t>Meanwhile, the away team only seems to be affected by the crowd up to a certain degree.</a:t>
             </a:r>
-            <a:endParaRPr lang="en-US" dirty="0"/>
+            <a:endParaRPr lang="en-US" dirty="0">
+              <a:solidFill>
+                <a:schemeClr val="bg1"/>
+              </a:solidFill>
+            </a:endParaRPr>
           </a:p>
         </p:txBody>
       </p:sp>
@@ -13110,13 +13558,13 @@
           <p:nvPr>
             <p:extLst>
               <p:ext uri="{D42A27DB-BD31-4B8C-83A1-F6EECF244321}">
-                <p14:modId xmlns:p14="http://schemas.microsoft.com/office/powerpoint/2010/main" val="2665495567"/>
+                <p14:modId xmlns:p14="http://schemas.microsoft.com/office/powerpoint/2010/main" val="2423306750"/>
               </p:ext>
             </p:extLst>
           </p:nvPr>
         </p:nvGraphicFramePr>
         <p:xfrm>
-          <a:off x="172278" y="1560782"/>
+          <a:off x="172278" y="1628426"/>
           <a:ext cx="8839200" cy="3634070"/>
         </p:xfrm>
         <a:graphic>
@@ -13162,6 +13610,214 @@
               <a:t>Conclusion</a:t>
             </a:r>
             <a:endParaRPr lang="en-US" dirty="0"/>
+          </a:p>
+        </p:txBody>
+      </p:sp>
+      <p:sp>
+        <p:nvSpPr>
+          <p:cNvPr id="12" name="Parallelogram 11">
+            <a:extLst>
+              <a:ext uri="{FF2B5EF4-FFF2-40B4-BE49-F238E27FC236}">
+                <a16:creationId xmlns:a16="http://schemas.microsoft.com/office/drawing/2014/main" id="{84A13AE5-E607-4DB1-8BA4-57336673F820}"/>
+              </a:ext>
+            </a:extLst>
+          </p:cNvPr>
+          <p:cNvSpPr/>
+          <p:nvPr/>
+        </p:nvSpPr>
+        <p:spPr>
+          <a:xfrm>
+            <a:off x="1338470" y="4672111"/>
+            <a:ext cx="2782956" cy="1478281"/>
+          </a:xfrm>
+          <a:prstGeom prst="parallelogram">
+            <a:avLst/>
+          </a:prstGeom>
+          <a:solidFill>
+            <a:srgbClr val="E51836"/>
+          </a:solidFill>
+          <a:ln>
+            <a:noFill/>
+          </a:ln>
+        </p:spPr>
+        <p:style>
+          <a:lnRef idx="2">
+            <a:schemeClr val="accent1">
+              <a:shade val="50000"/>
+            </a:schemeClr>
+          </a:lnRef>
+          <a:fillRef idx="1">
+            <a:schemeClr val="accent1"/>
+          </a:fillRef>
+          <a:effectRef idx="0">
+            <a:schemeClr val="accent1"/>
+          </a:effectRef>
+          <a:fontRef idx="minor">
+            <a:schemeClr val="lt1"/>
+          </a:fontRef>
+        </p:style>
+        <p:txBody>
+          <a:bodyPr rtlCol="0" anchor="ctr"/>
+          <a:lstStyle/>
+          <a:p>
+            <a:pPr algn="ctr"/>
+            <a:endParaRPr lang="en-US"/>
+          </a:p>
+        </p:txBody>
+      </p:sp>
+      <p:sp>
+        <p:nvSpPr>
+          <p:cNvPr id="13" name="Parallelogram 12">
+            <a:extLst>
+              <a:ext uri="{FF2B5EF4-FFF2-40B4-BE49-F238E27FC236}">
+                <a16:creationId xmlns:a16="http://schemas.microsoft.com/office/drawing/2014/main" id="{43E0F354-F250-4A6B-A81D-7B003CD39098}"/>
+              </a:ext>
+            </a:extLst>
+          </p:cNvPr>
+          <p:cNvSpPr/>
+          <p:nvPr/>
+        </p:nvSpPr>
+        <p:spPr>
+          <a:xfrm flipH="1">
+            <a:off x="4905652" y="4672997"/>
+            <a:ext cx="2782956" cy="1478281"/>
+          </a:xfrm>
+          <a:prstGeom prst="parallelogram">
+            <a:avLst/>
+          </a:prstGeom>
+          <a:solidFill>
+            <a:srgbClr val="E51836"/>
+          </a:solidFill>
+          <a:ln>
+            <a:noFill/>
+          </a:ln>
+        </p:spPr>
+        <p:style>
+          <a:lnRef idx="2">
+            <a:schemeClr val="accent1">
+              <a:shade val="50000"/>
+            </a:schemeClr>
+          </a:lnRef>
+          <a:fillRef idx="1">
+            <a:schemeClr val="accent1"/>
+          </a:fillRef>
+          <a:effectRef idx="0">
+            <a:schemeClr val="accent1"/>
+          </a:effectRef>
+          <a:fontRef idx="minor">
+            <a:schemeClr val="lt1"/>
+          </a:fontRef>
+        </p:style>
+        <p:txBody>
+          <a:bodyPr rtlCol="0" anchor="ctr"/>
+          <a:lstStyle/>
+          <a:p>
+            <a:pPr algn="ctr"/>
+            <a:endParaRPr lang="en-US"/>
+          </a:p>
+        </p:txBody>
+      </p:sp>
+      <p:sp>
+        <p:nvSpPr>
+          <p:cNvPr id="14" name="Parallelogram 13">
+            <a:extLst>
+              <a:ext uri="{FF2B5EF4-FFF2-40B4-BE49-F238E27FC236}">
+                <a16:creationId xmlns:a16="http://schemas.microsoft.com/office/drawing/2014/main" id="{76A14CD4-91F0-4047-A65B-104B23E8EA6C}"/>
+              </a:ext>
+            </a:extLst>
+          </p:cNvPr>
+          <p:cNvSpPr/>
+          <p:nvPr/>
+        </p:nvSpPr>
+        <p:spPr>
+          <a:xfrm>
+            <a:off x="2299253" y="889285"/>
+            <a:ext cx="2782956" cy="1326474"/>
+          </a:xfrm>
+          <a:prstGeom prst="parallelogram">
+            <a:avLst/>
+          </a:prstGeom>
+          <a:solidFill>
+            <a:srgbClr val="E51836"/>
+          </a:solidFill>
+          <a:ln>
+            <a:noFill/>
+          </a:ln>
+        </p:spPr>
+        <p:style>
+          <a:lnRef idx="2">
+            <a:schemeClr val="accent1">
+              <a:shade val="50000"/>
+            </a:schemeClr>
+          </a:lnRef>
+          <a:fillRef idx="1">
+            <a:schemeClr val="accent1"/>
+          </a:fillRef>
+          <a:effectRef idx="0">
+            <a:schemeClr val="accent1"/>
+          </a:effectRef>
+          <a:fontRef idx="minor">
+            <a:schemeClr val="lt1"/>
+          </a:fontRef>
+        </p:style>
+        <p:txBody>
+          <a:bodyPr rtlCol="0" anchor="ctr"/>
+          <a:lstStyle/>
+          <a:p>
+            <a:pPr algn="ctr"/>
+            <a:endParaRPr lang="en-US"/>
+          </a:p>
+        </p:txBody>
+      </p:sp>
+      <p:sp>
+        <p:nvSpPr>
+          <p:cNvPr id="16" name="Parallelogram 15">
+            <a:extLst>
+              <a:ext uri="{FF2B5EF4-FFF2-40B4-BE49-F238E27FC236}">
+                <a16:creationId xmlns:a16="http://schemas.microsoft.com/office/drawing/2014/main" id="{CEE86C23-346B-4CA6-8AD8-70C81967EBBD}"/>
+              </a:ext>
+            </a:extLst>
+          </p:cNvPr>
+          <p:cNvSpPr/>
+          <p:nvPr/>
+        </p:nvSpPr>
+        <p:spPr>
+          <a:xfrm flipH="1">
+            <a:off x="3935344" y="889284"/>
+            <a:ext cx="2782956" cy="1326474"/>
+          </a:xfrm>
+          <a:prstGeom prst="parallelogram">
+            <a:avLst/>
+          </a:prstGeom>
+          <a:solidFill>
+            <a:srgbClr val="E51836"/>
+          </a:solidFill>
+          <a:ln>
+            <a:noFill/>
+          </a:ln>
+        </p:spPr>
+        <p:style>
+          <a:lnRef idx="2">
+            <a:schemeClr val="accent1">
+              <a:shade val="50000"/>
+            </a:schemeClr>
+          </a:lnRef>
+          <a:fillRef idx="1">
+            <a:schemeClr val="accent1"/>
+          </a:fillRef>
+          <a:effectRef idx="0">
+            <a:schemeClr val="accent1"/>
+          </a:effectRef>
+          <a:fontRef idx="minor">
+            <a:schemeClr val="lt1"/>
+          </a:fontRef>
+        </p:style>
+        <p:txBody>
+          <a:bodyPr rtlCol="0" anchor="ctr"/>
+          <a:lstStyle/>
+          <a:p>
+            <a:pPr algn="ctr"/>
+            <a:endParaRPr lang="en-US"/>
           </a:p>
         </p:txBody>
       </p:sp>
@@ -13197,6 +13853,108 @@
       </p:grpSpPr>
       <p:sp>
         <p:nvSpPr>
+          <p:cNvPr id="14" name="Rectangle 13">
+            <a:extLst>
+              <a:ext uri="{FF2B5EF4-FFF2-40B4-BE49-F238E27FC236}">
+                <a16:creationId xmlns:a16="http://schemas.microsoft.com/office/drawing/2014/main" id="{14645D93-2E42-4880-8EBA-8E85F8AFFEE0}"/>
+              </a:ext>
+            </a:extLst>
+          </p:cNvPr>
+          <p:cNvSpPr/>
+          <p:nvPr/>
+        </p:nvSpPr>
+        <p:spPr>
+          <a:xfrm>
+            <a:off x="4518989" y="1091127"/>
+            <a:ext cx="3521925" cy="4774588"/>
+          </a:xfrm>
+          <a:prstGeom prst="rect">
+            <a:avLst/>
+          </a:prstGeom>
+          <a:solidFill>
+            <a:srgbClr val="E51836">
+              <a:alpha val="92000"/>
+            </a:srgbClr>
+          </a:solidFill>
+        </p:spPr>
+        <p:style>
+          <a:lnRef idx="2">
+            <a:schemeClr val="accent1">
+              <a:shade val="50000"/>
+            </a:schemeClr>
+          </a:lnRef>
+          <a:fillRef idx="1">
+            <a:schemeClr val="accent1"/>
+          </a:fillRef>
+          <a:effectRef idx="0">
+            <a:schemeClr val="accent1"/>
+          </a:effectRef>
+          <a:fontRef idx="minor">
+            <a:schemeClr val="lt1"/>
+          </a:fontRef>
+        </p:style>
+        <p:txBody>
+          <a:bodyPr rtlCol="0" anchor="ctr"/>
+          <a:lstStyle/>
+          <a:p>
+            <a:pPr algn="ctr"/>
+            <a:endParaRPr lang="en-US"/>
+          </a:p>
+        </p:txBody>
+      </p:sp>
+      <p:sp>
+        <p:nvSpPr>
+          <p:cNvPr id="9" name="Rectangle 8">
+            <a:extLst>
+              <a:ext uri="{FF2B5EF4-FFF2-40B4-BE49-F238E27FC236}">
+                <a16:creationId xmlns:a16="http://schemas.microsoft.com/office/drawing/2014/main" id="{2E0A3795-8CCC-4CF8-94BF-46A316F7888F}"/>
+              </a:ext>
+            </a:extLst>
+          </p:cNvPr>
+          <p:cNvSpPr/>
+          <p:nvPr/>
+        </p:nvSpPr>
+        <p:spPr>
+          <a:xfrm>
+            <a:off x="887896" y="2042951"/>
+            <a:ext cx="2849218" cy="1477322"/>
+          </a:xfrm>
+          <a:prstGeom prst="rect">
+            <a:avLst/>
+          </a:prstGeom>
+          <a:solidFill>
+            <a:srgbClr val="E51836">
+              <a:alpha val="92000"/>
+            </a:srgbClr>
+          </a:solidFill>
+        </p:spPr>
+        <p:style>
+          <a:lnRef idx="2">
+            <a:schemeClr val="accent1">
+              <a:shade val="50000"/>
+            </a:schemeClr>
+          </a:lnRef>
+          <a:fillRef idx="1">
+            <a:schemeClr val="accent1"/>
+          </a:fillRef>
+          <a:effectRef idx="0">
+            <a:schemeClr val="accent1"/>
+          </a:effectRef>
+          <a:fontRef idx="minor">
+            <a:schemeClr val="lt1"/>
+          </a:fontRef>
+        </p:style>
+        <p:txBody>
+          <a:bodyPr rtlCol="0" anchor="ctr"/>
+          <a:lstStyle/>
+          <a:p>
+            <a:pPr algn="ctr"/>
+            <a:endParaRPr lang="en-US"/>
+          </a:p>
+        </p:txBody>
+      </p:sp>
+      <p:sp>
+        <p:nvSpPr>
           <p:cNvPr id="2" name="Title 1">
             <a:extLst>
               <a:ext uri="{FF2B5EF4-FFF2-40B4-BE49-F238E27FC236}">
@@ -13419,7 +14177,7 @@
         </p:blipFill>
         <p:spPr>
           <a:xfrm>
-            <a:off x="4572000" y="1194235"/>
+            <a:off x="4598554" y="1194235"/>
             <a:ext cx="3362794" cy="4572638"/>
           </a:xfrm>
           <a:prstGeom prst="rect">
@@ -13441,7 +14199,7 @@
         </p:nvSpPr>
         <p:spPr>
           <a:xfrm>
-            <a:off x="936693" y="2042952"/>
+            <a:off x="887896" y="2059814"/>
             <a:ext cx="2985950" cy="1477328"/>
           </a:xfrm>
           <a:prstGeom prst="rect">
@@ -13457,13 +14215,20 @@
           <a:p>
             <a:r>
               <a:rPr lang="en-US" dirty="0">
+                <a:solidFill>
+                  <a:schemeClr val="bg1"/>
+                </a:solidFill>
                 <a:latin typeface="Microsoft Sans Serif" panose="020B0604020202020204" pitchFamily="34" charset="0"/>
                 <a:ea typeface="Microsoft Sans Serif" panose="020B0604020202020204" pitchFamily="34" charset="0"/>
                 <a:cs typeface="Microsoft Sans Serif" panose="020B0604020202020204" pitchFamily="34" charset="0"/>
               </a:rPr>
               <a:t>This code takes all the home games and groups them by team to sort them by lowest to highest average attendance.</a:t>
             </a:r>
-            <a:endParaRPr lang="en-US" dirty="0"/>
+            <a:endParaRPr lang="en-US" dirty="0">
+              <a:solidFill>
+                <a:schemeClr val="bg1"/>
+              </a:solidFill>
+            </a:endParaRPr>
           </a:p>
         </p:txBody>
       </p:sp>
@@ -13734,23 +14499,7 @@
                 <a:ea typeface="Microsoft Sans Serif" panose="020B0604020202020204" pitchFamily="34" charset="0"/>
                 <a:cs typeface="Microsoft Sans Serif" panose="020B0604020202020204" pitchFamily="34" charset="0"/>
               </a:rPr>
-              <a:t>The resulting </a:t>
-            </a:r>
-            <a:r>
-              <a:rPr lang="en-US" dirty="0" err="1">
-                <a:latin typeface="Microsoft Sans Serif" panose="020B0604020202020204" pitchFamily="34" charset="0"/>
-                <a:ea typeface="Microsoft Sans Serif" panose="020B0604020202020204" pitchFamily="34" charset="0"/>
-                <a:cs typeface="Microsoft Sans Serif" panose="020B0604020202020204" pitchFamily="34" charset="0"/>
-              </a:rPr>
-              <a:t>dataframe</a:t>
-            </a:r>
-            <a:r>
-              <a:rPr lang="en-US" dirty="0">
-                <a:latin typeface="Microsoft Sans Serif" panose="020B0604020202020204" pitchFamily="34" charset="0"/>
-                <a:ea typeface="Microsoft Sans Serif" panose="020B0604020202020204" pitchFamily="34" charset="0"/>
-                <a:cs typeface="Microsoft Sans Serif" panose="020B0604020202020204" pitchFamily="34" charset="0"/>
-              </a:rPr>
-              <a:t> is what we used to derived the following plots.</a:t>
+              <a:t>The resulting dataframe is what we used to derived the following plots.</a:t>
             </a:r>
             <a:endParaRPr lang="en-US" dirty="0"/>
           </a:p>
@@ -14157,80 +14906,10 @@
       </p:grpSpPr>
       <p:sp>
         <p:nvSpPr>
-          <p:cNvPr id="2" name="Title 1">
-            <a:extLst>
-              <a:ext uri="{FF2B5EF4-FFF2-40B4-BE49-F238E27FC236}">
-                <a16:creationId xmlns:a16="http://schemas.microsoft.com/office/drawing/2014/main" id="{A8E5541F-7BFA-479C-B8B4-DDE116914320}"/>
-              </a:ext>
-            </a:extLst>
-          </p:cNvPr>
-          <p:cNvSpPr>
-            <a:spLocks noGrp="1"/>
-          </p:cNvSpPr>
-          <p:nvPr>
-            <p:ph type="title"/>
-          </p:nvPr>
-        </p:nvSpPr>
-        <p:spPr>
-          <a:xfrm>
-            <a:off x="522632" y="58022"/>
-            <a:ext cx="7886700" cy="705648"/>
-          </a:xfrm>
-        </p:spPr>
-        <p:txBody>
-          <a:bodyPr>
-            <a:normAutofit/>
-          </a:bodyPr>
-          <a:lstStyle/>
-          <a:p>
-            <a:r>
-              <a:rPr lang="en-US" sz="2800" dirty="0">
-                <a:latin typeface="Microsoft Sans Serif" panose="020B0604020202020204" pitchFamily="34" charset="0"/>
-                <a:ea typeface="Microsoft Sans Serif" panose="020B0604020202020204" pitchFamily="34" charset="0"/>
-                <a:cs typeface="Microsoft Sans Serif" panose="020B0604020202020204" pitchFamily="34" charset="0"/>
-              </a:rPr>
-              <a:t>Home vs Away Teams – Field Goal Percentage</a:t>
-            </a:r>
-            <a:endParaRPr lang="en-US" sz="2800" dirty="0"/>
-          </a:p>
-        </p:txBody>
-      </p:sp>
-      <p:pic>
-        <p:nvPicPr>
-          <p:cNvPr id="5" name="Picture 4">
-            <a:extLst>
-              <a:ext uri="{FF2B5EF4-FFF2-40B4-BE49-F238E27FC236}">
-                <a16:creationId xmlns:a16="http://schemas.microsoft.com/office/drawing/2014/main" id="{F112826D-8205-4543-9CA7-8C18E18B2A81}"/>
-              </a:ext>
-            </a:extLst>
-          </p:cNvPr>
-          <p:cNvPicPr>
-            <a:picLocks noChangeAspect="1"/>
-          </p:cNvPicPr>
-          <p:nvPr/>
-        </p:nvPicPr>
-        <p:blipFill>
-          <a:blip r:embed="rId2"/>
-          <a:stretch>
-            <a:fillRect/>
-          </a:stretch>
-        </p:blipFill>
-        <p:spPr>
-          <a:xfrm>
-            <a:off x="0" y="6276894"/>
-            <a:ext cx="1991003" cy="581106"/>
-          </a:xfrm>
-          <a:prstGeom prst="rect">
-            <a:avLst/>
-          </a:prstGeom>
-        </p:spPr>
-      </p:pic>
-      <p:sp>
-        <p:nvSpPr>
-          <p:cNvPr id="8" name="Rectangle 7">
-            <a:extLst>
-              <a:ext uri="{FF2B5EF4-FFF2-40B4-BE49-F238E27FC236}">
-                <a16:creationId xmlns:a16="http://schemas.microsoft.com/office/drawing/2014/main" id="{7819BA35-EE0F-4ABB-BEBA-21534EB9317F}"/>
+          <p:cNvPr id="13" name="Rectangle 12">
+            <a:extLst>
+              <a:ext uri="{FF2B5EF4-FFF2-40B4-BE49-F238E27FC236}">
+                <a16:creationId xmlns:a16="http://schemas.microsoft.com/office/drawing/2014/main" id="{D2C57362-8CC8-44A0-A0A0-25CE97869D38}"/>
               </a:ext>
             </a:extLst>
           </p:cNvPr>
@@ -14239,20 +14918,17 @@
         </p:nvSpPr>
         <p:spPr>
           <a:xfrm>
-            <a:off x="522632" y="6276894"/>
-            <a:ext cx="7992717" cy="45719"/>
+            <a:off x="2208242" y="877300"/>
+            <a:ext cx="4629880" cy="1909023"/>
           </a:xfrm>
           <a:prstGeom prst="rect">
             <a:avLst/>
           </a:prstGeom>
           <a:solidFill>
-            <a:srgbClr val="E51836"/>
+            <a:srgbClr val="E51836">
+              <a:alpha val="76000"/>
+            </a:srgbClr>
           </a:solidFill>
-          <a:ln>
-            <a:solidFill>
-              <a:srgbClr val="E51836"/>
-            </a:solidFill>
-          </a:ln>
         </p:spPr>
         <p:style>
           <a:lnRef idx="2">
@@ -14279,6 +14955,130 @@
           </a:p>
         </p:txBody>
       </p:sp>
+      <p:sp>
+        <p:nvSpPr>
+          <p:cNvPr id="2" name="Title 1">
+            <a:extLst>
+              <a:ext uri="{FF2B5EF4-FFF2-40B4-BE49-F238E27FC236}">
+                <a16:creationId xmlns:a16="http://schemas.microsoft.com/office/drawing/2014/main" id="{A8E5541F-7BFA-479C-B8B4-DDE116914320}"/>
+              </a:ext>
+            </a:extLst>
+          </p:cNvPr>
+          <p:cNvSpPr>
+            <a:spLocks noGrp="1"/>
+          </p:cNvSpPr>
+          <p:nvPr>
+            <p:ph type="title"/>
+          </p:nvPr>
+        </p:nvSpPr>
+        <p:spPr>
+          <a:xfrm>
+            <a:off x="522632" y="58022"/>
+            <a:ext cx="7886700" cy="705648"/>
+          </a:xfrm>
+        </p:spPr>
+        <p:txBody>
+          <a:bodyPr>
+            <a:normAutofit/>
+          </a:bodyPr>
+          <a:lstStyle/>
+          <a:p>
+            <a:r>
+              <a:rPr lang="en-US" sz="2800" dirty="0">
+                <a:latin typeface="Microsoft Sans Serif" panose="020B0604020202020204" pitchFamily="34" charset="0"/>
+                <a:ea typeface="Microsoft Sans Serif" panose="020B0604020202020204" pitchFamily="34" charset="0"/>
+                <a:cs typeface="Microsoft Sans Serif" panose="020B0604020202020204" pitchFamily="34" charset="0"/>
+              </a:rPr>
+              <a:t>Home vs Away Teams – Field Goal Percentage</a:t>
+            </a:r>
+            <a:endParaRPr lang="en-US" sz="2800" dirty="0"/>
+          </a:p>
+        </p:txBody>
+      </p:sp>
+      <p:pic>
+        <p:nvPicPr>
+          <p:cNvPr id="5" name="Picture 4">
+            <a:extLst>
+              <a:ext uri="{FF2B5EF4-FFF2-40B4-BE49-F238E27FC236}">
+                <a16:creationId xmlns:a16="http://schemas.microsoft.com/office/drawing/2014/main" id="{F112826D-8205-4543-9CA7-8C18E18B2A81}"/>
+              </a:ext>
+            </a:extLst>
+          </p:cNvPr>
+          <p:cNvPicPr>
+            <a:picLocks noChangeAspect="1"/>
+          </p:cNvPicPr>
+          <p:nvPr/>
+        </p:nvPicPr>
+        <p:blipFill>
+          <a:blip r:embed="rId2"/>
+          <a:stretch>
+            <a:fillRect/>
+          </a:stretch>
+        </p:blipFill>
+        <p:spPr>
+          <a:xfrm>
+            <a:off x="0" y="6276894"/>
+            <a:ext cx="1991003" cy="581106"/>
+          </a:xfrm>
+          <a:prstGeom prst="rect">
+            <a:avLst/>
+          </a:prstGeom>
+        </p:spPr>
+      </p:pic>
+      <p:sp>
+        <p:nvSpPr>
+          <p:cNvPr id="8" name="Rectangle 7">
+            <a:extLst>
+              <a:ext uri="{FF2B5EF4-FFF2-40B4-BE49-F238E27FC236}">
+                <a16:creationId xmlns:a16="http://schemas.microsoft.com/office/drawing/2014/main" id="{7819BA35-EE0F-4ABB-BEBA-21534EB9317F}"/>
+              </a:ext>
+            </a:extLst>
+          </p:cNvPr>
+          <p:cNvSpPr/>
+          <p:nvPr/>
+        </p:nvSpPr>
+        <p:spPr>
+          <a:xfrm>
+            <a:off x="522632" y="6276894"/>
+            <a:ext cx="7992717" cy="45719"/>
+          </a:xfrm>
+          <a:prstGeom prst="rect">
+            <a:avLst/>
+          </a:prstGeom>
+          <a:solidFill>
+            <a:srgbClr val="E51836"/>
+          </a:solidFill>
+          <a:ln>
+            <a:solidFill>
+              <a:srgbClr val="E51836"/>
+            </a:solidFill>
+          </a:ln>
+        </p:spPr>
+        <p:style>
+          <a:lnRef idx="2">
+            <a:schemeClr val="accent1">
+              <a:shade val="50000"/>
+            </a:schemeClr>
+          </a:lnRef>
+          <a:fillRef idx="1">
+            <a:schemeClr val="accent1"/>
+          </a:fillRef>
+          <a:effectRef idx="0">
+            <a:schemeClr val="accent1"/>
+          </a:effectRef>
+          <a:fontRef idx="minor">
+            <a:schemeClr val="lt1"/>
+          </a:fontRef>
+        </p:style>
+        <p:txBody>
+          <a:bodyPr rtlCol="0" anchor="ctr"/>
+          <a:lstStyle/>
+          <a:p>
+            <a:pPr algn="ctr"/>
+            <a:endParaRPr lang="en-US"/>
+          </a:p>
+        </p:txBody>
+      </p:sp>
       <p:cxnSp>
         <p:nvCxnSpPr>
           <p:cNvPr id="10" name="Straight Connector 9">
@@ -14431,7 +15231,7 @@
         </p:blipFill>
         <p:spPr>
           <a:xfrm>
-            <a:off x="2208242" y="911039"/>
+            <a:off x="2261250" y="922046"/>
             <a:ext cx="4515480" cy="1819529"/>
           </a:xfrm>
           <a:prstGeom prst="rect">
@@ -15369,80 +16169,10 @@
       </p:grpSpPr>
       <p:sp>
         <p:nvSpPr>
-          <p:cNvPr id="2" name="Title 1">
-            <a:extLst>
-              <a:ext uri="{FF2B5EF4-FFF2-40B4-BE49-F238E27FC236}">
-                <a16:creationId xmlns:a16="http://schemas.microsoft.com/office/drawing/2014/main" id="{A8E5541F-7BFA-479C-B8B4-DDE116914320}"/>
-              </a:ext>
-            </a:extLst>
-          </p:cNvPr>
-          <p:cNvSpPr>
-            <a:spLocks noGrp="1"/>
-          </p:cNvSpPr>
-          <p:nvPr>
-            <p:ph type="title"/>
-          </p:nvPr>
-        </p:nvSpPr>
-        <p:spPr>
-          <a:xfrm>
-            <a:off x="522632" y="58022"/>
-            <a:ext cx="7886700" cy="705648"/>
-          </a:xfrm>
-        </p:spPr>
-        <p:txBody>
-          <a:bodyPr>
-            <a:normAutofit/>
-          </a:bodyPr>
-          <a:lstStyle/>
-          <a:p>
-            <a:r>
-              <a:rPr lang="en-US" sz="3200" dirty="0">
-                <a:latin typeface="Microsoft Sans Serif" panose="020B0604020202020204" pitchFamily="34" charset="0"/>
-                <a:ea typeface="Microsoft Sans Serif" panose="020B0604020202020204" pitchFamily="34" charset="0"/>
-                <a:cs typeface="Microsoft Sans Serif" panose="020B0604020202020204" pitchFamily="34" charset="0"/>
-              </a:rPr>
-              <a:t>Team Analysis - Code</a:t>
-            </a:r>
-            <a:endParaRPr lang="en-US" sz="3200" dirty="0"/>
-          </a:p>
-        </p:txBody>
-      </p:sp>
-      <p:pic>
-        <p:nvPicPr>
-          <p:cNvPr id="5" name="Picture 4">
-            <a:extLst>
-              <a:ext uri="{FF2B5EF4-FFF2-40B4-BE49-F238E27FC236}">
-                <a16:creationId xmlns:a16="http://schemas.microsoft.com/office/drawing/2014/main" id="{F112826D-8205-4543-9CA7-8C18E18B2A81}"/>
-              </a:ext>
-            </a:extLst>
-          </p:cNvPr>
-          <p:cNvPicPr>
-            <a:picLocks noChangeAspect="1"/>
-          </p:cNvPicPr>
-          <p:nvPr/>
-        </p:nvPicPr>
-        <p:blipFill>
-          <a:blip r:embed="rId2"/>
-          <a:stretch>
-            <a:fillRect/>
-          </a:stretch>
-        </p:blipFill>
-        <p:spPr>
-          <a:xfrm>
-            <a:off x="0" y="6276894"/>
-            <a:ext cx="1991003" cy="581106"/>
-          </a:xfrm>
-          <a:prstGeom prst="rect">
-            <a:avLst/>
-          </a:prstGeom>
-        </p:spPr>
-      </p:pic>
-      <p:sp>
-        <p:nvSpPr>
-          <p:cNvPr id="8" name="Rectangle 7">
-            <a:extLst>
-              <a:ext uri="{FF2B5EF4-FFF2-40B4-BE49-F238E27FC236}">
-                <a16:creationId xmlns:a16="http://schemas.microsoft.com/office/drawing/2014/main" id="{7819BA35-EE0F-4ABB-BEBA-21534EB9317F}"/>
+          <p:cNvPr id="12" name="Rectangle 11">
+            <a:extLst>
+              <a:ext uri="{FF2B5EF4-FFF2-40B4-BE49-F238E27FC236}">
+                <a16:creationId xmlns:a16="http://schemas.microsoft.com/office/drawing/2014/main" id="{7C634544-A705-45DA-BD6C-CA477585C67F}"/>
               </a:ext>
             </a:extLst>
           </p:cNvPr>
@@ -15451,20 +16181,17 @@
         </p:nvSpPr>
         <p:spPr>
           <a:xfrm>
-            <a:off x="522632" y="6276894"/>
-            <a:ext cx="7992717" cy="45719"/>
+            <a:off x="522632" y="2191657"/>
+            <a:ext cx="7886700" cy="3001189"/>
           </a:xfrm>
           <a:prstGeom prst="rect">
             <a:avLst/>
           </a:prstGeom>
           <a:solidFill>
-            <a:srgbClr val="E51836"/>
+            <a:srgbClr val="E51836">
+              <a:alpha val="92000"/>
+            </a:srgbClr>
           </a:solidFill>
-          <a:ln>
-            <a:solidFill>
-              <a:srgbClr val="E51836"/>
-            </a:solidFill>
-          </a:ln>
         </p:spPr>
         <p:style>
           <a:lnRef idx="2">
@@ -15491,6 +16218,130 @@
           </a:p>
         </p:txBody>
       </p:sp>
+      <p:sp>
+        <p:nvSpPr>
+          <p:cNvPr id="2" name="Title 1">
+            <a:extLst>
+              <a:ext uri="{FF2B5EF4-FFF2-40B4-BE49-F238E27FC236}">
+                <a16:creationId xmlns:a16="http://schemas.microsoft.com/office/drawing/2014/main" id="{A8E5541F-7BFA-479C-B8B4-DDE116914320}"/>
+              </a:ext>
+            </a:extLst>
+          </p:cNvPr>
+          <p:cNvSpPr>
+            <a:spLocks noGrp="1"/>
+          </p:cNvSpPr>
+          <p:nvPr>
+            <p:ph type="title"/>
+          </p:nvPr>
+        </p:nvSpPr>
+        <p:spPr>
+          <a:xfrm>
+            <a:off x="522632" y="58022"/>
+            <a:ext cx="7886700" cy="705648"/>
+          </a:xfrm>
+        </p:spPr>
+        <p:txBody>
+          <a:bodyPr>
+            <a:normAutofit/>
+          </a:bodyPr>
+          <a:lstStyle/>
+          <a:p>
+            <a:r>
+              <a:rPr lang="en-US" sz="3200" dirty="0">
+                <a:latin typeface="Microsoft Sans Serif" panose="020B0604020202020204" pitchFamily="34" charset="0"/>
+                <a:ea typeface="Microsoft Sans Serif" panose="020B0604020202020204" pitchFamily="34" charset="0"/>
+                <a:cs typeface="Microsoft Sans Serif" panose="020B0604020202020204" pitchFamily="34" charset="0"/>
+              </a:rPr>
+              <a:t>Team Analysis - Code</a:t>
+            </a:r>
+            <a:endParaRPr lang="en-US" sz="3200" dirty="0"/>
+          </a:p>
+        </p:txBody>
+      </p:sp>
+      <p:pic>
+        <p:nvPicPr>
+          <p:cNvPr id="5" name="Picture 4">
+            <a:extLst>
+              <a:ext uri="{FF2B5EF4-FFF2-40B4-BE49-F238E27FC236}">
+                <a16:creationId xmlns:a16="http://schemas.microsoft.com/office/drawing/2014/main" id="{F112826D-8205-4543-9CA7-8C18E18B2A81}"/>
+              </a:ext>
+            </a:extLst>
+          </p:cNvPr>
+          <p:cNvPicPr>
+            <a:picLocks noChangeAspect="1"/>
+          </p:cNvPicPr>
+          <p:nvPr/>
+        </p:nvPicPr>
+        <p:blipFill>
+          <a:blip r:embed="rId2"/>
+          <a:stretch>
+            <a:fillRect/>
+          </a:stretch>
+        </p:blipFill>
+        <p:spPr>
+          <a:xfrm>
+            <a:off x="0" y="6276894"/>
+            <a:ext cx="1991003" cy="581106"/>
+          </a:xfrm>
+          <a:prstGeom prst="rect">
+            <a:avLst/>
+          </a:prstGeom>
+        </p:spPr>
+      </p:pic>
+      <p:sp>
+        <p:nvSpPr>
+          <p:cNvPr id="8" name="Rectangle 7">
+            <a:extLst>
+              <a:ext uri="{FF2B5EF4-FFF2-40B4-BE49-F238E27FC236}">
+                <a16:creationId xmlns:a16="http://schemas.microsoft.com/office/drawing/2014/main" id="{7819BA35-EE0F-4ABB-BEBA-21534EB9317F}"/>
+              </a:ext>
+            </a:extLst>
+          </p:cNvPr>
+          <p:cNvSpPr/>
+          <p:nvPr/>
+        </p:nvSpPr>
+        <p:spPr>
+          <a:xfrm>
+            <a:off x="522632" y="6276894"/>
+            <a:ext cx="7992717" cy="45719"/>
+          </a:xfrm>
+          <a:prstGeom prst="rect">
+            <a:avLst/>
+          </a:prstGeom>
+          <a:solidFill>
+            <a:srgbClr val="E51836"/>
+          </a:solidFill>
+          <a:ln>
+            <a:solidFill>
+              <a:srgbClr val="E51836"/>
+            </a:solidFill>
+          </a:ln>
+        </p:spPr>
+        <p:style>
+          <a:lnRef idx="2">
+            <a:schemeClr val="accent1">
+              <a:shade val="50000"/>
+            </a:schemeClr>
+          </a:lnRef>
+          <a:fillRef idx="1">
+            <a:schemeClr val="accent1"/>
+          </a:fillRef>
+          <a:effectRef idx="0">
+            <a:schemeClr val="accent1"/>
+          </a:effectRef>
+          <a:fontRef idx="minor">
+            <a:schemeClr val="lt1"/>
+          </a:fontRef>
+        </p:style>
+        <p:txBody>
+          <a:bodyPr rtlCol="0" anchor="ctr"/>
+          <a:lstStyle/>
+          <a:p>
+            <a:pPr algn="ctr"/>
+            <a:endParaRPr lang="en-US"/>
+          </a:p>
+        </p:txBody>
+      </p:sp>
       <p:cxnSp>
         <p:nvCxnSpPr>
           <p:cNvPr id="10" name="Straight Connector 9">
@@ -15623,7 +16474,7 @@
         </p:blipFill>
         <p:spPr>
           <a:xfrm>
-            <a:off x="720292" y="2340838"/>
+            <a:off x="621461" y="2283104"/>
             <a:ext cx="7689040" cy="2818294"/>
           </a:xfrm>
           <a:prstGeom prst="rect">
@@ -16257,6 +17108,58 @@
       </p:grpSpPr>
       <p:sp>
         <p:nvSpPr>
+          <p:cNvPr id="6" name="Rectangle 5">
+            <a:extLst>
+              <a:ext uri="{FF2B5EF4-FFF2-40B4-BE49-F238E27FC236}">
+                <a16:creationId xmlns:a16="http://schemas.microsoft.com/office/drawing/2014/main" id="{EDEA0463-AE94-4A9C-BB56-B67BD7E4D21F}"/>
+              </a:ext>
+            </a:extLst>
+          </p:cNvPr>
+          <p:cNvSpPr/>
+          <p:nvPr/>
+        </p:nvSpPr>
+        <p:spPr>
+          <a:xfrm>
+            <a:off x="0" y="2663687"/>
+            <a:ext cx="9144000" cy="2001068"/>
+          </a:xfrm>
+          <a:prstGeom prst="rect">
+            <a:avLst/>
+          </a:prstGeom>
+          <a:solidFill>
+            <a:srgbClr val="E51836"/>
+          </a:solidFill>
+          <a:ln>
+            <a:noFill/>
+          </a:ln>
+        </p:spPr>
+        <p:style>
+          <a:lnRef idx="2">
+            <a:schemeClr val="accent1">
+              <a:shade val="50000"/>
+            </a:schemeClr>
+          </a:lnRef>
+          <a:fillRef idx="1">
+            <a:schemeClr val="accent1"/>
+          </a:fillRef>
+          <a:effectRef idx="0">
+            <a:schemeClr val="accent1"/>
+          </a:effectRef>
+          <a:fontRef idx="minor">
+            <a:schemeClr val="lt1"/>
+          </a:fontRef>
+        </p:style>
+        <p:txBody>
+          <a:bodyPr rtlCol="0" anchor="ctr"/>
+          <a:lstStyle/>
+          <a:p>
+            <a:pPr algn="ctr"/>
+            <a:endParaRPr lang="en-US"/>
+          </a:p>
+        </p:txBody>
+      </p:sp>
+      <p:sp>
+        <p:nvSpPr>
           <p:cNvPr id="2" name="Title 1">
             <a:extLst>
               <a:ext uri="{FF2B5EF4-FFF2-40B4-BE49-F238E27FC236}">
@@ -16308,7 +17211,7 @@
           <p:nvPr>
             <p:extLst>
               <p:ext uri="{D42A27DB-BD31-4B8C-83A1-F6EECF244321}">
-                <p14:modId xmlns:p14="http://schemas.microsoft.com/office/powerpoint/2010/main" val="2126155411"/>
+                <p14:modId xmlns:p14="http://schemas.microsoft.com/office/powerpoint/2010/main" val="518913486"/>
               </p:ext>
             </p:extLst>
           </p:nvPr>
@@ -18610,7 +19513,7 @@
         </p:nvSpPr>
         <p:spPr>
           <a:xfrm>
-            <a:off x="1417983" y="4068416"/>
+            <a:off x="1417983" y="3928127"/>
             <a:ext cx="6202017" cy="646331"/>
           </a:xfrm>
           <a:prstGeom prst="rect">
@@ -18635,6 +19538,186 @@
           </a:p>
         </p:txBody>
       </p:sp>
+      <p:pic>
+        <p:nvPicPr>
+          <p:cNvPr id="6" name="Picture 5">
+            <a:extLst>
+              <a:ext uri="{FF2B5EF4-FFF2-40B4-BE49-F238E27FC236}">
+                <a16:creationId xmlns:a16="http://schemas.microsoft.com/office/drawing/2014/main" id="{13811F3C-3F49-4408-9C18-E93A3A4DF66C}"/>
+              </a:ext>
+            </a:extLst>
+          </p:cNvPr>
+          <p:cNvPicPr>
+            <a:picLocks noChangeAspect="1"/>
+          </p:cNvPicPr>
+          <p:nvPr/>
+        </p:nvPicPr>
+        <p:blipFill>
+          <a:blip r:embed="rId3"/>
+          <a:stretch>
+            <a:fillRect/>
+          </a:stretch>
+        </p:blipFill>
+        <p:spPr>
+          <a:xfrm>
+            <a:off x="637175" y="4695058"/>
+            <a:ext cx="859343" cy="844178"/>
+          </a:xfrm>
+          <a:prstGeom prst="rect">
+            <a:avLst/>
+          </a:prstGeom>
+        </p:spPr>
+      </p:pic>
+      <p:pic>
+        <p:nvPicPr>
+          <p:cNvPr id="9" name="Picture 8">
+            <a:extLst>
+              <a:ext uri="{FF2B5EF4-FFF2-40B4-BE49-F238E27FC236}">
+                <a16:creationId xmlns:a16="http://schemas.microsoft.com/office/drawing/2014/main" id="{D34CF676-983B-4850-87D6-E16E8BB63830}"/>
+              </a:ext>
+            </a:extLst>
+          </p:cNvPr>
+          <p:cNvPicPr>
+            <a:picLocks noChangeAspect="1"/>
+          </p:cNvPicPr>
+          <p:nvPr/>
+        </p:nvPicPr>
+        <p:blipFill>
+          <a:blip r:embed="rId4"/>
+          <a:stretch>
+            <a:fillRect/>
+          </a:stretch>
+        </p:blipFill>
+        <p:spPr>
+          <a:xfrm>
+            <a:off x="3459314" y="4810208"/>
+            <a:ext cx="685896" cy="819264"/>
+          </a:xfrm>
+          <a:prstGeom prst="rect">
+            <a:avLst/>
+          </a:prstGeom>
+        </p:spPr>
+      </p:pic>
+      <p:pic>
+        <p:nvPicPr>
+          <p:cNvPr id="12" name="Picture 11">
+            <a:extLst>
+              <a:ext uri="{FF2B5EF4-FFF2-40B4-BE49-F238E27FC236}">
+                <a16:creationId xmlns:a16="http://schemas.microsoft.com/office/drawing/2014/main" id="{FD1B8922-DDDA-4BA6-BCFB-A6B901C09DB6}"/>
+              </a:ext>
+            </a:extLst>
+          </p:cNvPr>
+          <p:cNvPicPr>
+            <a:picLocks noChangeAspect="1"/>
+          </p:cNvPicPr>
+          <p:nvPr/>
+        </p:nvPicPr>
+        <p:blipFill>
+          <a:blip r:embed="rId5"/>
+          <a:stretch>
+            <a:fillRect/>
+          </a:stretch>
+        </p:blipFill>
+        <p:spPr>
+          <a:xfrm>
+            <a:off x="6266559" y="4995971"/>
+            <a:ext cx="2200582" cy="447738"/>
+          </a:xfrm>
+          <a:prstGeom prst="rect">
+            <a:avLst/>
+          </a:prstGeom>
+        </p:spPr>
+      </p:pic>
+      <p:pic>
+        <p:nvPicPr>
+          <p:cNvPr id="13" name="Picture 12">
+            <a:extLst>
+              <a:ext uri="{FF2B5EF4-FFF2-40B4-BE49-F238E27FC236}">
+                <a16:creationId xmlns:a16="http://schemas.microsoft.com/office/drawing/2014/main" id="{F90995BB-FCB9-46AF-8E01-9A8D756A62B8}"/>
+              </a:ext>
+            </a:extLst>
+          </p:cNvPr>
+          <p:cNvPicPr>
+            <a:picLocks noChangeAspect="1"/>
+          </p:cNvPicPr>
+          <p:nvPr/>
+        </p:nvPicPr>
+        <p:blipFill>
+          <a:blip r:embed="rId6"/>
+          <a:stretch>
+            <a:fillRect/>
+          </a:stretch>
+        </p:blipFill>
+        <p:spPr>
+          <a:xfrm>
+            <a:off x="1966285" y="4765090"/>
+            <a:ext cx="1052485" cy="819264"/>
+          </a:xfrm>
+          <a:prstGeom prst="rect">
+            <a:avLst/>
+          </a:prstGeom>
+        </p:spPr>
+      </p:pic>
+      <p:pic>
+        <p:nvPicPr>
+          <p:cNvPr id="14" name="Picture 13">
+            <a:extLst>
+              <a:ext uri="{FF2B5EF4-FFF2-40B4-BE49-F238E27FC236}">
+                <a16:creationId xmlns:a16="http://schemas.microsoft.com/office/drawing/2014/main" id="{2E0954EE-0189-4538-B4DA-7AADA2C8F9D0}"/>
+              </a:ext>
+            </a:extLst>
+          </p:cNvPr>
+          <p:cNvPicPr>
+            <a:picLocks noChangeAspect="1"/>
+          </p:cNvPicPr>
+          <p:nvPr/>
+        </p:nvPicPr>
+        <p:blipFill>
+          <a:blip r:embed="rId7"/>
+          <a:stretch>
+            <a:fillRect/>
+          </a:stretch>
+        </p:blipFill>
+        <p:spPr>
+          <a:xfrm>
+            <a:off x="6223016" y="4424102"/>
+            <a:ext cx="2010056" cy="304843"/>
+          </a:xfrm>
+          <a:prstGeom prst="rect">
+            <a:avLst/>
+          </a:prstGeom>
+        </p:spPr>
+      </p:pic>
+      <p:pic>
+        <p:nvPicPr>
+          <p:cNvPr id="15" name="Picture 14">
+            <a:extLst>
+              <a:ext uri="{FF2B5EF4-FFF2-40B4-BE49-F238E27FC236}">
+                <a16:creationId xmlns:a16="http://schemas.microsoft.com/office/drawing/2014/main" id="{2D77546F-1344-4900-ABBC-82763C3E967B}"/>
+              </a:ext>
+            </a:extLst>
+          </p:cNvPr>
+          <p:cNvPicPr>
+            <a:picLocks noChangeAspect="1"/>
+          </p:cNvPicPr>
+          <p:nvPr/>
+        </p:nvPicPr>
+        <p:blipFill>
+          <a:blip r:embed="rId8"/>
+          <a:stretch>
+            <a:fillRect/>
+          </a:stretch>
+        </p:blipFill>
+        <p:spPr>
+          <a:xfrm>
+            <a:off x="4681275" y="4864525"/>
+            <a:ext cx="1199049" cy="631264"/>
+          </a:xfrm>
+          <a:prstGeom prst="rect">
+            <a:avLst/>
+          </a:prstGeom>
+        </p:spPr>
+      </p:pic>
     </p:spTree>
     <p:extLst>
       <p:ext uri="{BB962C8B-B14F-4D97-AF65-F5344CB8AC3E}">
@@ -18667,6 +19750,57 @@
       </p:grpSpPr>
       <p:sp>
         <p:nvSpPr>
+          <p:cNvPr id="12" name="Rectangle 11">
+            <a:extLst>
+              <a:ext uri="{FF2B5EF4-FFF2-40B4-BE49-F238E27FC236}">
+                <a16:creationId xmlns:a16="http://schemas.microsoft.com/office/drawing/2014/main" id="{A767E571-7C04-47C5-ADE1-B5A766AB8AF1}"/>
+              </a:ext>
+            </a:extLst>
+          </p:cNvPr>
+          <p:cNvSpPr/>
+          <p:nvPr/>
+        </p:nvSpPr>
+        <p:spPr>
+          <a:xfrm>
+            <a:off x="3191440" y="1098293"/>
+            <a:ext cx="5579450" cy="3067307"/>
+          </a:xfrm>
+          <a:prstGeom prst="rect">
+            <a:avLst/>
+          </a:prstGeom>
+          <a:solidFill>
+            <a:srgbClr val="E51836">
+              <a:alpha val="92000"/>
+            </a:srgbClr>
+          </a:solidFill>
+        </p:spPr>
+        <p:style>
+          <a:lnRef idx="2">
+            <a:schemeClr val="accent1">
+              <a:shade val="50000"/>
+            </a:schemeClr>
+          </a:lnRef>
+          <a:fillRef idx="1">
+            <a:schemeClr val="accent1"/>
+          </a:fillRef>
+          <a:effectRef idx="0">
+            <a:schemeClr val="accent1"/>
+          </a:effectRef>
+          <a:fontRef idx="minor">
+            <a:schemeClr val="lt1"/>
+          </a:fontRef>
+        </p:style>
+        <p:txBody>
+          <a:bodyPr rtlCol="0" anchor="ctr"/>
+          <a:lstStyle/>
+          <a:p>
+            <a:pPr algn="ctr"/>
+            <a:endParaRPr lang="en-US"/>
+          </a:p>
+        </p:txBody>
+      </p:sp>
+      <p:sp>
+        <p:nvSpPr>
           <p:cNvPr id="2" name="Title 1">
             <a:extLst>
               <a:ext uri="{FF2B5EF4-FFF2-40B4-BE49-F238E27FC236}">
@@ -19018,6 +20152,57 @@
           <a:chExt cx="0" cy="0"/>
         </a:xfrm>
       </p:grpSpPr>
+      <p:sp>
+        <p:nvSpPr>
+          <p:cNvPr id="12" name="Rectangle 11">
+            <a:extLst>
+              <a:ext uri="{FF2B5EF4-FFF2-40B4-BE49-F238E27FC236}">
+                <a16:creationId xmlns:a16="http://schemas.microsoft.com/office/drawing/2014/main" id="{26DB2F87-FB33-4C34-8726-2EDF902D7FD0}"/>
+              </a:ext>
+            </a:extLst>
+          </p:cNvPr>
+          <p:cNvSpPr/>
+          <p:nvPr/>
+        </p:nvSpPr>
+        <p:spPr>
+          <a:xfrm>
+            <a:off x="2093809" y="1910909"/>
+            <a:ext cx="4505774" cy="2029514"/>
+          </a:xfrm>
+          <a:prstGeom prst="rect">
+            <a:avLst/>
+          </a:prstGeom>
+          <a:solidFill>
+            <a:srgbClr val="E51836">
+              <a:alpha val="38000"/>
+            </a:srgbClr>
+          </a:solidFill>
+        </p:spPr>
+        <p:style>
+          <a:lnRef idx="2">
+            <a:schemeClr val="accent1">
+              <a:shade val="50000"/>
+            </a:schemeClr>
+          </a:lnRef>
+          <a:fillRef idx="1">
+            <a:schemeClr val="accent1"/>
+          </a:fillRef>
+          <a:effectRef idx="0">
+            <a:schemeClr val="accent1"/>
+          </a:effectRef>
+          <a:fontRef idx="minor">
+            <a:schemeClr val="lt1"/>
+          </a:fontRef>
+        </p:style>
+        <p:txBody>
+          <a:bodyPr rtlCol="0" anchor="ctr"/>
+          <a:lstStyle/>
+          <a:p>
+            <a:pPr algn="ctr"/>
+            <a:endParaRPr lang="en-US"/>
+          </a:p>
+        </p:txBody>
+      </p:sp>
       <p:sp>
         <p:nvSpPr>
           <p:cNvPr id="2" name="Title 1">

</xml_diff>